<commit_message>
function update for modeling
</commit_message>
<xml_diff>
--- a/doc/20200619 Capstone-Second phase update.pptx
+++ b/doc/20200619 Capstone-Second phase update.pptx
@@ -1628,7 +1628,7 @@
 <dgm:dataModel xmlns:dgm="http://schemas.openxmlformats.org/drawingml/2006/diagram" xmlns:a="http://schemas.openxmlformats.org/drawingml/2006/main">
   <dgm:ptLst>
     <dgm:pt modelId="{A923E62B-FB79-47C5-BF65-EB81EDD2FEB4}" type="doc">
-      <dgm:prSet loTypeId="urn:microsoft.com/office/officeart/2005/8/layout/orgChart1" loCatId="hierarchy" qsTypeId="urn:microsoft.com/office/officeart/2005/8/quickstyle/simple1" qsCatId="simple" csTypeId="urn:microsoft.com/office/officeart/2005/8/colors/accent1_2" csCatId="accent1" phldr="1"/>
+      <dgm:prSet loTypeId="urn:microsoft.com/office/officeart/2009/3/layout/HorizontalOrganizationChart" loCatId="hierarchy" qsTypeId="urn:microsoft.com/office/officeart/2005/8/quickstyle/simple1" qsCatId="simple" csTypeId="urn:microsoft.com/office/officeart/2005/8/colors/accent1_2" csCatId="accent1" phldr="1"/>
       <dgm:spPr/>
       <dgm:t>
         <a:bodyPr/>
@@ -2053,7 +2053,7 @@
         <a:lstStyle/>
         <a:p>
           <a:r>
-            <a:rPr lang="en-US" altLang="zh-CN"/>
+            <a:rPr lang="en-US" altLang="zh-CN" dirty="0"/>
             <a:t>Performance report</a:t>
           </a:r>
           <a:endParaRPr lang="zh-CN" altLang="en-US" dirty="0"/>
@@ -2100,12 +2100,100 @@
     <dgm:pt modelId="{D82F4CDE-BAB8-4B2D-846B-05C85B9853E6}" type="parTrans" cxnId="{F81EECB0-1D39-44C1-8897-52663DA60317}">
       <dgm:prSet/>
       <dgm:spPr/>
+      <dgm:t>
+        <a:bodyPr/>
+        <a:lstStyle/>
+        <a:p>
+          <a:endParaRPr lang="zh-CN" altLang="en-US"/>
+        </a:p>
+      </dgm:t>
     </dgm:pt>
     <dgm:pt modelId="{F4BC947F-884C-4141-A1CD-9628CC56799D}" type="sibTrans" cxnId="{F81EECB0-1D39-44C1-8897-52663DA60317}">
       <dgm:prSet/>
       <dgm:spPr/>
-    </dgm:pt>
-    <dgm:pt modelId="{C1262CA0-80B8-4EB7-99F6-FAF49E8EBC4C}" type="pres">
+      <dgm:t>
+        <a:bodyPr/>
+        <a:lstStyle/>
+        <a:p>
+          <a:endParaRPr lang="zh-CN" altLang="en-US"/>
+        </a:p>
+      </dgm:t>
+    </dgm:pt>
+    <dgm:pt modelId="{44A3FB5A-F263-4AC5-AA08-AD741DFFD12E}">
+      <dgm:prSet phldrT="[Text]"/>
+      <dgm:spPr/>
+      <dgm:t>
+        <a:bodyPr/>
+        <a:lstStyle/>
+        <a:p>
+          <a:r>
+            <a:rPr lang="en-US" altLang="zh-CN" dirty="0"/>
+            <a:t>Merged model</a:t>
+          </a:r>
+          <a:endParaRPr lang="zh-CN" altLang="en-US" dirty="0"/>
+        </a:p>
+      </dgm:t>
+    </dgm:pt>
+    <dgm:pt modelId="{D4D69810-C2F9-44AA-8AF3-18DADFCAE27F}" type="parTrans" cxnId="{A7724B23-FF1E-440A-A8EC-2463ED3AB16C}">
+      <dgm:prSet/>
+      <dgm:spPr/>
+      <dgm:t>
+        <a:bodyPr/>
+        <a:lstStyle/>
+        <a:p>
+          <a:endParaRPr lang="zh-CN" altLang="en-US"/>
+        </a:p>
+      </dgm:t>
+    </dgm:pt>
+    <dgm:pt modelId="{ABB23F58-7059-4C6F-8D73-B6EA2B0B4E39}" type="sibTrans" cxnId="{A7724B23-FF1E-440A-A8EC-2463ED3AB16C}">
+      <dgm:prSet/>
+      <dgm:spPr/>
+      <dgm:t>
+        <a:bodyPr/>
+        <a:lstStyle/>
+        <a:p>
+          <a:endParaRPr lang="zh-CN" altLang="en-US"/>
+        </a:p>
+      </dgm:t>
+    </dgm:pt>
+    <dgm:pt modelId="{A17B5BD0-4847-4A0F-B391-B53EC929A85F}">
+      <dgm:prSet phldrT="[Text]"/>
+      <dgm:spPr/>
+      <dgm:t>
+        <a:bodyPr/>
+        <a:lstStyle/>
+        <a:p>
+          <a:r>
+            <a:rPr lang="en-US" altLang="zh-CN" dirty="0"/>
+            <a:t>Merged model</a:t>
+          </a:r>
+          <a:endParaRPr lang="zh-CN" altLang="en-US" dirty="0"/>
+        </a:p>
+      </dgm:t>
+    </dgm:pt>
+    <dgm:pt modelId="{CC4680DF-C446-424D-BB39-07A31D69C025}" type="parTrans" cxnId="{4896E0ED-8E82-4566-B90C-CAE9B90748AF}">
+      <dgm:prSet/>
+      <dgm:spPr/>
+      <dgm:t>
+        <a:bodyPr/>
+        <a:lstStyle/>
+        <a:p>
+          <a:endParaRPr lang="zh-CN" altLang="en-US"/>
+        </a:p>
+      </dgm:t>
+    </dgm:pt>
+    <dgm:pt modelId="{466F6466-5180-4DFB-A9C4-13192081A444}" type="sibTrans" cxnId="{4896E0ED-8E82-4566-B90C-CAE9B90748AF}">
+      <dgm:prSet/>
+      <dgm:spPr/>
+      <dgm:t>
+        <a:bodyPr/>
+        <a:lstStyle/>
+        <a:p>
+          <a:endParaRPr lang="zh-CN" altLang="en-US"/>
+        </a:p>
+      </dgm:t>
+    </dgm:pt>
+    <dgm:pt modelId="{C3089668-FABE-422F-A64A-A91B789443FE}" type="pres">
       <dgm:prSet presAssocID="{A923E62B-FB79-47C5-BF65-EB81EDD2FEB4}" presName="hierChild1" presStyleCnt="0">
         <dgm:presLayoutVars>
           <dgm:orgChart val="1"/>
@@ -2118,7 +2206,7 @@
       </dgm:prSet>
       <dgm:spPr/>
     </dgm:pt>
-    <dgm:pt modelId="{083CB416-6E25-4BE2-BECC-1C99503CE5E2}" type="pres">
+    <dgm:pt modelId="{2713E45B-920C-48EB-8447-3D59C13A9A1F}" type="pres">
       <dgm:prSet presAssocID="{8396920C-3169-4771-B7BB-4994DCC59096}" presName="hierRoot1" presStyleCnt="0">
         <dgm:presLayoutVars>
           <dgm:hierBranch val="init"/>
@@ -2126,11 +2214,11 @@
       </dgm:prSet>
       <dgm:spPr/>
     </dgm:pt>
-    <dgm:pt modelId="{890962D6-7BEF-4933-B122-D2FDA3CE3BDA}" type="pres">
+    <dgm:pt modelId="{D7C114D5-701F-4201-9164-B2FDE6C254C1}" type="pres">
       <dgm:prSet presAssocID="{8396920C-3169-4771-B7BB-4994DCC59096}" presName="rootComposite1" presStyleCnt="0"/>
       <dgm:spPr/>
     </dgm:pt>
-    <dgm:pt modelId="{DDC74B35-F776-4B58-AE94-BF078DE83068}" type="pres">
+    <dgm:pt modelId="{E6352167-7D3A-4477-A66B-E2705E0B25DB}" type="pres">
       <dgm:prSet presAssocID="{8396920C-3169-4771-B7BB-4994DCC59096}" presName="rootText1" presStyleLbl="node0" presStyleIdx="0" presStyleCnt="1">
         <dgm:presLayoutVars>
           <dgm:chPref val="3"/>
@@ -2138,19 +2226,19 @@
       </dgm:prSet>
       <dgm:spPr/>
     </dgm:pt>
-    <dgm:pt modelId="{6DEAC490-12B6-44E6-94C0-31C85A701296}" type="pres">
+    <dgm:pt modelId="{D7DF3DCE-8825-4D2A-92DB-E63821F527AF}" type="pres">
       <dgm:prSet presAssocID="{8396920C-3169-4771-B7BB-4994DCC59096}" presName="rootConnector1" presStyleLbl="node1" presStyleIdx="0" presStyleCnt="0"/>
       <dgm:spPr/>
     </dgm:pt>
-    <dgm:pt modelId="{BF99EE86-EB9B-402E-8B76-E951801770D9}" type="pres">
+    <dgm:pt modelId="{76628AE1-4A8E-4017-8E71-A3595AE9E1A2}" type="pres">
       <dgm:prSet presAssocID="{8396920C-3169-4771-B7BB-4994DCC59096}" presName="hierChild2" presStyleCnt="0"/>
       <dgm:spPr/>
     </dgm:pt>
-    <dgm:pt modelId="{20E1757A-DC25-423D-96D1-5AB436AB4245}" type="pres">
-      <dgm:prSet presAssocID="{F882E918-E857-4351-B6CD-6E05A13BB8C5}" presName="Name37" presStyleLbl="parChTrans1D2" presStyleIdx="0" presStyleCnt="3"/>
-      <dgm:spPr/>
-    </dgm:pt>
-    <dgm:pt modelId="{DD0E2A46-AD98-4F37-BCEC-51068F437533}" type="pres">
+    <dgm:pt modelId="{918711BF-84CD-43C5-A9E0-8CE2EEFD00C4}" type="pres">
+      <dgm:prSet presAssocID="{F882E918-E857-4351-B6CD-6E05A13BB8C5}" presName="Name64" presStyleLbl="parChTrans1D2" presStyleIdx="0" presStyleCnt="3"/>
+      <dgm:spPr/>
+    </dgm:pt>
+    <dgm:pt modelId="{97CB2A1F-D4AA-4CDF-8855-9872F6EF869A}" type="pres">
       <dgm:prSet presAssocID="{34777A62-5E62-42FE-A095-011F140C7BB6}" presName="hierRoot2" presStyleCnt="0">
         <dgm:presLayoutVars>
           <dgm:hierBranch val="init"/>
@@ -2158,11 +2246,11 @@
       </dgm:prSet>
       <dgm:spPr/>
     </dgm:pt>
-    <dgm:pt modelId="{0AD0B376-44C6-49F4-9267-87027C264085}" type="pres">
+    <dgm:pt modelId="{77D6909C-7AF5-43DE-894B-C3DF0B8405A8}" type="pres">
       <dgm:prSet presAssocID="{34777A62-5E62-42FE-A095-011F140C7BB6}" presName="rootComposite" presStyleCnt="0"/>
       <dgm:spPr/>
     </dgm:pt>
-    <dgm:pt modelId="{3569DE56-31A2-418A-9A41-6CFB902B0BE4}" type="pres">
+    <dgm:pt modelId="{D4D3088E-F816-4DB7-B82A-AAD62057124A}" type="pres">
       <dgm:prSet presAssocID="{34777A62-5E62-42FE-A095-011F140C7BB6}" presName="rootText" presStyleLbl="node2" presStyleIdx="0" presStyleCnt="3">
         <dgm:presLayoutVars>
           <dgm:chPref val="3"/>
@@ -2170,19 +2258,19 @@
       </dgm:prSet>
       <dgm:spPr/>
     </dgm:pt>
-    <dgm:pt modelId="{0926DA84-816A-4FB4-841C-889999C7EB10}" type="pres">
+    <dgm:pt modelId="{7F9B315E-A05F-4DE9-ACCF-AAFEE6A8F164}" type="pres">
       <dgm:prSet presAssocID="{34777A62-5E62-42FE-A095-011F140C7BB6}" presName="rootConnector" presStyleLbl="node2" presStyleIdx="0" presStyleCnt="3"/>
       <dgm:spPr/>
     </dgm:pt>
-    <dgm:pt modelId="{DF6B0C6B-7A76-4B81-99E4-EF0011144549}" type="pres">
+    <dgm:pt modelId="{90BF1D7E-70DB-45CF-B6B2-FC50A85DB246}" type="pres">
       <dgm:prSet presAssocID="{34777A62-5E62-42FE-A095-011F140C7BB6}" presName="hierChild4" presStyleCnt="0"/>
       <dgm:spPr/>
     </dgm:pt>
-    <dgm:pt modelId="{1C32F77C-367C-4538-8F84-98D3D53E7FAB}" type="pres">
-      <dgm:prSet presAssocID="{D82F4CDE-BAB8-4B2D-846B-05C85B9853E6}" presName="Name37" presStyleLbl="parChTrans1D3" presStyleIdx="0" presStyleCnt="5"/>
-      <dgm:spPr/>
-    </dgm:pt>
-    <dgm:pt modelId="{C723502F-2918-41FB-A11A-640311497B42}" type="pres">
+    <dgm:pt modelId="{48540270-B1BB-48C9-B2A0-F938D5E4DB34}" type="pres">
+      <dgm:prSet presAssocID="{D82F4CDE-BAB8-4B2D-846B-05C85B9853E6}" presName="Name64" presStyleLbl="parChTrans1D3" presStyleIdx="0" presStyleCnt="5"/>
+      <dgm:spPr/>
+    </dgm:pt>
+    <dgm:pt modelId="{6A00DEF4-E97D-40DB-B992-01E86D103100}" type="pres">
       <dgm:prSet presAssocID="{1D64AF39-FB9E-4063-8DDD-AA62A730B8B8}" presName="hierRoot2" presStyleCnt="0">
         <dgm:presLayoutVars>
           <dgm:hierBranch val="init"/>
@@ -2190,11 +2278,11 @@
       </dgm:prSet>
       <dgm:spPr/>
     </dgm:pt>
-    <dgm:pt modelId="{F99A6E12-FFE5-4CF8-B565-7489BFD976EB}" type="pres">
+    <dgm:pt modelId="{82771557-08E5-4E99-8A68-E1C0BC8E76E2}" type="pres">
       <dgm:prSet presAssocID="{1D64AF39-FB9E-4063-8DDD-AA62A730B8B8}" presName="rootComposite" presStyleCnt="0"/>
       <dgm:spPr/>
     </dgm:pt>
-    <dgm:pt modelId="{C842B172-73B0-4D3E-882A-A1AAAED9E9BF}" type="pres">
+    <dgm:pt modelId="{841FC3F0-EDEE-47D9-A7AB-E44779B97831}" type="pres">
       <dgm:prSet presAssocID="{1D64AF39-FB9E-4063-8DDD-AA62A730B8B8}" presName="rootText" presStyleLbl="node3" presStyleIdx="0" presStyleCnt="5">
         <dgm:presLayoutVars>
           <dgm:chPref val="3"/>
@@ -2202,27 +2290,27 @@
       </dgm:prSet>
       <dgm:spPr/>
     </dgm:pt>
-    <dgm:pt modelId="{BE755F3F-46AA-4033-A029-69A8BFAA9D25}" type="pres">
+    <dgm:pt modelId="{FEE50AE1-E8FE-477F-84D1-9326E3970B79}" type="pres">
       <dgm:prSet presAssocID="{1D64AF39-FB9E-4063-8DDD-AA62A730B8B8}" presName="rootConnector" presStyleLbl="node3" presStyleIdx="0" presStyleCnt="5"/>
       <dgm:spPr/>
     </dgm:pt>
-    <dgm:pt modelId="{62610D25-458A-4D61-8DC8-AB9884A353BC}" type="pres">
+    <dgm:pt modelId="{78A319A6-4645-4E03-9272-2651C4866778}" type="pres">
       <dgm:prSet presAssocID="{1D64AF39-FB9E-4063-8DDD-AA62A730B8B8}" presName="hierChild4" presStyleCnt="0"/>
       <dgm:spPr/>
     </dgm:pt>
-    <dgm:pt modelId="{D978795F-5AED-4337-A867-4459C29F2E66}" type="pres">
+    <dgm:pt modelId="{2B21527F-B569-4B15-9177-2E5B23BB0C1F}" type="pres">
       <dgm:prSet presAssocID="{1D64AF39-FB9E-4063-8DDD-AA62A730B8B8}" presName="hierChild5" presStyleCnt="0"/>
       <dgm:spPr/>
     </dgm:pt>
-    <dgm:pt modelId="{4B9E8FB1-0BFC-4F0C-9FCD-00A090DA5BC1}" type="pres">
+    <dgm:pt modelId="{F9935CA4-2628-4B58-AEF2-B0C0C8AF2694}" type="pres">
       <dgm:prSet presAssocID="{34777A62-5E62-42FE-A095-011F140C7BB6}" presName="hierChild5" presStyleCnt="0"/>
       <dgm:spPr/>
     </dgm:pt>
-    <dgm:pt modelId="{42831692-6176-4E0A-A015-BAAA55A134D8}" type="pres">
-      <dgm:prSet presAssocID="{F433B884-445A-4F45-B4A1-9793C3977F9B}" presName="Name37" presStyleLbl="parChTrans1D2" presStyleIdx="1" presStyleCnt="3"/>
-      <dgm:spPr/>
-    </dgm:pt>
-    <dgm:pt modelId="{893719DE-555F-47E7-9E6C-CAE0CC5083B5}" type="pres">
+    <dgm:pt modelId="{DAB85FB9-BC47-47AC-922F-C97E272C5E93}" type="pres">
+      <dgm:prSet presAssocID="{F433B884-445A-4F45-B4A1-9793C3977F9B}" presName="Name64" presStyleLbl="parChTrans1D2" presStyleIdx="1" presStyleCnt="3"/>
+      <dgm:spPr/>
+    </dgm:pt>
+    <dgm:pt modelId="{DF8EF137-152F-4BB1-8D05-232C7991B603}" type="pres">
       <dgm:prSet presAssocID="{40B198EF-BA43-44DB-BD4B-37A87B7E44B8}" presName="hierRoot2" presStyleCnt="0">
         <dgm:presLayoutVars>
           <dgm:hierBranch val="init"/>
@@ -2230,11 +2318,11 @@
       </dgm:prSet>
       <dgm:spPr/>
     </dgm:pt>
-    <dgm:pt modelId="{898A7677-AEDF-47CA-BE10-D05131650544}" type="pres">
+    <dgm:pt modelId="{813A51FC-B475-47D6-96BD-5607044EF739}" type="pres">
       <dgm:prSet presAssocID="{40B198EF-BA43-44DB-BD4B-37A87B7E44B8}" presName="rootComposite" presStyleCnt="0"/>
       <dgm:spPr/>
     </dgm:pt>
-    <dgm:pt modelId="{182EC3F2-B35A-405E-89C0-5D66F6BE1000}" type="pres">
+    <dgm:pt modelId="{9EEBEB92-64BA-4F7F-98DF-F7F236744EF3}" type="pres">
       <dgm:prSet presAssocID="{40B198EF-BA43-44DB-BD4B-37A87B7E44B8}" presName="rootText" presStyleLbl="node2" presStyleIdx="1" presStyleCnt="3">
         <dgm:presLayoutVars>
           <dgm:chPref val="3"/>
@@ -2242,19 +2330,19 @@
       </dgm:prSet>
       <dgm:spPr/>
     </dgm:pt>
-    <dgm:pt modelId="{C85761D3-9CED-4057-A794-7877E9FEBF65}" type="pres">
+    <dgm:pt modelId="{E7E042BC-0EFB-483E-8DE0-22B31E909877}" type="pres">
       <dgm:prSet presAssocID="{40B198EF-BA43-44DB-BD4B-37A87B7E44B8}" presName="rootConnector" presStyleLbl="node2" presStyleIdx="1" presStyleCnt="3"/>
       <dgm:spPr/>
     </dgm:pt>
-    <dgm:pt modelId="{B8EA2579-31A2-4484-A5C9-95B83C8DC367}" type="pres">
+    <dgm:pt modelId="{3A93CAD1-056D-47C4-9FC0-49D594EF91D4}" type="pres">
       <dgm:prSet presAssocID="{40B198EF-BA43-44DB-BD4B-37A87B7E44B8}" presName="hierChild4" presStyleCnt="0"/>
       <dgm:spPr/>
     </dgm:pt>
-    <dgm:pt modelId="{156A4072-A85A-423E-9D38-4D25D31BE6EF}" type="pres">
-      <dgm:prSet presAssocID="{8FFBF4B1-EC25-4A92-A723-78A723EDC9CB}" presName="Name37" presStyleLbl="parChTrans1D3" presStyleIdx="1" presStyleCnt="5"/>
-      <dgm:spPr/>
-    </dgm:pt>
-    <dgm:pt modelId="{943B29C2-1A45-446A-8758-1A1DBE91C6B4}" type="pres">
+    <dgm:pt modelId="{06C21965-8E71-4FE4-8ABE-1C052EE030C1}" type="pres">
+      <dgm:prSet presAssocID="{8FFBF4B1-EC25-4A92-A723-78A723EDC9CB}" presName="Name64" presStyleLbl="parChTrans1D3" presStyleIdx="1" presStyleCnt="5"/>
+      <dgm:spPr/>
+    </dgm:pt>
+    <dgm:pt modelId="{A4C39367-5371-44B9-8730-C4A80F1A2ACC}" type="pres">
       <dgm:prSet presAssocID="{C7B405DF-1949-4C59-8A18-961F880D575F}" presName="hierRoot2" presStyleCnt="0">
         <dgm:presLayoutVars>
           <dgm:hierBranch val="init"/>
@@ -2262,11 +2350,11 @@
       </dgm:prSet>
       <dgm:spPr/>
     </dgm:pt>
-    <dgm:pt modelId="{F81BF3EC-AD69-4BBE-9B84-DFC2C2650502}" type="pres">
+    <dgm:pt modelId="{40F71A8D-E46E-4BA7-A585-19AD7DF4F792}" type="pres">
       <dgm:prSet presAssocID="{C7B405DF-1949-4C59-8A18-961F880D575F}" presName="rootComposite" presStyleCnt="0"/>
       <dgm:spPr/>
     </dgm:pt>
-    <dgm:pt modelId="{536AECD9-A66E-4912-87A4-35FC734D2EB3}" type="pres">
+    <dgm:pt modelId="{642D27FE-2E27-4958-A358-B5CB93F05DF0}" type="pres">
       <dgm:prSet presAssocID="{C7B405DF-1949-4C59-8A18-961F880D575F}" presName="rootText" presStyleLbl="node3" presStyleIdx="1" presStyleCnt="5">
         <dgm:presLayoutVars>
           <dgm:chPref val="3"/>
@@ -2274,19 +2362,19 @@
       </dgm:prSet>
       <dgm:spPr/>
     </dgm:pt>
-    <dgm:pt modelId="{AEE05A7A-8B14-4734-B453-5C022F840F4C}" type="pres">
+    <dgm:pt modelId="{757C9A4B-1E2B-458E-B7B5-1A48FC2B7C07}" type="pres">
       <dgm:prSet presAssocID="{C7B405DF-1949-4C59-8A18-961F880D575F}" presName="rootConnector" presStyleLbl="node3" presStyleIdx="1" presStyleCnt="5"/>
       <dgm:spPr/>
     </dgm:pt>
-    <dgm:pt modelId="{0835549F-A95F-4AC4-BFEE-992BC0DBF037}" type="pres">
+    <dgm:pt modelId="{18ECCF73-8FA1-43B1-BF75-3177D1FB90A1}" type="pres">
       <dgm:prSet presAssocID="{C7B405DF-1949-4C59-8A18-961F880D575F}" presName="hierChild4" presStyleCnt="0"/>
       <dgm:spPr/>
     </dgm:pt>
-    <dgm:pt modelId="{6FCCB28E-19E0-46DC-9AE0-C29420DD7A81}" type="pres">
-      <dgm:prSet presAssocID="{706452E8-8F2C-470F-87CF-A4C6ABA9D32E}" presName="Name37" presStyleLbl="parChTrans1D4" presStyleIdx="0" presStyleCnt="4"/>
-      <dgm:spPr/>
-    </dgm:pt>
-    <dgm:pt modelId="{56651034-8C3F-4D48-815C-CC8E5AAE37EB}" type="pres">
+    <dgm:pt modelId="{945CA7E0-FF80-4909-8797-47A74094211B}" type="pres">
+      <dgm:prSet presAssocID="{706452E8-8F2C-470F-87CF-A4C6ABA9D32E}" presName="Name64" presStyleLbl="parChTrans1D4" presStyleIdx="0" presStyleCnt="6"/>
+      <dgm:spPr/>
+    </dgm:pt>
+    <dgm:pt modelId="{0623DF2C-C54F-4A4E-B9D1-BABAE2E7C682}" type="pres">
       <dgm:prSet presAssocID="{26C50A0C-DE04-4C7C-BF13-EB2359C182BF}" presName="hierRoot2" presStyleCnt="0">
         <dgm:presLayoutVars>
           <dgm:hierBranch val="init"/>
@@ -2294,39 +2382,75 @@
       </dgm:prSet>
       <dgm:spPr/>
     </dgm:pt>
-    <dgm:pt modelId="{95415629-C1E5-4213-B4AD-A46BFAF09728}" type="pres">
+    <dgm:pt modelId="{882D775E-0813-458D-B997-1155E7207204}" type="pres">
       <dgm:prSet presAssocID="{26C50A0C-DE04-4C7C-BF13-EB2359C182BF}" presName="rootComposite" presStyleCnt="0"/>
       <dgm:spPr/>
     </dgm:pt>
-    <dgm:pt modelId="{B2813BFB-0200-4D81-9EB0-C2F21B13BBFF}" type="pres">
-      <dgm:prSet presAssocID="{26C50A0C-DE04-4C7C-BF13-EB2359C182BF}" presName="rootText" presStyleLbl="node4" presStyleIdx="0" presStyleCnt="4">
+    <dgm:pt modelId="{19B29335-EA1A-49EE-974D-F0C5AD5FD79F}" type="pres">
+      <dgm:prSet presAssocID="{26C50A0C-DE04-4C7C-BF13-EB2359C182BF}" presName="rootText" presStyleLbl="node4" presStyleIdx="0" presStyleCnt="6">
         <dgm:presLayoutVars>
           <dgm:chPref val="3"/>
         </dgm:presLayoutVars>
       </dgm:prSet>
       <dgm:spPr/>
     </dgm:pt>
-    <dgm:pt modelId="{BA7D9017-BE78-4294-9105-5AD2EE4FE16C}" type="pres">
-      <dgm:prSet presAssocID="{26C50A0C-DE04-4C7C-BF13-EB2359C182BF}" presName="rootConnector" presStyleLbl="node4" presStyleIdx="0" presStyleCnt="4"/>
-      <dgm:spPr/>
-    </dgm:pt>
-    <dgm:pt modelId="{0963DE9C-544B-455D-B6DF-2E9D28AE7025}" type="pres">
+    <dgm:pt modelId="{3D37B79B-B2ED-41DD-AEC5-F37FD3228196}" type="pres">
+      <dgm:prSet presAssocID="{26C50A0C-DE04-4C7C-BF13-EB2359C182BF}" presName="rootConnector" presStyleLbl="node4" presStyleIdx="0" presStyleCnt="6"/>
+      <dgm:spPr/>
+    </dgm:pt>
+    <dgm:pt modelId="{723E3C19-7207-4E70-BCBA-81B42E3C729F}" type="pres">
       <dgm:prSet presAssocID="{26C50A0C-DE04-4C7C-BF13-EB2359C182BF}" presName="hierChild4" presStyleCnt="0"/>
       <dgm:spPr/>
     </dgm:pt>
-    <dgm:pt modelId="{C0B32967-C1ED-42CF-A7CE-2438BD760962}" type="pres">
+    <dgm:pt modelId="{D9BBDF49-6C14-4068-B186-F5BB8193E5F5}" type="pres">
+      <dgm:prSet presAssocID="{D4D69810-C2F9-44AA-8AF3-18DADFCAE27F}" presName="Name64" presStyleLbl="parChTrans1D4" presStyleIdx="1" presStyleCnt="6"/>
+      <dgm:spPr/>
+    </dgm:pt>
+    <dgm:pt modelId="{0915B519-3D23-47B6-8316-CAB2D4619F21}" type="pres">
+      <dgm:prSet presAssocID="{44A3FB5A-F263-4AC5-AA08-AD741DFFD12E}" presName="hierRoot2" presStyleCnt="0">
+        <dgm:presLayoutVars>
+          <dgm:hierBranch val="init"/>
+        </dgm:presLayoutVars>
+      </dgm:prSet>
+      <dgm:spPr/>
+    </dgm:pt>
+    <dgm:pt modelId="{54342746-B4DA-4902-897B-80B348338E58}" type="pres">
+      <dgm:prSet presAssocID="{44A3FB5A-F263-4AC5-AA08-AD741DFFD12E}" presName="rootComposite" presStyleCnt="0"/>
+      <dgm:spPr/>
+    </dgm:pt>
+    <dgm:pt modelId="{F9345731-A502-4891-BFEB-0D0B72ED1BD9}" type="pres">
+      <dgm:prSet presAssocID="{44A3FB5A-F263-4AC5-AA08-AD741DFFD12E}" presName="rootText" presStyleLbl="node4" presStyleIdx="1" presStyleCnt="6">
+        <dgm:presLayoutVars>
+          <dgm:chPref val="3"/>
+        </dgm:presLayoutVars>
+      </dgm:prSet>
+      <dgm:spPr/>
+    </dgm:pt>
+    <dgm:pt modelId="{52F75EBA-DB25-4744-8C7A-70B18B2035E3}" type="pres">
+      <dgm:prSet presAssocID="{44A3FB5A-F263-4AC5-AA08-AD741DFFD12E}" presName="rootConnector" presStyleLbl="node4" presStyleIdx="1" presStyleCnt="6"/>
+      <dgm:spPr/>
+    </dgm:pt>
+    <dgm:pt modelId="{BE8F2A0F-BC9A-40CD-9FC9-87CF65DA96ED}" type="pres">
+      <dgm:prSet presAssocID="{44A3FB5A-F263-4AC5-AA08-AD741DFFD12E}" presName="hierChild4" presStyleCnt="0"/>
+      <dgm:spPr/>
+    </dgm:pt>
+    <dgm:pt modelId="{83B1F5A0-35F4-4479-8C6E-0C08234F3325}" type="pres">
+      <dgm:prSet presAssocID="{44A3FB5A-F263-4AC5-AA08-AD741DFFD12E}" presName="hierChild5" presStyleCnt="0"/>
+      <dgm:spPr/>
+    </dgm:pt>
+    <dgm:pt modelId="{59D0779F-4F8A-4088-9D50-E02BB339EA33}" type="pres">
       <dgm:prSet presAssocID="{26C50A0C-DE04-4C7C-BF13-EB2359C182BF}" presName="hierChild5" presStyleCnt="0"/>
       <dgm:spPr/>
     </dgm:pt>
-    <dgm:pt modelId="{8CD5AE47-AD18-43E4-98D3-C652C276C32C}" type="pres">
+    <dgm:pt modelId="{BF04D66E-D393-49C7-B2CA-76CD1A79B789}" type="pres">
       <dgm:prSet presAssocID="{C7B405DF-1949-4C59-8A18-961F880D575F}" presName="hierChild5" presStyleCnt="0"/>
       <dgm:spPr/>
     </dgm:pt>
-    <dgm:pt modelId="{9DCFFC93-9DF2-4873-9C44-CDD86397B319}" type="pres">
-      <dgm:prSet presAssocID="{81D967CB-E781-4C96-800C-4CB9C45E1116}" presName="Name37" presStyleLbl="parChTrans1D3" presStyleIdx="2" presStyleCnt="5"/>
-      <dgm:spPr/>
-    </dgm:pt>
-    <dgm:pt modelId="{AE2335CB-64CA-444D-9E6A-9AB770FC06E2}" type="pres">
+    <dgm:pt modelId="{E31E7DC3-EA3F-4D42-B094-2C5B08161DDA}" type="pres">
+      <dgm:prSet presAssocID="{81D967CB-E781-4C96-800C-4CB9C45E1116}" presName="Name64" presStyleLbl="parChTrans1D3" presStyleIdx="2" presStyleCnt="5"/>
+      <dgm:spPr/>
+    </dgm:pt>
+    <dgm:pt modelId="{2CE6A218-1B5E-4F4A-BB93-CEE69B1427B9}" type="pres">
       <dgm:prSet presAssocID="{FF4D8BB2-5403-48BE-8B17-203802C420C9}" presName="hierRoot2" presStyleCnt="0">
         <dgm:presLayoutVars>
           <dgm:hierBranch val="init"/>
@@ -2334,11 +2458,11 @@
       </dgm:prSet>
       <dgm:spPr/>
     </dgm:pt>
-    <dgm:pt modelId="{5C038A71-F2B9-471A-B722-54A32FBB13BF}" type="pres">
+    <dgm:pt modelId="{3F2FBD19-6CFA-46B8-8CDA-269812C021D8}" type="pres">
       <dgm:prSet presAssocID="{FF4D8BB2-5403-48BE-8B17-203802C420C9}" presName="rootComposite" presStyleCnt="0"/>
       <dgm:spPr/>
     </dgm:pt>
-    <dgm:pt modelId="{F54442B5-EF5D-4913-B8E8-81B98204AC46}" type="pres">
+    <dgm:pt modelId="{4D46CBD9-7226-4C0F-A94A-2615771A1793}" type="pres">
       <dgm:prSet presAssocID="{FF4D8BB2-5403-48BE-8B17-203802C420C9}" presName="rootText" presStyleLbl="node3" presStyleIdx="2" presStyleCnt="5">
         <dgm:presLayoutVars>
           <dgm:chPref val="3"/>
@@ -2346,19 +2470,19 @@
       </dgm:prSet>
       <dgm:spPr/>
     </dgm:pt>
-    <dgm:pt modelId="{D4088547-5D75-4D24-BDF8-455868A89074}" type="pres">
+    <dgm:pt modelId="{CEDFCCCB-F4D4-4761-A537-1C600AF25EAC}" type="pres">
       <dgm:prSet presAssocID="{FF4D8BB2-5403-48BE-8B17-203802C420C9}" presName="rootConnector" presStyleLbl="node3" presStyleIdx="2" presStyleCnt="5"/>
       <dgm:spPr/>
     </dgm:pt>
-    <dgm:pt modelId="{43DB93CC-8503-445C-9FC3-276ECD8C81AB}" type="pres">
+    <dgm:pt modelId="{9B84E685-3D15-445D-A897-37CEC8AD4E5A}" type="pres">
       <dgm:prSet presAssocID="{FF4D8BB2-5403-48BE-8B17-203802C420C9}" presName="hierChild4" presStyleCnt="0"/>
       <dgm:spPr/>
     </dgm:pt>
-    <dgm:pt modelId="{D331CBC7-0A66-4857-943E-3664A559C4F0}" type="pres">
-      <dgm:prSet presAssocID="{722513B3-4019-43ED-BBAD-CE985D5701B1}" presName="Name37" presStyleLbl="parChTrans1D4" presStyleIdx="1" presStyleCnt="4"/>
-      <dgm:spPr/>
-    </dgm:pt>
-    <dgm:pt modelId="{4530EFD5-BE48-44B5-8584-72C85B9C00E4}" type="pres">
+    <dgm:pt modelId="{66065974-BED5-4F32-B122-0F132D186B02}" type="pres">
+      <dgm:prSet presAssocID="{722513B3-4019-43ED-BBAD-CE985D5701B1}" presName="Name64" presStyleLbl="parChTrans1D4" presStyleIdx="2" presStyleCnt="6"/>
+      <dgm:spPr/>
+    </dgm:pt>
+    <dgm:pt modelId="{152A2970-FD3A-439B-8713-61FC424ADBFA}" type="pres">
       <dgm:prSet presAssocID="{FB747F19-D2CD-4825-AFA0-FB3DF776A210}" presName="hierRoot2" presStyleCnt="0">
         <dgm:presLayoutVars>
           <dgm:hierBranch val="init"/>
@@ -2366,43 +2490,43 @@
       </dgm:prSet>
       <dgm:spPr/>
     </dgm:pt>
-    <dgm:pt modelId="{0B08946D-B22A-4421-800B-67370BF69927}" type="pres">
+    <dgm:pt modelId="{BF694033-1575-4206-9C48-D03C06556126}" type="pres">
       <dgm:prSet presAssocID="{FB747F19-D2CD-4825-AFA0-FB3DF776A210}" presName="rootComposite" presStyleCnt="0"/>
       <dgm:spPr/>
     </dgm:pt>
-    <dgm:pt modelId="{FA9D6615-828E-41CA-9EAA-77523A215200}" type="pres">
-      <dgm:prSet presAssocID="{FB747F19-D2CD-4825-AFA0-FB3DF776A210}" presName="rootText" presStyleLbl="node4" presStyleIdx="1" presStyleCnt="4">
+    <dgm:pt modelId="{AFA6C30E-C18F-423D-9B5D-B4A720213DDA}" type="pres">
+      <dgm:prSet presAssocID="{FB747F19-D2CD-4825-AFA0-FB3DF776A210}" presName="rootText" presStyleLbl="node4" presStyleIdx="2" presStyleCnt="6">
         <dgm:presLayoutVars>
           <dgm:chPref val="3"/>
         </dgm:presLayoutVars>
       </dgm:prSet>
       <dgm:spPr/>
     </dgm:pt>
-    <dgm:pt modelId="{EC0F22A7-D22F-4CF5-BE00-BBEF64D939D1}" type="pres">
-      <dgm:prSet presAssocID="{FB747F19-D2CD-4825-AFA0-FB3DF776A210}" presName="rootConnector" presStyleLbl="node4" presStyleIdx="1" presStyleCnt="4"/>
-      <dgm:spPr/>
-    </dgm:pt>
-    <dgm:pt modelId="{B3C67864-DEF3-4FED-9422-1A670E232EC4}" type="pres">
+    <dgm:pt modelId="{202C862B-6195-49DD-B879-07A868203B08}" type="pres">
+      <dgm:prSet presAssocID="{FB747F19-D2CD-4825-AFA0-FB3DF776A210}" presName="rootConnector" presStyleLbl="node4" presStyleIdx="2" presStyleCnt="6"/>
+      <dgm:spPr/>
+    </dgm:pt>
+    <dgm:pt modelId="{CBF7D241-0385-45D4-A1E1-7587418DFA37}" type="pres">
       <dgm:prSet presAssocID="{FB747F19-D2CD-4825-AFA0-FB3DF776A210}" presName="hierChild4" presStyleCnt="0"/>
       <dgm:spPr/>
     </dgm:pt>
-    <dgm:pt modelId="{4B2D6920-5B70-4506-9ECC-816C5FCE7BAD}" type="pres">
+    <dgm:pt modelId="{2F33373C-ACCB-43AE-BDD0-A87A4BA29F41}" type="pres">
       <dgm:prSet presAssocID="{FB747F19-D2CD-4825-AFA0-FB3DF776A210}" presName="hierChild5" presStyleCnt="0"/>
       <dgm:spPr/>
     </dgm:pt>
-    <dgm:pt modelId="{A45A1003-5E9D-45E6-80A4-220E612CC841}" type="pres">
+    <dgm:pt modelId="{F5B7F394-2C03-4E4C-9143-836B27C05373}" type="pres">
       <dgm:prSet presAssocID="{FF4D8BB2-5403-48BE-8B17-203802C420C9}" presName="hierChild5" presStyleCnt="0"/>
       <dgm:spPr/>
     </dgm:pt>
-    <dgm:pt modelId="{8A145B79-404E-4DFC-AA4F-E686CC0E5A0F}" type="pres">
+    <dgm:pt modelId="{C73C8FDF-3AF3-4F94-9F89-035F4B072015}" type="pres">
       <dgm:prSet presAssocID="{40B198EF-BA43-44DB-BD4B-37A87B7E44B8}" presName="hierChild5" presStyleCnt="0"/>
       <dgm:spPr/>
     </dgm:pt>
-    <dgm:pt modelId="{6D2253F2-45D8-44E7-B1A5-4067573F858E}" type="pres">
-      <dgm:prSet presAssocID="{16E212FF-DF36-4E89-B191-6F0CEA1DBB3F}" presName="Name37" presStyleLbl="parChTrans1D2" presStyleIdx="2" presStyleCnt="3"/>
-      <dgm:spPr/>
-    </dgm:pt>
-    <dgm:pt modelId="{5928FDFF-A549-4C7A-92CF-A6D14EDD7B39}" type="pres">
+    <dgm:pt modelId="{19F42125-481B-44CC-99B3-E553D8BC9BEB}" type="pres">
+      <dgm:prSet presAssocID="{16E212FF-DF36-4E89-B191-6F0CEA1DBB3F}" presName="Name64" presStyleLbl="parChTrans1D2" presStyleIdx="2" presStyleCnt="3"/>
+      <dgm:spPr/>
+    </dgm:pt>
+    <dgm:pt modelId="{11DA984E-4AD0-4558-873E-EA535D8420EE}" type="pres">
       <dgm:prSet presAssocID="{7B5B1DC2-D922-4B68-8E2A-4053424BE05D}" presName="hierRoot2" presStyleCnt="0">
         <dgm:presLayoutVars>
           <dgm:hierBranch val="init"/>
@@ -2410,11 +2534,11 @@
       </dgm:prSet>
       <dgm:spPr/>
     </dgm:pt>
-    <dgm:pt modelId="{F5E58C51-C412-41FA-B035-2C666821D45C}" type="pres">
+    <dgm:pt modelId="{76EAEF87-9BB1-4A58-9C50-2D0392CA272C}" type="pres">
       <dgm:prSet presAssocID="{7B5B1DC2-D922-4B68-8E2A-4053424BE05D}" presName="rootComposite" presStyleCnt="0"/>
       <dgm:spPr/>
     </dgm:pt>
-    <dgm:pt modelId="{33E261C2-582A-4DB8-8546-0EC85D0646AF}" type="pres">
+    <dgm:pt modelId="{07A54363-4941-410F-9CE5-8F873DA957C7}" type="pres">
       <dgm:prSet presAssocID="{7B5B1DC2-D922-4B68-8E2A-4053424BE05D}" presName="rootText" presStyleLbl="node2" presStyleIdx="2" presStyleCnt="3">
         <dgm:presLayoutVars>
           <dgm:chPref val="3"/>
@@ -2422,19 +2546,19 @@
       </dgm:prSet>
       <dgm:spPr/>
     </dgm:pt>
-    <dgm:pt modelId="{5F9C667E-382C-48DC-87C1-0CEC101C97EE}" type="pres">
+    <dgm:pt modelId="{4252A706-1508-444F-A356-0BC68A0369C5}" type="pres">
       <dgm:prSet presAssocID="{7B5B1DC2-D922-4B68-8E2A-4053424BE05D}" presName="rootConnector" presStyleLbl="node2" presStyleIdx="2" presStyleCnt="3"/>
       <dgm:spPr/>
     </dgm:pt>
-    <dgm:pt modelId="{B616C69F-46AE-42D7-915D-9EBBCD49DFF9}" type="pres">
+    <dgm:pt modelId="{725828E6-A000-4DF8-BAEA-CF9519E93E48}" type="pres">
       <dgm:prSet presAssocID="{7B5B1DC2-D922-4B68-8E2A-4053424BE05D}" presName="hierChild4" presStyleCnt="0"/>
       <dgm:spPr/>
     </dgm:pt>
-    <dgm:pt modelId="{2096A139-1797-48FB-BA03-C753AED9B4BC}" type="pres">
-      <dgm:prSet presAssocID="{C623E55E-0770-4250-859E-7DE186D8BA48}" presName="Name37" presStyleLbl="parChTrans1D3" presStyleIdx="3" presStyleCnt="5"/>
-      <dgm:spPr/>
-    </dgm:pt>
-    <dgm:pt modelId="{ACF55D90-7650-44C6-9AF8-630A25C65834}" type="pres">
+    <dgm:pt modelId="{BF9DC53F-CBC0-4A33-83D4-E7995A0B517A}" type="pres">
+      <dgm:prSet presAssocID="{C623E55E-0770-4250-859E-7DE186D8BA48}" presName="Name64" presStyleLbl="parChTrans1D3" presStyleIdx="3" presStyleCnt="5"/>
+      <dgm:spPr/>
+    </dgm:pt>
+    <dgm:pt modelId="{F80F664B-085B-432D-93B6-F62F709835E6}" type="pres">
       <dgm:prSet presAssocID="{3310212A-ACAF-4947-A132-D99367810AD9}" presName="hierRoot2" presStyleCnt="0">
         <dgm:presLayoutVars>
           <dgm:hierBranch val="init"/>
@@ -2442,11 +2566,11 @@
       </dgm:prSet>
       <dgm:spPr/>
     </dgm:pt>
-    <dgm:pt modelId="{3684B864-B9A8-4582-868D-AA7118706824}" type="pres">
+    <dgm:pt modelId="{6C8DAF53-3048-4FB9-9374-C46B97C12941}" type="pres">
       <dgm:prSet presAssocID="{3310212A-ACAF-4947-A132-D99367810AD9}" presName="rootComposite" presStyleCnt="0"/>
       <dgm:spPr/>
     </dgm:pt>
-    <dgm:pt modelId="{477D82C5-868E-4739-BDE3-048B427566B6}" type="pres">
+    <dgm:pt modelId="{04C6AEB2-F547-4703-89D0-7F992B18B45D}" type="pres">
       <dgm:prSet presAssocID="{3310212A-ACAF-4947-A132-D99367810AD9}" presName="rootText" presStyleLbl="node3" presStyleIdx="3" presStyleCnt="5">
         <dgm:presLayoutVars>
           <dgm:chPref val="3"/>
@@ -2454,19 +2578,19 @@
       </dgm:prSet>
       <dgm:spPr/>
     </dgm:pt>
-    <dgm:pt modelId="{9E88FD70-97B5-4C66-8C96-A5A0E75654B6}" type="pres">
+    <dgm:pt modelId="{A0E0E8EB-EAD6-4268-9DBD-F6403E7F0AE6}" type="pres">
       <dgm:prSet presAssocID="{3310212A-ACAF-4947-A132-D99367810AD9}" presName="rootConnector" presStyleLbl="node3" presStyleIdx="3" presStyleCnt="5"/>
       <dgm:spPr/>
     </dgm:pt>
-    <dgm:pt modelId="{01EB9034-8F3E-483F-94A9-162535E96293}" type="pres">
+    <dgm:pt modelId="{AAD7D41D-7C92-4280-A4D6-5AB42D2A3033}" type="pres">
       <dgm:prSet presAssocID="{3310212A-ACAF-4947-A132-D99367810AD9}" presName="hierChild4" presStyleCnt="0"/>
       <dgm:spPr/>
     </dgm:pt>
-    <dgm:pt modelId="{ABC704CA-6BDD-4333-A596-9640100AD48A}" type="pres">
-      <dgm:prSet presAssocID="{A3C20A73-4EEC-4EC6-A165-8DDE5BF23001}" presName="Name37" presStyleLbl="parChTrans1D4" presStyleIdx="2" presStyleCnt="4"/>
-      <dgm:spPr/>
-    </dgm:pt>
-    <dgm:pt modelId="{F5D8A1D7-A1B4-4FC7-BB77-4FD73318BD68}" type="pres">
+    <dgm:pt modelId="{F0B1AE00-5C2D-4A6F-8CFB-7FFE77D8802E}" type="pres">
+      <dgm:prSet presAssocID="{A3C20A73-4EEC-4EC6-A165-8DDE5BF23001}" presName="Name64" presStyleLbl="parChTrans1D4" presStyleIdx="3" presStyleCnt="6"/>
+      <dgm:spPr/>
+    </dgm:pt>
+    <dgm:pt modelId="{17C28219-93B8-42BD-9642-2D3C3706907B}" type="pres">
       <dgm:prSet presAssocID="{68C60DC7-8DD0-47EA-8B48-35AE615F7750}" presName="hierRoot2" presStyleCnt="0">
         <dgm:presLayoutVars>
           <dgm:hierBranch val="init"/>
@@ -2474,39 +2598,75 @@
       </dgm:prSet>
       <dgm:spPr/>
     </dgm:pt>
-    <dgm:pt modelId="{ECF3BC6A-CC4F-43F9-8A95-2D7D7B2C6214}" type="pres">
+    <dgm:pt modelId="{B9F17293-F2A4-4203-A667-B239727D6F1B}" type="pres">
       <dgm:prSet presAssocID="{68C60DC7-8DD0-47EA-8B48-35AE615F7750}" presName="rootComposite" presStyleCnt="0"/>
       <dgm:spPr/>
     </dgm:pt>
-    <dgm:pt modelId="{75BD0541-2DEA-4CCE-9B3F-6C335E44344F}" type="pres">
-      <dgm:prSet presAssocID="{68C60DC7-8DD0-47EA-8B48-35AE615F7750}" presName="rootText" presStyleLbl="node4" presStyleIdx="2" presStyleCnt="4">
+    <dgm:pt modelId="{0A81819E-C38C-4A98-A87A-5A41BF26BE12}" type="pres">
+      <dgm:prSet presAssocID="{68C60DC7-8DD0-47EA-8B48-35AE615F7750}" presName="rootText" presStyleLbl="node4" presStyleIdx="3" presStyleCnt="6">
         <dgm:presLayoutVars>
           <dgm:chPref val="3"/>
         </dgm:presLayoutVars>
       </dgm:prSet>
       <dgm:spPr/>
     </dgm:pt>
-    <dgm:pt modelId="{A13F3D89-7008-483F-8EFA-85005FE7E7D4}" type="pres">
-      <dgm:prSet presAssocID="{68C60DC7-8DD0-47EA-8B48-35AE615F7750}" presName="rootConnector" presStyleLbl="node4" presStyleIdx="2" presStyleCnt="4"/>
-      <dgm:spPr/>
-    </dgm:pt>
-    <dgm:pt modelId="{F87C2620-E441-43B3-9954-931A904FF19C}" type="pres">
+    <dgm:pt modelId="{B53F5FD3-9D20-4E56-897F-80F8244115CC}" type="pres">
+      <dgm:prSet presAssocID="{68C60DC7-8DD0-47EA-8B48-35AE615F7750}" presName="rootConnector" presStyleLbl="node4" presStyleIdx="3" presStyleCnt="6"/>
+      <dgm:spPr/>
+    </dgm:pt>
+    <dgm:pt modelId="{A2E9C651-CA68-406E-9E85-47804373B00A}" type="pres">
       <dgm:prSet presAssocID="{68C60DC7-8DD0-47EA-8B48-35AE615F7750}" presName="hierChild4" presStyleCnt="0"/>
       <dgm:spPr/>
     </dgm:pt>
-    <dgm:pt modelId="{FA5D56FE-419D-4F53-B58C-D9F5700117B1}" type="pres">
+    <dgm:pt modelId="{C3F9B5C3-053A-46D8-A966-DA2D4DCF84B3}" type="pres">
+      <dgm:prSet presAssocID="{CC4680DF-C446-424D-BB39-07A31D69C025}" presName="Name64" presStyleLbl="parChTrans1D4" presStyleIdx="4" presStyleCnt="6"/>
+      <dgm:spPr/>
+    </dgm:pt>
+    <dgm:pt modelId="{C8B766D3-440D-4C1C-9C37-17BE08710874}" type="pres">
+      <dgm:prSet presAssocID="{A17B5BD0-4847-4A0F-B391-B53EC929A85F}" presName="hierRoot2" presStyleCnt="0">
+        <dgm:presLayoutVars>
+          <dgm:hierBranch val="init"/>
+        </dgm:presLayoutVars>
+      </dgm:prSet>
+      <dgm:spPr/>
+    </dgm:pt>
+    <dgm:pt modelId="{E3726220-1FB8-4D0F-AAD6-F4A051AA9FBB}" type="pres">
+      <dgm:prSet presAssocID="{A17B5BD0-4847-4A0F-B391-B53EC929A85F}" presName="rootComposite" presStyleCnt="0"/>
+      <dgm:spPr/>
+    </dgm:pt>
+    <dgm:pt modelId="{566A5AD3-189C-4E39-8EA7-AF8865469DB1}" type="pres">
+      <dgm:prSet presAssocID="{A17B5BD0-4847-4A0F-B391-B53EC929A85F}" presName="rootText" presStyleLbl="node4" presStyleIdx="4" presStyleCnt="6">
+        <dgm:presLayoutVars>
+          <dgm:chPref val="3"/>
+        </dgm:presLayoutVars>
+      </dgm:prSet>
+      <dgm:spPr/>
+    </dgm:pt>
+    <dgm:pt modelId="{D3422F85-F88E-4703-A67C-44BF2E357661}" type="pres">
+      <dgm:prSet presAssocID="{A17B5BD0-4847-4A0F-B391-B53EC929A85F}" presName="rootConnector" presStyleLbl="node4" presStyleIdx="4" presStyleCnt="6"/>
+      <dgm:spPr/>
+    </dgm:pt>
+    <dgm:pt modelId="{E1C0935D-F39B-45C7-8BCC-E8E464F48B0A}" type="pres">
+      <dgm:prSet presAssocID="{A17B5BD0-4847-4A0F-B391-B53EC929A85F}" presName="hierChild4" presStyleCnt="0"/>
+      <dgm:spPr/>
+    </dgm:pt>
+    <dgm:pt modelId="{287683C1-4FA7-4169-8D24-3BD2EBE4D108}" type="pres">
+      <dgm:prSet presAssocID="{A17B5BD0-4847-4A0F-B391-B53EC929A85F}" presName="hierChild5" presStyleCnt="0"/>
+      <dgm:spPr/>
+    </dgm:pt>
+    <dgm:pt modelId="{39F7888D-316B-482B-A080-80C8D7BA478E}" type="pres">
       <dgm:prSet presAssocID="{68C60DC7-8DD0-47EA-8B48-35AE615F7750}" presName="hierChild5" presStyleCnt="0"/>
       <dgm:spPr/>
     </dgm:pt>
-    <dgm:pt modelId="{8BF49E13-91D0-46AC-B9A5-20A71D144AA5}" type="pres">
+    <dgm:pt modelId="{5D0F5B3D-F3E4-4AC0-BAA3-2F4AAB239206}" type="pres">
       <dgm:prSet presAssocID="{3310212A-ACAF-4947-A132-D99367810AD9}" presName="hierChild5" presStyleCnt="0"/>
       <dgm:spPr/>
     </dgm:pt>
-    <dgm:pt modelId="{5513AC60-615D-409B-A023-48E7C7ADF565}" type="pres">
-      <dgm:prSet presAssocID="{804C8A1E-4003-43F0-854D-CFE0E86D7F26}" presName="Name37" presStyleLbl="parChTrans1D3" presStyleIdx="4" presStyleCnt="5"/>
-      <dgm:spPr/>
-    </dgm:pt>
-    <dgm:pt modelId="{EE9C8A52-7297-48BE-9072-9C34061B0F63}" type="pres">
+    <dgm:pt modelId="{BCF42F37-0E36-4187-AFCB-4D47451E539F}" type="pres">
+      <dgm:prSet presAssocID="{804C8A1E-4003-43F0-854D-CFE0E86D7F26}" presName="Name64" presStyleLbl="parChTrans1D3" presStyleIdx="4" presStyleCnt="5"/>
+      <dgm:spPr/>
+    </dgm:pt>
+    <dgm:pt modelId="{A28CA169-F3C0-4424-BC84-F449E9E4C7CC}" type="pres">
       <dgm:prSet presAssocID="{CCA41351-79F6-4936-AFB6-1937328A6F54}" presName="hierRoot2" presStyleCnt="0">
         <dgm:presLayoutVars>
           <dgm:hierBranch val="init"/>
@@ -2514,11 +2674,11 @@
       </dgm:prSet>
       <dgm:spPr/>
     </dgm:pt>
-    <dgm:pt modelId="{D503B403-870B-406A-B9ED-117D727540E9}" type="pres">
+    <dgm:pt modelId="{B29F48A3-145C-401D-B56F-55431BB4CEC8}" type="pres">
       <dgm:prSet presAssocID="{CCA41351-79F6-4936-AFB6-1937328A6F54}" presName="rootComposite" presStyleCnt="0"/>
       <dgm:spPr/>
     </dgm:pt>
-    <dgm:pt modelId="{2A4B1988-9185-48F2-9015-0EE8EF0C6CA1}" type="pres">
+    <dgm:pt modelId="{D5305652-E4D4-40D1-95A8-42CA882204F8}" type="pres">
       <dgm:prSet presAssocID="{CCA41351-79F6-4936-AFB6-1937328A6F54}" presName="rootText" presStyleLbl="node3" presStyleIdx="4" presStyleCnt="5">
         <dgm:presLayoutVars>
           <dgm:chPref val="3"/>
@@ -2526,19 +2686,19 @@
       </dgm:prSet>
       <dgm:spPr/>
     </dgm:pt>
-    <dgm:pt modelId="{081B2FAD-3B78-43A6-AE13-693DCED095F5}" type="pres">
+    <dgm:pt modelId="{C238B933-BB36-47A8-A22A-A8E781F88161}" type="pres">
       <dgm:prSet presAssocID="{CCA41351-79F6-4936-AFB6-1937328A6F54}" presName="rootConnector" presStyleLbl="node3" presStyleIdx="4" presStyleCnt="5"/>
       <dgm:spPr/>
     </dgm:pt>
-    <dgm:pt modelId="{5FEC2C06-B1E4-4A74-B765-06BBA5FD1612}" type="pres">
+    <dgm:pt modelId="{650739A9-1A2B-4FFF-A48F-525466094328}" type="pres">
       <dgm:prSet presAssocID="{CCA41351-79F6-4936-AFB6-1937328A6F54}" presName="hierChild4" presStyleCnt="0"/>
       <dgm:spPr/>
     </dgm:pt>
-    <dgm:pt modelId="{71031FBC-F8B1-4FCC-801B-FC7BFF56876E}" type="pres">
-      <dgm:prSet presAssocID="{CBFC3123-1110-4071-8BDE-3B7E5A5DCB46}" presName="Name37" presStyleLbl="parChTrans1D4" presStyleIdx="3" presStyleCnt="4"/>
-      <dgm:spPr/>
-    </dgm:pt>
-    <dgm:pt modelId="{31F37A7B-44CA-44F3-A7CA-74A146F13E8D}" type="pres">
+    <dgm:pt modelId="{A6277117-3F34-41FC-A085-2A156C5D63BE}" type="pres">
+      <dgm:prSet presAssocID="{CBFC3123-1110-4071-8BDE-3B7E5A5DCB46}" presName="Name64" presStyleLbl="parChTrans1D4" presStyleIdx="5" presStyleCnt="6"/>
+      <dgm:spPr/>
+    </dgm:pt>
+    <dgm:pt modelId="{C1C224B0-8F28-4855-9014-E739AA8D2F3C}" type="pres">
       <dgm:prSet presAssocID="{A5248CF3-1DC3-4E87-A421-D55B800284B7}" presName="hierRoot2" presStyleCnt="0">
         <dgm:presLayoutVars>
           <dgm:hierBranch val="init"/>
@@ -2546,186 +2706,208 @@
       </dgm:prSet>
       <dgm:spPr/>
     </dgm:pt>
-    <dgm:pt modelId="{75E47187-9672-48B1-B647-51AED201B5A2}" type="pres">
+    <dgm:pt modelId="{6EA77BA9-465D-4C9A-857E-66E14AF348E5}" type="pres">
       <dgm:prSet presAssocID="{A5248CF3-1DC3-4E87-A421-D55B800284B7}" presName="rootComposite" presStyleCnt="0"/>
       <dgm:spPr/>
     </dgm:pt>
-    <dgm:pt modelId="{0DD69810-8220-4F21-8267-18E93820F012}" type="pres">
-      <dgm:prSet presAssocID="{A5248CF3-1DC3-4E87-A421-D55B800284B7}" presName="rootText" presStyleLbl="node4" presStyleIdx="3" presStyleCnt="4">
+    <dgm:pt modelId="{0E2FB7D6-70A8-464D-ABBF-03E157F2E1A3}" type="pres">
+      <dgm:prSet presAssocID="{A5248CF3-1DC3-4E87-A421-D55B800284B7}" presName="rootText" presStyleLbl="node4" presStyleIdx="5" presStyleCnt="6">
         <dgm:presLayoutVars>
           <dgm:chPref val="3"/>
         </dgm:presLayoutVars>
       </dgm:prSet>
       <dgm:spPr/>
     </dgm:pt>
-    <dgm:pt modelId="{A8E37AB3-3CC0-4F25-A8E1-5467D1D780EC}" type="pres">
-      <dgm:prSet presAssocID="{A5248CF3-1DC3-4E87-A421-D55B800284B7}" presName="rootConnector" presStyleLbl="node4" presStyleIdx="3" presStyleCnt="4"/>
-      <dgm:spPr/>
-    </dgm:pt>
-    <dgm:pt modelId="{D7B4DF2C-A8FB-444B-8E35-CAD4A529E5C7}" type="pres">
+    <dgm:pt modelId="{9DE0F8BC-3E4C-4AA4-B80E-8926A0FDA87D}" type="pres">
+      <dgm:prSet presAssocID="{A5248CF3-1DC3-4E87-A421-D55B800284B7}" presName="rootConnector" presStyleLbl="node4" presStyleIdx="5" presStyleCnt="6"/>
+      <dgm:spPr/>
+    </dgm:pt>
+    <dgm:pt modelId="{C0EA8574-55A7-4C32-8C83-A8F420724C08}" type="pres">
       <dgm:prSet presAssocID="{A5248CF3-1DC3-4E87-A421-D55B800284B7}" presName="hierChild4" presStyleCnt="0"/>
       <dgm:spPr/>
     </dgm:pt>
-    <dgm:pt modelId="{9E7581E0-197A-4F05-96B4-53DEDF15D9C5}" type="pres">
+    <dgm:pt modelId="{55430F04-6AC7-46E6-B721-A7F0268C3C23}" type="pres">
       <dgm:prSet presAssocID="{A5248CF3-1DC3-4E87-A421-D55B800284B7}" presName="hierChild5" presStyleCnt="0"/>
       <dgm:spPr/>
     </dgm:pt>
-    <dgm:pt modelId="{BE7524E2-41CA-4723-B19F-E9509C8E1A83}" type="pres">
+    <dgm:pt modelId="{3D8509AB-FA16-4611-BC68-DC5D3F9F4A20}" type="pres">
       <dgm:prSet presAssocID="{CCA41351-79F6-4936-AFB6-1937328A6F54}" presName="hierChild5" presStyleCnt="0"/>
       <dgm:spPr/>
     </dgm:pt>
-    <dgm:pt modelId="{14309929-D1B7-4266-B32D-6024E38BC6A5}" type="pres">
+    <dgm:pt modelId="{C3EB5451-523F-44D0-86C6-C983875BA279}" type="pres">
       <dgm:prSet presAssocID="{7B5B1DC2-D922-4B68-8E2A-4053424BE05D}" presName="hierChild5" presStyleCnt="0"/>
       <dgm:spPr/>
     </dgm:pt>
-    <dgm:pt modelId="{6A419CCB-283B-4802-ABF8-4A0D28E5BC62}" type="pres">
+    <dgm:pt modelId="{BCD53EC1-D50A-42AD-9C36-B24B43057AA4}" type="pres">
       <dgm:prSet presAssocID="{8396920C-3169-4771-B7BB-4994DCC59096}" presName="hierChild3" presStyleCnt="0"/>
       <dgm:spPr/>
     </dgm:pt>
   </dgm:ptLst>
   <dgm:cxnLst>
     <dgm:cxn modelId="{E0BD9301-5F69-4E5C-9571-7AC0194A23EB}" srcId="{40B198EF-BA43-44DB-BD4B-37A87B7E44B8}" destId="{C7B405DF-1949-4C59-8A18-961F880D575F}" srcOrd="0" destOrd="0" parTransId="{8FFBF4B1-EC25-4A92-A723-78A723EDC9CB}" sibTransId="{A11573E0-85A2-4222-865C-75CC3076F888}"/>
-    <dgm:cxn modelId="{7591DE13-A203-4C66-997B-1FD97ADF4C0F}" type="presOf" srcId="{68C60DC7-8DD0-47EA-8B48-35AE615F7750}" destId="{A13F3D89-7008-483F-8EFA-85005FE7E7D4}" srcOrd="1" destOrd="0" presId="urn:microsoft.com/office/officeart/2005/8/layout/orgChart1"/>
+    <dgm:cxn modelId="{110C2D09-04B9-4819-92C3-7048B8073B98}" type="presOf" srcId="{40B198EF-BA43-44DB-BD4B-37A87B7E44B8}" destId="{9EEBEB92-64BA-4F7F-98DF-F7F236744EF3}" srcOrd="0" destOrd="0" presId="urn:microsoft.com/office/officeart/2009/3/layout/HorizontalOrganizationChart"/>
     <dgm:cxn modelId="{FD9D7917-E1FD-44C6-9781-3F4380AFDB6A}" srcId="{7B5B1DC2-D922-4B68-8E2A-4053424BE05D}" destId="{3310212A-ACAF-4947-A132-D99367810AD9}" srcOrd="0" destOrd="0" parTransId="{C623E55E-0770-4250-859E-7DE186D8BA48}" sibTransId="{A8E34BFA-1494-4C54-BB64-4E7EAF0694B4}"/>
-    <dgm:cxn modelId="{3E20D919-7C91-41A0-A6F2-21A641AA3500}" type="presOf" srcId="{D82F4CDE-BAB8-4B2D-846B-05C85B9853E6}" destId="{1C32F77C-367C-4538-8F84-98D3D53E7FAB}" srcOrd="0" destOrd="0" presId="urn:microsoft.com/office/officeart/2005/8/layout/orgChart1"/>
-    <dgm:cxn modelId="{1E15F523-F03A-41B7-9799-637FDBA40C72}" type="presOf" srcId="{3310212A-ACAF-4947-A132-D99367810AD9}" destId="{9E88FD70-97B5-4C66-8C96-A5A0E75654B6}" srcOrd="1" destOrd="0" presId="urn:microsoft.com/office/officeart/2005/8/layout/orgChart1"/>
-    <dgm:cxn modelId="{3A59B62E-D1BC-43F8-BD0F-2C88F5E56B76}" type="presOf" srcId="{40B198EF-BA43-44DB-BD4B-37A87B7E44B8}" destId="{182EC3F2-B35A-405E-89C0-5D66F6BE1000}" srcOrd="0" destOrd="0" presId="urn:microsoft.com/office/officeart/2005/8/layout/orgChart1"/>
-    <dgm:cxn modelId="{A8774E34-BBD3-4BEA-964E-53F9958B185F}" type="presOf" srcId="{A923E62B-FB79-47C5-BF65-EB81EDD2FEB4}" destId="{C1262CA0-80B8-4EB7-99F6-FAF49E8EBC4C}" srcOrd="0" destOrd="0" presId="urn:microsoft.com/office/officeart/2005/8/layout/orgChart1"/>
-    <dgm:cxn modelId="{99756136-1507-473D-9B36-23ACA4695881}" type="presOf" srcId="{7B5B1DC2-D922-4B68-8E2A-4053424BE05D}" destId="{5F9C667E-382C-48DC-87C1-0CEC101C97EE}" srcOrd="1" destOrd="0" presId="urn:microsoft.com/office/officeart/2005/8/layout/orgChart1"/>
-    <dgm:cxn modelId="{35301440-EF5C-4145-8AF6-D780708F6AD9}" type="presOf" srcId="{F433B884-445A-4F45-B4A1-9793C3977F9B}" destId="{42831692-6176-4E0A-A015-BAAA55A134D8}" srcOrd="0" destOrd="0" presId="urn:microsoft.com/office/officeart/2005/8/layout/orgChart1"/>
+    <dgm:cxn modelId="{92D5BA1D-18B9-42F0-A41C-6324C00148F2}" type="presOf" srcId="{7B5B1DC2-D922-4B68-8E2A-4053424BE05D}" destId="{07A54363-4941-410F-9CE5-8F873DA957C7}" srcOrd="0" destOrd="0" presId="urn:microsoft.com/office/officeart/2009/3/layout/HorizontalOrganizationChart"/>
+    <dgm:cxn modelId="{48082D21-23C5-4816-A0EE-CD364C825E94}" type="presOf" srcId="{3310212A-ACAF-4947-A132-D99367810AD9}" destId="{04C6AEB2-F547-4703-89D0-7F992B18B45D}" srcOrd="0" destOrd="0" presId="urn:microsoft.com/office/officeart/2009/3/layout/HorizontalOrganizationChart"/>
+    <dgm:cxn modelId="{A7724B23-FF1E-440A-A8EC-2463ED3AB16C}" srcId="{26C50A0C-DE04-4C7C-BF13-EB2359C182BF}" destId="{44A3FB5A-F263-4AC5-AA08-AD741DFFD12E}" srcOrd="0" destOrd="0" parTransId="{D4D69810-C2F9-44AA-8AF3-18DADFCAE27F}" sibTransId="{ABB23F58-7059-4C6F-8D73-B6EA2B0B4E39}"/>
+    <dgm:cxn modelId="{ED397623-D279-4BC1-B892-7B794D784BD8}" type="presOf" srcId="{68C60DC7-8DD0-47EA-8B48-35AE615F7750}" destId="{B53F5FD3-9D20-4E56-897F-80F8244115CC}" srcOrd="1" destOrd="0" presId="urn:microsoft.com/office/officeart/2009/3/layout/HorizontalOrganizationChart"/>
+    <dgm:cxn modelId="{B6DD6E28-6466-48D6-B7FD-069748559366}" type="presOf" srcId="{8396920C-3169-4771-B7BB-4994DCC59096}" destId="{E6352167-7D3A-4477-A66B-E2705E0B25DB}" srcOrd="0" destOrd="0" presId="urn:microsoft.com/office/officeart/2009/3/layout/HorizontalOrganizationChart"/>
+    <dgm:cxn modelId="{05E85228-97B3-4D90-B0DE-E317A2B8B658}" type="presOf" srcId="{A3C20A73-4EEC-4EC6-A165-8DDE5BF23001}" destId="{F0B1AE00-5C2D-4A6F-8CFB-7FFE77D8802E}" srcOrd="0" destOrd="0" presId="urn:microsoft.com/office/officeart/2009/3/layout/HorizontalOrganizationChart"/>
+    <dgm:cxn modelId="{1C6CDF31-6D61-4EFD-A8BA-DB5FDCA68721}" type="presOf" srcId="{26C50A0C-DE04-4C7C-BF13-EB2359C182BF}" destId="{19B29335-EA1A-49EE-974D-F0C5AD5FD79F}" srcOrd="0" destOrd="0" presId="urn:microsoft.com/office/officeart/2009/3/layout/HorizontalOrganizationChart"/>
+    <dgm:cxn modelId="{3D40943A-9ED8-4051-A8A8-2D35421EEC57}" type="presOf" srcId="{CCA41351-79F6-4936-AFB6-1937328A6F54}" destId="{C238B933-BB36-47A8-A22A-A8E781F88161}" srcOrd="1" destOrd="0" presId="urn:microsoft.com/office/officeart/2009/3/layout/HorizontalOrganizationChart"/>
+    <dgm:cxn modelId="{AB66F03B-F330-427F-AFB4-607C26300A6F}" type="presOf" srcId="{CBFC3123-1110-4071-8BDE-3B7E5A5DCB46}" destId="{A6277117-3F34-41FC-A085-2A156C5D63BE}" srcOrd="0" destOrd="0" presId="urn:microsoft.com/office/officeart/2009/3/layout/HorizontalOrganizationChart"/>
+    <dgm:cxn modelId="{833C443E-47BA-4D51-9A0F-4F391A0F8793}" type="presOf" srcId="{8FFBF4B1-EC25-4A92-A723-78A723EDC9CB}" destId="{06C21965-8E71-4FE4-8ABE-1C052EE030C1}" srcOrd="0" destOrd="0" presId="urn:microsoft.com/office/officeart/2009/3/layout/HorizontalOrganizationChart"/>
     <dgm:cxn modelId="{F3AAA840-C602-4364-8815-619F12B724F0}" srcId="{3310212A-ACAF-4947-A132-D99367810AD9}" destId="{68C60DC7-8DD0-47EA-8B48-35AE615F7750}" srcOrd="0" destOrd="0" parTransId="{A3C20A73-4EEC-4EC6-A165-8DDE5BF23001}" sibTransId="{E4D5C820-1FBF-4495-A5DB-D50EEC2B0DE2}"/>
     <dgm:cxn modelId="{6BC8B75C-831F-4A16-B0CE-284E8219F7A1}" srcId="{FF4D8BB2-5403-48BE-8B17-203802C420C9}" destId="{FB747F19-D2CD-4825-AFA0-FB3DF776A210}" srcOrd="0" destOrd="0" parTransId="{722513B3-4019-43ED-BBAD-CE985D5701B1}" sibTransId="{7D772C9C-952E-4C97-958D-867EE394D226}"/>
     <dgm:cxn modelId="{5D9DE95C-758F-458F-A03B-5863382715EB}" srcId="{CCA41351-79F6-4936-AFB6-1937328A6F54}" destId="{A5248CF3-1DC3-4E87-A421-D55B800284B7}" srcOrd="0" destOrd="0" parTransId="{CBFC3123-1110-4071-8BDE-3B7E5A5DCB46}" sibTransId="{026137D2-ECB9-49DA-B3F5-C699BC115DC6}"/>
-    <dgm:cxn modelId="{A14B7462-B88D-45EE-BE05-7E6A4D2CCF1F}" type="presOf" srcId="{F882E918-E857-4351-B6CD-6E05A13BB8C5}" destId="{20E1757A-DC25-423D-96D1-5AB436AB4245}" srcOrd="0" destOrd="0" presId="urn:microsoft.com/office/officeart/2005/8/layout/orgChart1"/>
+    <dgm:cxn modelId="{35084944-2CCC-475C-A68B-F960315934B2}" type="presOf" srcId="{D82F4CDE-BAB8-4B2D-846B-05C85B9853E6}" destId="{48540270-B1BB-48C9-B2A0-F938D5E4DB34}" srcOrd="0" destOrd="0" presId="urn:microsoft.com/office/officeart/2009/3/layout/HorizontalOrganizationChart"/>
+    <dgm:cxn modelId="{38651745-B8D0-4102-842F-BD368E01E4BA}" type="presOf" srcId="{A5248CF3-1DC3-4E87-A421-D55B800284B7}" destId="{9DE0F8BC-3E4C-4AA4-B80E-8926A0FDA87D}" srcOrd="1" destOrd="0" presId="urn:microsoft.com/office/officeart/2009/3/layout/HorizontalOrganizationChart"/>
+    <dgm:cxn modelId="{0E67D965-B416-4895-B701-941CD4FCAA0F}" type="presOf" srcId="{7B5B1DC2-D922-4B68-8E2A-4053424BE05D}" destId="{4252A706-1508-444F-A356-0BC68A0369C5}" srcOrd="1" destOrd="0" presId="urn:microsoft.com/office/officeart/2009/3/layout/HorizontalOrganizationChart"/>
     <dgm:cxn modelId="{545A0F46-060D-4510-9AC8-600F7AF0A3A5}" srcId="{7B5B1DC2-D922-4B68-8E2A-4053424BE05D}" destId="{CCA41351-79F6-4936-AFB6-1937328A6F54}" srcOrd="1" destOrd="0" parTransId="{804C8A1E-4003-43F0-854D-CFE0E86D7F26}" sibTransId="{48072A61-AD9B-4ABE-A34F-B10A1E12E8CE}"/>
-    <dgm:cxn modelId="{4359B066-A051-444B-909F-2ED90F59A1F4}" type="presOf" srcId="{26C50A0C-DE04-4C7C-BF13-EB2359C182BF}" destId="{BA7D9017-BE78-4294-9105-5AD2EE4FE16C}" srcOrd="1" destOrd="0" presId="urn:microsoft.com/office/officeart/2005/8/layout/orgChart1"/>
-    <dgm:cxn modelId="{EA3EDA6C-C8BA-4F09-B241-5F8A6925F9B2}" type="presOf" srcId="{3310212A-ACAF-4947-A132-D99367810AD9}" destId="{477D82C5-868E-4739-BDE3-048B427566B6}" srcOrd="0" destOrd="0" presId="urn:microsoft.com/office/officeart/2005/8/layout/orgChart1"/>
-    <dgm:cxn modelId="{DE75A76D-1794-4419-AAFE-0F5D59C26F13}" type="presOf" srcId="{A5248CF3-1DC3-4E87-A421-D55B800284B7}" destId="{A8E37AB3-3CC0-4F25-A8E1-5467D1D780EC}" srcOrd="1" destOrd="0" presId="urn:microsoft.com/office/officeart/2005/8/layout/orgChart1"/>
-    <dgm:cxn modelId="{3CB50071-7A2B-47CB-8D0B-45BE2331E131}" type="presOf" srcId="{FF4D8BB2-5403-48BE-8B17-203802C420C9}" destId="{F54442B5-EF5D-4913-B8E8-81B98204AC46}" srcOrd="0" destOrd="0" presId="urn:microsoft.com/office/officeart/2005/8/layout/orgChart1"/>
-    <dgm:cxn modelId="{ADB10451-DA20-4786-A062-20991A735118}" type="presOf" srcId="{26C50A0C-DE04-4C7C-BF13-EB2359C182BF}" destId="{B2813BFB-0200-4D81-9EB0-C2F21B13BBFF}" srcOrd="0" destOrd="0" presId="urn:microsoft.com/office/officeart/2005/8/layout/orgChart1"/>
-    <dgm:cxn modelId="{A0F59872-0C01-43F8-9570-1C0589122EF6}" type="presOf" srcId="{8396920C-3169-4771-B7BB-4994DCC59096}" destId="{DDC74B35-F776-4B58-AE94-BF078DE83068}" srcOrd="0" destOrd="0" presId="urn:microsoft.com/office/officeart/2005/8/layout/orgChart1"/>
-    <dgm:cxn modelId="{AF5A0D77-A33B-4D1D-A5BD-671CECB9451A}" type="presOf" srcId="{68C60DC7-8DD0-47EA-8B48-35AE615F7750}" destId="{75BD0541-2DEA-4CCE-9B3F-6C335E44344F}" srcOrd="0" destOrd="0" presId="urn:microsoft.com/office/officeart/2005/8/layout/orgChart1"/>
-    <dgm:cxn modelId="{00803358-ABEA-4AE6-A909-6974D0E83146}" type="presOf" srcId="{C623E55E-0770-4250-859E-7DE186D8BA48}" destId="{2096A139-1797-48FB-BA03-C753AED9B4BC}" srcOrd="0" destOrd="0" presId="urn:microsoft.com/office/officeart/2005/8/layout/orgChart1"/>
-    <dgm:cxn modelId="{47A6A878-47C6-4DA1-B0BC-3BA1B1396D73}" type="presOf" srcId="{706452E8-8F2C-470F-87CF-A4C6ABA9D32E}" destId="{6FCCB28E-19E0-46DC-9AE0-C29420DD7A81}" srcOrd="0" destOrd="0" presId="urn:microsoft.com/office/officeart/2005/8/layout/orgChart1"/>
-    <dgm:cxn modelId="{9724ED7D-2456-4C5D-994F-24EBDF1B2DD5}" type="presOf" srcId="{16E212FF-DF36-4E89-B191-6F0CEA1DBB3F}" destId="{6D2253F2-45D8-44E7-B1A5-4067573F858E}" srcOrd="0" destOrd="0" presId="urn:microsoft.com/office/officeart/2005/8/layout/orgChart1"/>
-    <dgm:cxn modelId="{39444581-7CCD-4C02-BEFB-61BFF54093A5}" type="presOf" srcId="{C7B405DF-1949-4C59-8A18-961F880D575F}" destId="{AEE05A7A-8B14-4734-B453-5C022F840F4C}" srcOrd="1" destOrd="0" presId="urn:microsoft.com/office/officeart/2005/8/layout/orgChart1"/>
-    <dgm:cxn modelId="{372E698D-28BA-4752-A5C8-C1DB2E1E60D0}" type="presOf" srcId="{804C8A1E-4003-43F0-854D-CFE0E86D7F26}" destId="{5513AC60-615D-409B-A023-48E7C7ADF565}" srcOrd="0" destOrd="0" presId="urn:microsoft.com/office/officeart/2005/8/layout/orgChart1"/>
+    <dgm:cxn modelId="{7704D468-1F82-482A-8DEA-87AD2C7A0965}" type="presOf" srcId="{68C60DC7-8DD0-47EA-8B48-35AE615F7750}" destId="{0A81819E-C38C-4A98-A87A-5A41BF26BE12}" srcOrd="0" destOrd="0" presId="urn:microsoft.com/office/officeart/2009/3/layout/HorizontalOrganizationChart"/>
+    <dgm:cxn modelId="{9186B270-C2BE-482C-83D3-73C941AB3E8D}" type="presOf" srcId="{D4D69810-C2F9-44AA-8AF3-18DADFCAE27F}" destId="{D9BBDF49-6C14-4068-B186-F5BB8193E5F5}" srcOrd="0" destOrd="0" presId="urn:microsoft.com/office/officeart/2009/3/layout/HorizontalOrganizationChart"/>
+    <dgm:cxn modelId="{931DDF50-D854-4103-AA8B-A3485D25161C}" type="presOf" srcId="{A5248CF3-1DC3-4E87-A421-D55B800284B7}" destId="{0E2FB7D6-70A8-464D-ABBF-03E157F2E1A3}" srcOrd="0" destOrd="0" presId="urn:microsoft.com/office/officeart/2009/3/layout/HorizontalOrganizationChart"/>
+    <dgm:cxn modelId="{759F9171-8B20-4A69-9F7D-FE325F94D34F}" type="presOf" srcId="{1D64AF39-FB9E-4063-8DDD-AA62A730B8B8}" destId="{841FC3F0-EDEE-47D9-A7AB-E44779B97831}" srcOrd="0" destOrd="0" presId="urn:microsoft.com/office/officeart/2009/3/layout/HorizontalOrganizationChart"/>
+    <dgm:cxn modelId="{5F480175-BCB4-45FA-9A9A-666C5B461BF7}" type="presOf" srcId="{FB747F19-D2CD-4825-AFA0-FB3DF776A210}" destId="{AFA6C30E-C18F-423D-9B5D-B4A720213DDA}" srcOrd="0" destOrd="0" presId="urn:microsoft.com/office/officeart/2009/3/layout/HorizontalOrganizationChart"/>
+    <dgm:cxn modelId="{07C22575-A35C-4A9D-8F6F-A5A8DF4E3394}" type="presOf" srcId="{40B198EF-BA43-44DB-BD4B-37A87B7E44B8}" destId="{E7E042BC-0EFB-483E-8DE0-22B31E909877}" srcOrd="1" destOrd="0" presId="urn:microsoft.com/office/officeart/2009/3/layout/HorizontalOrganizationChart"/>
+    <dgm:cxn modelId="{F9B9F255-190A-447E-AB77-A2DAC3942988}" type="presOf" srcId="{44A3FB5A-F263-4AC5-AA08-AD741DFFD12E}" destId="{F9345731-A502-4891-BFEB-0D0B72ED1BD9}" srcOrd="0" destOrd="0" presId="urn:microsoft.com/office/officeart/2009/3/layout/HorizontalOrganizationChart"/>
+    <dgm:cxn modelId="{AEE2E458-052D-4150-B0CB-154C5209756B}" type="presOf" srcId="{44A3FB5A-F263-4AC5-AA08-AD741DFFD12E}" destId="{52F75EBA-DB25-4744-8C7A-70B18B2035E3}" srcOrd="1" destOrd="0" presId="urn:microsoft.com/office/officeart/2009/3/layout/HorizontalOrganizationChart"/>
+    <dgm:cxn modelId="{679B867F-1B3B-42F2-861C-31788A1863A7}" type="presOf" srcId="{F882E918-E857-4351-B6CD-6E05A13BB8C5}" destId="{918711BF-84CD-43C5-A9E0-8CE2EEFD00C4}" srcOrd="0" destOrd="0" presId="urn:microsoft.com/office/officeart/2009/3/layout/HorizontalOrganizationChart"/>
+    <dgm:cxn modelId="{BD162B87-C70A-432D-AA81-13A5B366CEC4}" type="presOf" srcId="{16E212FF-DF36-4E89-B191-6F0CEA1DBB3F}" destId="{19F42125-481B-44CC-99B3-E553D8BC9BEB}" srcOrd="0" destOrd="0" presId="urn:microsoft.com/office/officeart/2009/3/layout/HorizontalOrganizationChart"/>
+    <dgm:cxn modelId="{1164CC8A-3D04-4692-BB81-11A4219817B8}" type="presOf" srcId="{C7B405DF-1949-4C59-8A18-961F880D575F}" destId="{642D27FE-2E27-4958-A358-B5CB93F05DF0}" srcOrd="0" destOrd="0" presId="urn:microsoft.com/office/officeart/2009/3/layout/HorizontalOrganizationChart"/>
+    <dgm:cxn modelId="{A053748F-ACEC-4B61-9B38-AF30AB8B6B34}" type="presOf" srcId="{FB747F19-D2CD-4825-AFA0-FB3DF776A210}" destId="{202C862B-6195-49DD-B879-07A868203B08}" srcOrd="1" destOrd="0" presId="urn:microsoft.com/office/officeart/2009/3/layout/HorizontalOrganizationChart"/>
     <dgm:cxn modelId="{FC622993-C099-4173-9D0E-6E4F459BDCAC}" srcId="{40B198EF-BA43-44DB-BD4B-37A87B7E44B8}" destId="{FF4D8BB2-5403-48BE-8B17-203802C420C9}" srcOrd="1" destOrd="0" parTransId="{81D967CB-E781-4C96-800C-4CB9C45E1116}" sibTransId="{9A021378-8244-4129-A4FA-2CB66DD3B06D}"/>
-    <dgm:cxn modelId="{82961D94-4735-4620-BB0B-31ED7C290E7D}" type="presOf" srcId="{722513B3-4019-43ED-BBAD-CE985D5701B1}" destId="{D331CBC7-0A66-4857-943E-3664A559C4F0}" srcOrd="0" destOrd="0" presId="urn:microsoft.com/office/officeart/2005/8/layout/orgChart1"/>
     <dgm:cxn modelId="{3DABF894-A6E9-4A60-825E-C9427391E2CB}" srcId="{8396920C-3169-4771-B7BB-4994DCC59096}" destId="{34777A62-5E62-42FE-A095-011F140C7BB6}" srcOrd="0" destOrd="0" parTransId="{F882E918-E857-4351-B6CD-6E05A13BB8C5}" sibTransId="{3573D714-9E24-46E9-8802-5428B994ED49}"/>
-    <dgm:cxn modelId="{6BFDA897-F181-4716-BBD9-42FDB4422A36}" type="presOf" srcId="{CCA41351-79F6-4936-AFB6-1937328A6F54}" destId="{2A4B1988-9185-48F2-9015-0EE8EF0C6CA1}" srcOrd="0" destOrd="0" presId="urn:microsoft.com/office/officeart/2005/8/layout/orgChart1"/>
     <dgm:cxn modelId="{01EDF697-0CF5-43B1-A9C7-8BADE8FDCFED}" srcId="{8396920C-3169-4771-B7BB-4994DCC59096}" destId="{40B198EF-BA43-44DB-BD4B-37A87B7E44B8}" srcOrd="1" destOrd="0" parTransId="{F433B884-445A-4F45-B4A1-9793C3977F9B}" sibTransId="{22637682-738B-4AFE-81FD-8A265D0A8C62}"/>
     <dgm:cxn modelId="{D2BC049B-686B-4DFE-90D0-F1BE0D3A23CA}" srcId="{8396920C-3169-4771-B7BB-4994DCC59096}" destId="{7B5B1DC2-D922-4B68-8E2A-4053424BE05D}" srcOrd="2" destOrd="0" parTransId="{16E212FF-DF36-4E89-B191-6F0CEA1DBB3F}" sibTransId="{4445B3A1-E508-4BB2-85D3-02219EC38A0C}"/>
-    <dgm:cxn modelId="{9D4700A1-4B9F-47AF-BF00-FEA2F5815B65}" type="presOf" srcId="{81D967CB-E781-4C96-800C-4CB9C45E1116}" destId="{9DCFFC93-9DF2-4873-9C44-CDD86397B319}" srcOrd="0" destOrd="0" presId="urn:microsoft.com/office/officeart/2005/8/layout/orgChart1"/>
-    <dgm:cxn modelId="{025189A3-6728-40D3-8162-204BB90D686A}" type="presOf" srcId="{FB747F19-D2CD-4825-AFA0-FB3DF776A210}" destId="{FA9D6615-828E-41CA-9EAA-77523A215200}" srcOrd="0" destOrd="0" presId="urn:microsoft.com/office/officeart/2005/8/layout/orgChart1"/>
-    <dgm:cxn modelId="{7CF194A3-1807-4152-9141-049E06FD3858}" type="presOf" srcId="{34777A62-5E62-42FE-A095-011F140C7BB6}" destId="{0926DA84-816A-4FB4-841C-889999C7EB10}" srcOrd="1" destOrd="0" presId="urn:microsoft.com/office/officeart/2005/8/layout/orgChart1"/>
-    <dgm:cxn modelId="{6C2637AB-82CA-4F53-A3E2-B33A5A436B10}" type="presOf" srcId="{34777A62-5E62-42FE-A095-011F140C7BB6}" destId="{3569DE56-31A2-418A-9A41-6CFB902B0BE4}" srcOrd="0" destOrd="0" presId="urn:microsoft.com/office/officeart/2005/8/layout/orgChart1"/>
+    <dgm:cxn modelId="{532E429D-4781-462E-8F06-3623A8EFC89F}" type="presOf" srcId="{3310212A-ACAF-4947-A132-D99367810AD9}" destId="{A0E0E8EB-EAD6-4268-9DBD-F6403E7F0AE6}" srcOrd="1" destOrd="0" presId="urn:microsoft.com/office/officeart/2009/3/layout/HorizontalOrganizationChart"/>
+    <dgm:cxn modelId="{59A51C9E-6420-499A-A93C-7D9A8AF323F0}" type="presOf" srcId="{A17B5BD0-4847-4A0F-B391-B53EC929A85F}" destId="{D3422F85-F88E-4703-A67C-44BF2E357661}" srcOrd="1" destOrd="0" presId="urn:microsoft.com/office/officeart/2009/3/layout/HorizontalOrganizationChart"/>
+    <dgm:cxn modelId="{EFF8B5A3-D894-4C2C-9563-4FF46119FE33}" type="presOf" srcId="{F433B884-445A-4F45-B4A1-9793C3977F9B}" destId="{DAB85FB9-BC47-47AC-922F-C97E272C5E93}" srcOrd="0" destOrd="0" presId="urn:microsoft.com/office/officeart/2009/3/layout/HorizontalOrganizationChart"/>
+    <dgm:cxn modelId="{1A7F38AA-00CE-4310-AAB6-E6816C6EAA0F}" type="presOf" srcId="{C7B405DF-1949-4C59-8A18-961F880D575F}" destId="{757C9A4B-1E2B-458E-B7B5-1A48FC2B7C07}" srcOrd="1" destOrd="0" presId="urn:microsoft.com/office/officeart/2009/3/layout/HorizontalOrganizationChart"/>
+    <dgm:cxn modelId="{50EE83AF-7418-40A6-A25C-93F0E8491D74}" type="presOf" srcId="{C623E55E-0770-4250-859E-7DE186D8BA48}" destId="{BF9DC53F-CBC0-4A33-83D4-E7995A0B517A}" srcOrd="0" destOrd="0" presId="urn:microsoft.com/office/officeart/2009/3/layout/HorizontalOrganizationChart"/>
     <dgm:cxn modelId="{F81EECB0-1D39-44C1-8897-52663DA60317}" srcId="{34777A62-5E62-42FE-A095-011F140C7BB6}" destId="{1D64AF39-FB9E-4063-8DDD-AA62A730B8B8}" srcOrd="0" destOrd="0" parTransId="{D82F4CDE-BAB8-4B2D-846B-05C85B9853E6}" sibTransId="{F4BC947F-884C-4141-A1CD-9628CC56799D}"/>
-    <dgm:cxn modelId="{6E3D3AB7-D13F-448A-8C51-14964B040FF9}" type="presOf" srcId="{C7B405DF-1949-4C59-8A18-961F880D575F}" destId="{536AECD9-A66E-4912-87A4-35FC734D2EB3}" srcOrd="0" destOrd="0" presId="urn:microsoft.com/office/officeart/2005/8/layout/orgChart1"/>
-    <dgm:cxn modelId="{F6AB19C0-617B-42ED-A8FF-3766640D25AC}" type="presOf" srcId="{7B5B1DC2-D922-4B68-8E2A-4053424BE05D}" destId="{33E261C2-582A-4DB8-8546-0EC85D0646AF}" srcOrd="0" destOrd="0" presId="urn:microsoft.com/office/officeart/2005/8/layout/orgChart1"/>
-    <dgm:cxn modelId="{F3D22BC1-2E36-47D7-B873-977CC05A12ED}" type="presOf" srcId="{8396920C-3169-4771-B7BB-4994DCC59096}" destId="{6DEAC490-12B6-44E6-94C0-31C85A701296}" srcOrd="1" destOrd="0" presId="urn:microsoft.com/office/officeart/2005/8/layout/orgChart1"/>
-    <dgm:cxn modelId="{831A18CF-63EE-41D2-B060-3628A72320BD}" type="presOf" srcId="{8FFBF4B1-EC25-4A92-A723-78A723EDC9CB}" destId="{156A4072-A85A-423E-9D38-4D25D31BE6EF}" srcOrd="0" destOrd="0" presId="urn:microsoft.com/office/officeart/2005/8/layout/orgChart1"/>
-    <dgm:cxn modelId="{E95960D3-2673-42AF-B77B-5359C1C7683A}" type="presOf" srcId="{A3C20A73-4EEC-4EC6-A165-8DDE5BF23001}" destId="{ABC704CA-6BDD-4333-A596-9640100AD48A}" srcOrd="0" destOrd="0" presId="urn:microsoft.com/office/officeart/2005/8/layout/orgChart1"/>
-    <dgm:cxn modelId="{A12582D5-9CE3-4A09-A01F-4027554E7CC1}" type="presOf" srcId="{FF4D8BB2-5403-48BE-8B17-203802C420C9}" destId="{D4088547-5D75-4D24-BDF8-455868A89074}" srcOrd="1" destOrd="0" presId="urn:microsoft.com/office/officeart/2005/8/layout/orgChart1"/>
-    <dgm:cxn modelId="{1CF3EDDD-233F-4C77-BCCE-FBBA4FDD5E9C}" type="presOf" srcId="{40B198EF-BA43-44DB-BD4B-37A87B7E44B8}" destId="{C85761D3-9CED-4057-A794-7877E9FEBF65}" srcOrd="1" destOrd="0" presId="urn:microsoft.com/office/officeart/2005/8/layout/orgChart1"/>
-    <dgm:cxn modelId="{FCD2DDDE-4882-4FB3-9CD8-5276377D0456}" type="presOf" srcId="{1D64AF39-FB9E-4063-8DDD-AA62A730B8B8}" destId="{BE755F3F-46AA-4033-A029-69A8BFAA9D25}" srcOrd="1" destOrd="0" presId="urn:microsoft.com/office/officeart/2005/8/layout/orgChart1"/>
-    <dgm:cxn modelId="{DCDEF8DE-D134-4809-A556-9A1BEDDA9F6C}" type="presOf" srcId="{FB747F19-D2CD-4825-AFA0-FB3DF776A210}" destId="{EC0F22A7-D22F-4CF5-BE00-BBEF64D939D1}" srcOrd="1" destOrd="0" presId="urn:microsoft.com/office/officeart/2005/8/layout/orgChart1"/>
-    <dgm:cxn modelId="{B0F998E3-06CC-4650-8C56-8BF5F1470303}" type="presOf" srcId="{A5248CF3-1DC3-4E87-A421-D55B800284B7}" destId="{0DD69810-8220-4F21-8267-18E93820F012}" srcOrd="0" destOrd="0" presId="urn:microsoft.com/office/officeart/2005/8/layout/orgChart1"/>
-    <dgm:cxn modelId="{FCDD2DEA-21B4-490C-9D05-617EBF3BA373}" type="presOf" srcId="{1D64AF39-FB9E-4063-8DDD-AA62A730B8B8}" destId="{C842B172-73B0-4D3E-882A-A1AAAED9E9BF}" srcOrd="0" destOrd="0" presId="urn:microsoft.com/office/officeart/2005/8/layout/orgChart1"/>
+    <dgm:cxn modelId="{0979FFB2-1326-4706-BFCF-579469F40EF5}" type="presOf" srcId="{A923E62B-FB79-47C5-BF65-EB81EDD2FEB4}" destId="{C3089668-FABE-422F-A64A-A91B789443FE}" srcOrd="0" destOrd="0" presId="urn:microsoft.com/office/officeart/2009/3/layout/HorizontalOrganizationChart"/>
+    <dgm:cxn modelId="{B1E836B4-A14B-4EF3-B73E-B22A96BB7315}" type="presOf" srcId="{1D64AF39-FB9E-4063-8DDD-AA62A730B8B8}" destId="{FEE50AE1-E8FE-477F-84D1-9326E3970B79}" srcOrd="1" destOrd="0" presId="urn:microsoft.com/office/officeart/2009/3/layout/HorizontalOrganizationChart"/>
+    <dgm:cxn modelId="{EA4116B5-5F34-4F65-A8EF-1AC7A5E0C12F}" type="presOf" srcId="{CCA41351-79F6-4936-AFB6-1937328A6F54}" destId="{D5305652-E4D4-40D1-95A8-42CA882204F8}" srcOrd="0" destOrd="0" presId="urn:microsoft.com/office/officeart/2009/3/layout/HorizontalOrganizationChart"/>
+    <dgm:cxn modelId="{0EE35CC1-EA50-4045-A631-CE21C3756182}" type="presOf" srcId="{34777A62-5E62-42FE-A095-011F140C7BB6}" destId="{D4D3088E-F816-4DB7-B82A-AAD62057124A}" srcOrd="0" destOrd="0" presId="urn:microsoft.com/office/officeart/2009/3/layout/HorizontalOrganizationChart"/>
+    <dgm:cxn modelId="{9CA47CC1-1C98-4E18-907D-F2D5C98E5FA1}" type="presOf" srcId="{A17B5BD0-4847-4A0F-B391-B53EC929A85F}" destId="{566A5AD3-189C-4E39-8EA7-AF8865469DB1}" srcOrd="0" destOrd="0" presId="urn:microsoft.com/office/officeart/2009/3/layout/HorizontalOrganizationChart"/>
+    <dgm:cxn modelId="{ED5E25C5-090D-44E2-8BFD-7298228E363C}" type="presOf" srcId="{FF4D8BB2-5403-48BE-8B17-203802C420C9}" destId="{4D46CBD9-7226-4C0F-A94A-2615771A1793}" srcOrd="0" destOrd="0" presId="urn:microsoft.com/office/officeart/2009/3/layout/HorizontalOrganizationChart"/>
+    <dgm:cxn modelId="{DB0520CF-EAA7-4B9F-A167-CE41F8BBAE25}" type="presOf" srcId="{8396920C-3169-4771-B7BB-4994DCC59096}" destId="{D7DF3DCE-8825-4D2A-92DB-E63821F527AF}" srcOrd="1" destOrd="0" presId="urn:microsoft.com/office/officeart/2009/3/layout/HorizontalOrganizationChart"/>
+    <dgm:cxn modelId="{148EFFD4-851F-481F-A8B6-6EBCD5037E45}" type="presOf" srcId="{CC4680DF-C446-424D-BB39-07A31D69C025}" destId="{C3F9B5C3-053A-46D8-A966-DA2D4DCF84B3}" srcOrd="0" destOrd="0" presId="urn:microsoft.com/office/officeart/2009/3/layout/HorizontalOrganizationChart"/>
+    <dgm:cxn modelId="{A0F5A6D8-AE60-4BA0-9A27-89C5995CCC69}" type="presOf" srcId="{722513B3-4019-43ED-BBAD-CE985D5701B1}" destId="{66065974-BED5-4F32-B122-0F132D186B02}" srcOrd="0" destOrd="0" presId="urn:microsoft.com/office/officeart/2009/3/layout/HorizontalOrganizationChart"/>
+    <dgm:cxn modelId="{6CEA99DC-9A38-46BC-9CD2-F1FF3A43CBCC}" type="presOf" srcId="{FF4D8BB2-5403-48BE-8B17-203802C420C9}" destId="{CEDFCCCB-F4D4-4761-A537-1C600AF25EAC}" srcOrd="1" destOrd="0" presId="urn:microsoft.com/office/officeart/2009/3/layout/HorizontalOrganizationChart"/>
+    <dgm:cxn modelId="{AD8539E4-0C3B-4BAA-8944-1C6A7661BF06}" type="presOf" srcId="{804C8A1E-4003-43F0-854D-CFE0E86D7F26}" destId="{BCF42F37-0E36-4187-AFCB-4D47451E539F}" srcOrd="0" destOrd="0" presId="urn:microsoft.com/office/officeart/2009/3/layout/HorizontalOrganizationChart"/>
+    <dgm:cxn modelId="{03AD15E5-5112-40ED-9009-04597CCE3078}" type="presOf" srcId="{81D967CB-E781-4C96-800C-4CB9C45E1116}" destId="{E31E7DC3-EA3F-4D42-B094-2C5B08161DDA}" srcOrd="0" destOrd="0" presId="urn:microsoft.com/office/officeart/2009/3/layout/HorizontalOrganizationChart"/>
+    <dgm:cxn modelId="{BE85D4E7-7F1F-4BA5-9F77-E7C4467EE847}" type="presOf" srcId="{706452E8-8F2C-470F-87CF-A4C6ABA9D32E}" destId="{945CA7E0-FF80-4909-8797-47A74094211B}" srcOrd="0" destOrd="0" presId="urn:microsoft.com/office/officeart/2009/3/layout/HorizontalOrganizationChart"/>
     <dgm:cxn modelId="{F1B5FCEA-866C-4334-9498-3A73A0275A43}" srcId="{C7B405DF-1949-4C59-8A18-961F880D575F}" destId="{26C50A0C-DE04-4C7C-BF13-EB2359C182BF}" srcOrd="0" destOrd="0" parTransId="{706452E8-8F2C-470F-87CF-A4C6ABA9D32E}" sibTransId="{CCFA9A29-0135-4720-80DF-A37D3AA5D5B5}"/>
-    <dgm:cxn modelId="{0AC78FEE-E9C7-425E-89C3-0DC3D53B5AF7}" type="presOf" srcId="{CBFC3123-1110-4071-8BDE-3B7E5A5DCB46}" destId="{71031FBC-F8B1-4FCC-801B-FC7BFF56876E}" srcOrd="0" destOrd="0" presId="urn:microsoft.com/office/officeart/2005/8/layout/orgChart1"/>
+    <dgm:cxn modelId="{4896E0ED-8E82-4566-B90C-CAE9B90748AF}" srcId="{68C60DC7-8DD0-47EA-8B48-35AE615F7750}" destId="{A17B5BD0-4847-4A0F-B391-B53EC929A85F}" srcOrd="0" destOrd="0" parTransId="{CC4680DF-C446-424D-BB39-07A31D69C025}" sibTransId="{466F6466-5180-4DFB-A9C4-13192081A444}"/>
+    <dgm:cxn modelId="{316D0CF8-F7D6-4358-9DFE-2CCEF60E9ED0}" type="presOf" srcId="{34777A62-5E62-42FE-A095-011F140C7BB6}" destId="{7F9B315E-A05F-4DE9-ACCF-AAFEE6A8F164}" srcOrd="1" destOrd="0" presId="urn:microsoft.com/office/officeart/2009/3/layout/HorizontalOrganizationChart"/>
+    <dgm:cxn modelId="{16D75DFA-E67F-4140-BBBF-2A5BB1818514}" type="presOf" srcId="{26C50A0C-DE04-4C7C-BF13-EB2359C182BF}" destId="{3D37B79B-B2ED-41DD-AEC5-F37FD3228196}" srcOrd="1" destOrd="0" presId="urn:microsoft.com/office/officeart/2009/3/layout/HorizontalOrganizationChart"/>
     <dgm:cxn modelId="{DA0724FB-3E77-48FE-81AF-438B8E62DB7E}" srcId="{A923E62B-FB79-47C5-BF65-EB81EDD2FEB4}" destId="{8396920C-3169-4771-B7BB-4994DCC59096}" srcOrd="0" destOrd="0" parTransId="{0F405A9A-A17C-43EE-91C1-A02C32866235}" sibTransId="{1D1BF20C-2A2E-4BCC-9E25-779CEDF1CDF4}"/>
-    <dgm:cxn modelId="{C50EA3FF-0B86-4661-BDBC-5D23744F22BC}" type="presOf" srcId="{CCA41351-79F6-4936-AFB6-1937328A6F54}" destId="{081B2FAD-3B78-43A6-AE13-693DCED095F5}" srcOrd="1" destOrd="0" presId="urn:microsoft.com/office/officeart/2005/8/layout/orgChart1"/>
-    <dgm:cxn modelId="{E89D7A69-12E2-4F42-B5C4-9D2D5A157BD8}" type="presParOf" srcId="{C1262CA0-80B8-4EB7-99F6-FAF49E8EBC4C}" destId="{083CB416-6E25-4BE2-BECC-1C99503CE5E2}" srcOrd="0" destOrd="0" presId="urn:microsoft.com/office/officeart/2005/8/layout/orgChart1"/>
-    <dgm:cxn modelId="{8C40568C-988E-49DE-ACB2-B24654C3A32C}" type="presParOf" srcId="{083CB416-6E25-4BE2-BECC-1C99503CE5E2}" destId="{890962D6-7BEF-4933-B122-D2FDA3CE3BDA}" srcOrd="0" destOrd="0" presId="urn:microsoft.com/office/officeart/2005/8/layout/orgChart1"/>
-    <dgm:cxn modelId="{2B161F37-34B4-45DD-90F7-4B6D28BADA0F}" type="presParOf" srcId="{890962D6-7BEF-4933-B122-D2FDA3CE3BDA}" destId="{DDC74B35-F776-4B58-AE94-BF078DE83068}" srcOrd="0" destOrd="0" presId="urn:microsoft.com/office/officeart/2005/8/layout/orgChart1"/>
-    <dgm:cxn modelId="{636CC327-6E3C-4073-8F1F-C9BC41BD678D}" type="presParOf" srcId="{890962D6-7BEF-4933-B122-D2FDA3CE3BDA}" destId="{6DEAC490-12B6-44E6-94C0-31C85A701296}" srcOrd="1" destOrd="0" presId="urn:microsoft.com/office/officeart/2005/8/layout/orgChart1"/>
-    <dgm:cxn modelId="{4B603B98-D360-48F4-B5D8-0A7C62E0E7FD}" type="presParOf" srcId="{083CB416-6E25-4BE2-BECC-1C99503CE5E2}" destId="{BF99EE86-EB9B-402E-8B76-E951801770D9}" srcOrd="1" destOrd="0" presId="urn:microsoft.com/office/officeart/2005/8/layout/orgChart1"/>
-    <dgm:cxn modelId="{06BD2BEE-443D-4390-BD81-24585473A267}" type="presParOf" srcId="{BF99EE86-EB9B-402E-8B76-E951801770D9}" destId="{20E1757A-DC25-423D-96D1-5AB436AB4245}" srcOrd="0" destOrd="0" presId="urn:microsoft.com/office/officeart/2005/8/layout/orgChart1"/>
-    <dgm:cxn modelId="{973A3968-686E-44A3-A25A-41D983C146DB}" type="presParOf" srcId="{BF99EE86-EB9B-402E-8B76-E951801770D9}" destId="{DD0E2A46-AD98-4F37-BCEC-51068F437533}" srcOrd="1" destOrd="0" presId="urn:microsoft.com/office/officeart/2005/8/layout/orgChart1"/>
-    <dgm:cxn modelId="{92794FE6-4D49-4C0D-88BE-177106E97943}" type="presParOf" srcId="{DD0E2A46-AD98-4F37-BCEC-51068F437533}" destId="{0AD0B376-44C6-49F4-9267-87027C264085}" srcOrd="0" destOrd="0" presId="urn:microsoft.com/office/officeart/2005/8/layout/orgChart1"/>
-    <dgm:cxn modelId="{998C4869-E4AB-432C-BF81-4AFC580DDBE5}" type="presParOf" srcId="{0AD0B376-44C6-49F4-9267-87027C264085}" destId="{3569DE56-31A2-418A-9A41-6CFB902B0BE4}" srcOrd="0" destOrd="0" presId="urn:microsoft.com/office/officeart/2005/8/layout/orgChart1"/>
-    <dgm:cxn modelId="{63764DC9-1F10-4ABC-B94B-CAB115565512}" type="presParOf" srcId="{0AD0B376-44C6-49F4-9267-87027C264085}" destId="{0926DA84-816A-4FB4-841C-889999C7EB10}" srcOrd="1" destOrd="0" presId="urn:microsoft.com/office/officeart/2005/8/layout/orgChart1"/>
-    <dgm:cxn modelId="{60813EA7-C415-492C-9D3A-80B33DCFF441}" type="presParOf" srcId="{DD0E2A46-AD98-4F37-BCEC-51068F437533}" destId="{DF6B0C6B-7A76-4B81-99E4-EF0011144549}" srcOrd="1" destOrd="0" presId="urn:microsoft.com/office/officeart/2005/8/layout/orgChart1"/>
-    <dgm:cxn modelId="{0309179A-89B9-4E8B-B126-91BD2F594C9C}" type="presParOf" srcId="{DF6B0C6B-7A76-4B81-99E4-EF0011144549}" destId="{1C32F77C-367C-4538-8F84-98D3D53E7FAB}" srcOrd="0" destOrd="0" presId="urn:microsoft.com/office/officeart/2005/8/layout/orgChart1"/>
-    <dgm:cxn modelId="{B1A51A5B-D672-40E8-ADC8-40130B8A3FFD}" type="presParOf" srcId="{DF6B0C6B-7A76-4B81-99E4-EF0011144549}" destId="{C723502F-2918-41FB-A11A-640311497B42}" srcOrd="1" destOrd="0" presId="urn:microsoft.com/office/officeart/2005/8/layout/orgChart1"/>
-    <dgm:cxn modelId="{8BA72A57-2435-464E-BFFB-FA42AB9DD6A0}" type="presParOf" srcId="{C723502F-2918-41FB-A11A-640311497B42}" destId="{F99A6E12-FFE5-4CF8-B565-7489BFD976EB}" srcOrd="0" destOrd="0" presId="urn:microsoft.com/office/officeart/2005/8/layout/orgChart1"/>
-    <dgm:cxn modelId="{D71FBDFB-92AF-4A14-BBB1-B402647B5D43}" type="presParOf" srcId="{F99A6E12-FFE5-4CF8-B565-7489BFD976EB}" destId="{C842B172-73B0-4D3E-882A-A1AAAED9E9BF}" srcOrd="0" destOrd="0" presId="urn:microsoft.com/office/officeart/2005/8/layout/orgChart1"/>
-    <dgm:cxn modelId="{E50286CC-8F99-4DBE-A2AC-EDEE54FFF458}" type="presParOf" srcId="{F99A6E12-FFE5-4CF8-B565-7489BFD976EB}" destId="{BE755F3F-46AA-4033-A029-69A8BFAA9D25}" srcOrd="1" destOrd="0" presId="urn:microsoft.com/office/officeart/2005/8/layout/orgChart1"/>
-    <dgm:cxn modelId="{9AFAC1D2-CA78-4AB0-9A34-23E233C54A3E}" type="presParOf" srcId="{C723502F-2918-41FB-A11A-640311497B42}" destId="{62610D25-458A-4D61-8DC8-AB9884A353BC}" srcOrd="1" destOrd="0" presId="urn:microsoft.com/office/officeart/2005/8/layout/orgChart1"/>
-    <dgm:cxn modelId="{0C125A63-BB6E-41EE-A1FF-154E1AF31A03}" type="presParOf" srcId="{C723502F-2918-41FB-A11A-640311497B42}" destId="{D978795F-5AED-4337-A867-4459C29F2E66}" srcOrd="2" destOrd="0" presId="urn:microsoft.com/office/officeart/2005/8/layout/orgChart1"/>
-    <dgm:cxn modelId="{EE043177-E2FB-4181-944A-66D8825C8422}" type="presParOf" srcId="{DD0E2A46-AD98-4F37-BCEC-51068F437533}" destId="{4B9E8FB1-0BFC-4F0C-9FCD-00A090DA5BC1}" srcOrd="2" destOrd="0" presId="urn:microsoft.com/office/officeart/2005/8/layout/orgChart1"/>
-    <dgm:cxn modelId="{06F3F895-91E6-4DF8-A1DD-38157D45DD03}" type="presParOf" srcId="{BF99EE86-EB9B-402E-8B76-E951801770D9}" destId="{42831692-6176-4E0A-A015-BAAA55A134D8}" srcOrd="2" destOrd="0" presId="urn:microsoft.com/office/officeart/2005/8/layout/orgChart1"/>
-    <dgm:cxn modelId="{2DD05635-5A56-4995-AFF2-02390912C1AF}" type="presParOf" srcId="{BF99EE86-EB9B-402E-8B76-E951801770D9}" destId="{893719DE-555F-47E7-9E6C-CAE0CC5083B5}" srcOrd="3" destOrd="0" presId="urn:microsoft.com/office/officeart/2005/8/layout/orgChart1"/>
-    <dgm:cxn modelId="{AF45B41C-ADCC-4F22-A440-969321DBC3A6}" type="presParOf" srcId="{893719DE-555F-47E7-9E6C-CAE0CC5083B5}" destId="{898A7677-AEDF-47CA-BE10-D05131650544}" srcOrd="0" destOrd="0" presId="urn:microsoft.com/office/officeart/2005/8/layout/orgChart1"/>
-    <dgm:cxn modelId="{3B9DEC92-53BD-4EA2-9E02-2AC64C7465D7}" type="presParOf" srcId="{898A7677-AEDF-47CA-BE10-D05131650544}" destId="{182EC3F2-B35A-405E-89C0-5D66F6BE1000}" srcOrd="0" destOrd="0" presId="urn:microsoft.com/office/officeart/2005/8/layout/orgChart1"/>
-    <dgm:cxn modelId="{1DA7A3D1-5246-4E1F-9058-B33CA343ACE9}" type="presParOf" srcId="{898A7677-AEDF-47CA-BE10-D05131650544}" destId="{C85761D3-9CED-4057-A794-7877E9FEBF65}" srcOrd="1" destOrd="0" presId="urn:microsoft.com/office/officeart/2005/8/layout/orgChart1"/>
-    <dgm:cxn modelId="{CC635FDE-887B-471A-A295-3BACD5727991}" type="presParOf" srcId="{893719DE-555F-47E7-9E6C-CAE0CC5083B5}" destId="{B8EA2579-31A2-4484-A5C9-95B83C8DC367}" srcOrd="1" destOrd="0" presId="urn:microsoft.com/office/officeart/2005/8/layout/orgChart1"/>
-    <dgm:cxn modelId="{E02DD34A-8412-4BF8-B91A-AC0F3473721A}" type="presParOf" srcId="{B8EA2579-31A2-4484-A5C9-95B83C8DC367}" destId="{156A4072-A85A-423E-9D38-4D25D31BE6EF}" srcOrd="0" destOrd="0" presId="urn:microsoft.com/office/officeart/2005/8/layout/orgChart1"/>
-    <dgm:cxn modelId="{21D3C177-7BA0-4808-AFC1-7E82AD3B031E}" type="presParOf" srcId="{B8EA2579-31A2-4484-A5C9-95B83C8DC367}" destId="{943B29C2-1A45-446A-8758-1A1DBE91C6B4}" srcOrd="1" destOrd="0" presId="urn:microsoft.com/office/officeart/2005/8/layout/orgChart1"/>
-    <dgm:cxn modelId="{DED0DD0D-A0A2-4B24-A9E0-9A9E75B96F9B}" type="presParOf" srcId="{943B29C2-1A45-446A-8758-1A1DBE91C6B4}" destId="{F81BF3EC-AD69-4BBE-9B84-DFC2C2650502}" srcOrd="0" destOrd="0" presId="urn:microsoft.com/office/officeart/2005/8/layout/orgChart1"/>
-    <dgm:cxn modelId="{0A9D1C76-6222-40BF-A590-7EC39D350550}" type="presParOf" srcId="{F81BF3EC-AD69-4BBE-9B84-DFC2C2650502}" destId="{536AECD9-A66E-4912-87A4-35FC734D2EB3}" srcOrd="0" destOrd="0" presId="urn:microsoft.com/office/officeart/2005/8/layout/orgChart1"/>
-    <dgm:cxn modelId="{DF2F878D-BB80-494A-BFEB-9EABC99771FC}" type="presParOf" srcId="{F81BF3EC-AD69-4BBE-9B84-DFC2C2650502}" destId="{AEE05A7A-8B14-4734-B453-5C022F840F4C}" srcOrd="1" destOrd="0" presId="urn:microsoft.com/office/officeart/2005/8/layout/orgChart1"/>
-    <dgm:cxn modelId="{2A42BDD3-143D-4C81-9EBC-601DDB0533C4}" type="presParOf" srcId="{943B29C2-1A45-446A-8758-1A1DBE91C6B4}" destId="{0835549F-A95F-4AC4-BFEE-992BC0DBF037}" srcOrd="1" destOrd="0" presId="urn:microsoft.com/office/officeart/2005/8/layout/orgChart1"/>
-    <dgm:cxn modelId="{4A158AD7-9C8F-412B-A7D0-1AD8DCB5FE5B}" type="presParOf" srcId="{0835549F-A95F-4AC4-BFEE-992BC0DBF037}" destId="{6FCCB28E-19E0-46DC-9AE0-C29420DD7A81}" srcOrd="0" destOrd="0" presId="urn:microsoft.com/office/officeart/2005/8/layout/orgChart1"/>
-    <dgm:cxn modelId="{07CE0813-D7B7-434A-98A0-C52C194AE1E7}" type="presParOf" srcId="{0835549F-A95F-4AC4-BFEE-992BC0DBF037}" destId="{56651034-8C3F-4D48-815C-CC8E5AAE37EB}" srcOrd="1" destOrd="0" presId="urn:microsoft.com/office/officeart/2005/8/layout/orgChart1"/>
-    <dgm:cxn modelId="{89F4217D-ACA1-4FCD-BDA1-20E474C047EA}" type="presParOf" srcId="{56651034-8C3F-4D48-815C-CC8E5AAE37EB}" destId="{95415629-C1E5-4213-B4AD-A46BFAF09728}" srcOrd="0" destOrd="0" presId="urn:microsoft.com/office/officeart/2005/8/layout/orgChart1"/>
-    <dgm:cxn modelId="{8B6F4B4B-31F2-466B-8688-27005677FC45}" type="presParOf" srcId="{95415629-C1E5-4213-B4AD-A46BFAF09728}" destId="{B2813BFB-0200-4D81-9EB0-C2F21B13BBFF}" srcOrd="0" destOrd="0" presId="urn:microsoft.com/office/officeart/2005/8/layout/orgChart1"/>
-    <dgm:cxn modelId="{3D7E0FD7-2381-44C8-9EF7-127202343A83}" type="presParOf" srcId="{95415629-C1E5-4213-B4AD-A46BFAF09728}" destId="{BA7D9017-BE78-4294-9105-5AD2EE4FE16C}" srcOrd="1" destOrd="0" presId="urn:microsoft.com/office/officeart/2005/8/layout/orgChart1"/>
-    <dgm:cxn modelId="{FBD1A352-F0AE-45AD-8F5E-5D5A05BF8A61}" type="presParOf" srcId="{56651034-8C3F-4D48-815C-CC8E5AAE37EB}" destId="{0963DE9C-544B-455D-B6DF-2E9D28AE7025}" srcOrd="1" destOrd="0" presId="urn:microsoft.com/office/officeart/2005/8/layout/orgChart1"/>
-    <dgm:cxn modelId="{1F46362E-7238-40E5-9402-8DAAF0A5C10F}" type="presParOf" srcId="{56651034-8C3F-4D48-815C-CC8E5AAE37EB}" destId="{C0B32967-C1ED-42CF-A7CE-2438BD760962}" srcOrd="2" destOrd="0" presId="urn:microsoft.com/office/officeart/2005/8/layout/orgChart1"/>
-    <dgm:cxn modelId="{564C2DEF-4FDA-40BB-87B2-31C1F70DB0EE}" type="presParOf" srcId="{943B29C2-1A45-446A-8758-1A1DBE91C6B4}" destId="{8CD5AE47-AD18-43E4-98D3-C652C276C32C}" srcOrd="2" destOrd="0" presId="urn:microsoft.com/office/officeart/2005/8/layout/orgChart1"/>
-    <dgm:cxn modelId="{73821161-C31C-4B3A-BD64-9BAED3B79DB2}" type="presParOf" srcId="{B8EA2579-31A2-4484-A5C9-95B83C8DC367}" destId="{9DCFFC93-9DF2-4873-9C44-CDD86397B319}" srcOrd="2" destOrd="0" presId="urn:microsoft.com/office/officeart/2005/8/layout/orgChart1"/>
-    <dgm:cxn modelId="{5372B2E2-0100-4C25-BA4F-0E437F89E5AC}" type="presParOf" srcId="{B8EA2579-31A2-4484-A5C9-95B83C8DC367}" destId="{AE2335CB-64CA-444D-9E6A-9AB770FC06E2}" srcOrd="3" destOrd="0" presId="urn:microsoft.com/office/officeart/2005/8/layout/orgChart1"/>
-    <dgm:cxn modelId="{70D77A88-A7C1-4A40-9019-7842A7B66D55}" type="presParOf" srcId="{AE2335CB-64CA-444D-9E6A-9AB770FC06E2}" destId="{5C038A71-F2B9-471A-B722-54A32FBB13BF}" srcOrd="0" destOrd="0" presId="urn:microsoft.com/office/officeart/2005/8/layout/orgChart1"/>
-    <dgm:cxn modelId="{8685738B-0B93-494E-9FC7-3FCAB3B4D6CA}" type="presParOf" srcId="{5C038A71-F2B9-471A-B722-54A32FBB13BF}" destId="{F54442B5-EF5D-4913-B8E8-81B98204AC46}" srcOrd="0" destOrd="0" presId="urn:microsoft.com/office/officeart/2005/8/layout/orgChart1"/>
-    <dgm:cxn modelId="{094A7FCB-6A3F-407A-91B6-61137F79FEFF}" type="presParOf" srcId="{5C038A71-F2B9-471A-B722-54A32FBB13BF}" destId="{D4088547-5D75-4D24-BDF8-455868A89074}" srcOrd="1" destOrd="0" presId="urn:microsoft.com/office/officeart/2005/8/layout/orgChart1"/>
-    <dgm:cxn modelId="{74350450-9896-4890-9399-D9E721C55B2F}" type="presParOf" srcId="{AE2335CB-64CA-444D-9E6A-9AB770FC06E2}" destId="{43DB93CC-8503-445C-9FC3-276ECD8C81AB}" srcOrd="1" destOrd="0" presId="urn:microsoft.com/office/officeart/2005/8/layout/orgChart1"/>
-    <dgm:cxn modelId="{93E67B39-93C6-44DD-A665-82B488F170ED}" type="presParOf" srcId="{43DB93CC-8503-445C-9FC3-276ECD8C81AB}" destId="{D331CBC7-0A66-4857-943E-3664A559C4F0}" srcOrd="0" destOrd="0" presId="urn:microsoft.com/office/officeart/2005/8/layout/orgChart1"/>
-    <dgm:cxn modelId="{A9D270A4-0F05-4363-B124-DA28C1768013}" type="presParOf" srcId="{43DB93CC-8503-445C-9FC3-276ECD8C81AB}" destId="{4530EFD5-BE48-44B5-8584-72C85B9C00E4}" srcOrd="1" destOrd="0" presId="urn:microsoft.com/office/officeart/2005/8/layout/orgChart1"/>
-    <dgm:cxn modelId="{E6F9937E-37DC-4756-882D-D345178D9CC7}" type="presParOf" srcId="{4530EFD5-BE48-44B5-8584-72C85B9C00E4}" destId="{0B08946D-B22A-4421-800B-67370BF69927}" srcOrd="0" destOrd="0" presId="urn:microsoft.com/office/officeart/2005/8/layout/orgChart1"/>
-    <dgm:cxn modelId="{349DC279-74F1-41FD-B275-7BD17D2E39AB}" type="presParOf" srcId="{0B08946D-B22A-4421-800B-67370BF69927}" destId="{FA9D6615-828E-41CA-9EAA-77523A215200}" srcOrd="0" destOrd="0" presId="urn:microsoft.com/office/officeart/2005/8/layout/orgChart1"/>
-    <dgm:cxn modelId="{22D2C7DD-D2F7-4E55-A0AF-03B193FE4CA1}" type="presParOf" srcId="{0B08946D-B22A-4421-800B-67370BF69927}" destId="{EC0F22A7-D22F-4CF5-BE00-BBEF64D939D1}" srcOrd="1" destOrd="0" presId="urn:microsoft.com/office/officeart/2005/8/layout/orgChart1"/>
-    <dgm:cxn modelId="{8ADC90F4-626F-4622-8063-55FB76CD847D}" type="presParOf" srcId="{4530EFD5-BE48-44B5-8584-72C85B9C00E4}" destId="{B3C67864-DEF3-4FED-9422-1A670E232EC4}" srcOrd="1" destOrd="0" presId="urn:microsoft.com/office/officeart/2005/8/layout/orgChart1"/>
-    <dgm:cxn modelId="{A5CCEF1A-C189-4749-B7A6-9E5086CE7611}" type="presParOf" srcId="{4530EFD5-BE48-44B5-8584-72C85B9C00E4}" destId="{4B2D6920-5B70-4506-9ECC-816C5FCE7BAD}" srcOrd="2" destOrd="0" presId="urn:microsoft.com/office/officeart/2005/8/layout/orgChart1"/>
-    <dgm:cxn modelId="{61FF5862-F22C-4F99-9057-7F1F759587B4}" type="presParOf" srcId="{AE2335CB-64CA-444D-9E6A-9AB770FC06E2}" destId="{A45A1003-5E9D-45E6-80A4-220E612CC841}" srcOrd="2" destOrd="0" presId="urn:microsoft.com/office/officeart/2005/8/layout/orgChart1"/>
-    <dgm:cxn modelId="{3A25230C-6D45-4971-85B8-6D941BF50D13}" type="presParOf" srcId="{893719DE-555F-47E7-9E6C-CAE0CC5083B5}" destId="{8A145B79-404E-4DFC-AA4F-E686CC0E5A0F}" srcOrd="2" destOrd="0" presId="urn:microsoft.com/office/officeart/2005/8/layout/orgChart1"/>
-    <dgm:cxn modelId="{56685A77-A432-4DB9-8678-A2B1DBC64BA2}" type="presParOf" srcId="{BF99EE86-EB9B-402E-8B76-E951801770D9}" destId="{6D2253F2-45D8-44E7-B1A5-4067573F858E}" srcOrd="4" destOrd="0" presId="urn:microsoft.com/office/officeart/2005/8/layout/orgChart1"/>
-    <dgm:cxn modelId="{ED3CD962-70C0-435F-868F-1AD3CF757214}" type="presParOf" srcId="{BF99EE86-EB9B-402E-8B76-E951801770D9}" destId="{5928FDFF-A549-4C7A-92CF-A6D14EDD7B39}" srcOrd="5" destOrd="0" presId="urn:microsoft.com/office/officeart/2005/8/layout/orgChart1"/>
-    <dgm:cxn modelId="{8BBA7A85-6780-4A78-A738-FB5D770496D5}" type="presParOf" srcId="{5928FDFF-A549-4C7A-92CF-A6D14EDD7B39}" destId="{F5E58C51-C412-41FA-B035-2C666821D45C}" srcOrd="0" destOrd="0" presId="urn:microsoft.com/office/officeart/2005/8/layout/orgChart1"/>
-    <dgm:cxn modelId="{46BD85AA-5921-492F-BBDB-93AA84C9CF1A}" type="presParOf" srcId="{F5E58C51-C412-41FA-B035-2C666821D45C}" destId="{33E261C2-582A-4DB8-8546-0EC85D0646AF}" srcOrd="0" destOrd="0" presId="urn:microsoft.com/office/officeart/2005/8/layout/orgChart1"/>
-    <dgm:cxn modelId="{C832C124-C1D6-4CE5-B81A-85E555D0CF8D}" type="presParOf" srcId="{F5E58C51-C412-41FA-B035-2C666821D45C}" destId="{5F9C667E-382C-48DC-87C1-0CEC101C97EE}" srcOrd="1" destOrd="0" presId="urn:microsoft.com/office/officeart/2005/8/layout/orgChart1"/>
-    <dgm:cxn modelId="{D15A3111-E1D5-444A-9EDD-05014B656CB1}" type="presParOf" srcId="{5928FDFF-A549-4C7A-92CF-A6D14EDD7B39}" destId="{B616C69F-46AE-42D7-915D-9EBBCD49DFF9}" srcOrd="1" destOrd="0" presId="urn:microsoft.com/office/officeart/2005/8/layout/orgChart1"/>
-    <dgm:cxn modelId="{40E8F6E5-C3E9-46D3-AE1E-9BC86F9C7A98}" type="presParOf" srcId="{B616C69F-46AE-42D7-915D-9EBBCD49DFF9}" destId="{2096A139-1797-48FB-BA03-C753AED9B4BC}" srcOrd="0" destOrd="0" presId="urn:microsoft.com/office/officeart/2005/8/layout/orgChart1"/>
-    <dgm:cxn modelId="{91A60F2D-E99F-4189-8958-F46F33C1718D}" type="presParOf" srcId="{B616C69F-46AE-42D7-915D-9EBBCD49DFF9}" destId="{ACF55D90-7650-44C6-9AF8-630A25C65834}" srcOrd="1" destOrd="0" presId="urn:microsoft.com/office/officeart/2005/8/layout/orgChart1"/>
-    <dgm:cxn modelId="{E912AF32-8815-4B2F-A0F2-5FA1EA456862}" type="presParOf" srcId="{ACF55D90-7650-44C6-9AF8-630A25C65834}" destId="{3684B864-B9A8-4582-868D-AA7118706824}" srcOrd="0" destOrd="0" presId="urn:microsoft.com/office/officeart/2005/8/layout/orgChart1"/>
-    <dgm:cxn modelId="{CEC01D0F-2566-4E07-9C7A-CAA562AD4B2C}" type="presParOf" srcId="{3684B864-B9A8-4582-868D-AA7118706824}" destId="{477D82C5-868E-4739-BDE3-048B427566B6}" srcOrd="0" destOrd="0" presId="urn:microsoft.com/office/officeart/2005/8/layout/orgChart1"/>
-    <dgm:cxn modelId="{AD7B33BB-1E97-4129-9492-4ABBAAA8F06C}" type="presParOf" srcId="{3684B864-B9A8-4582-868D-AA7118706824}" destId="{9E88FD70-97B5-4C66-8C96-A5A0E75654B6}" srcOrd="1" destOrd="0" presId="urn:microsoft.com/office/officeart/2005/8/layout/orgChart1"/>
-    <dgm:cxn modelId="{2A1AECF7-917D-4D55-AB45-66823C8D9982}" type="presParOf" srcId="{ACF55D90-7650-44C6-9AF8-630A25C65834}" destId="{01EB9034-8F3E-483F-94A9-162535E96293}" srcOrd="1" destOrd="0" presId="urn:microsoft.com/office/officeart/2005/8/layout/orgChart1"/>
-    <dgm:cxn modelId="{1E9A0B0D-F86F-41FD-B875-BB2DFD9FE0EB}" type="presParOf" srcId="{01EB9034-8F3E-483F-94A9-162535E96293}" destId="{ABC704CA-6BDD-4333-A596-9640100AD48A}" srcOrd="0" destOrd="0" presId="urn:microsoft.com/office/officeart/2005/8/layout/orgChart1"/>
-    <dgm:cxn modelId="{3DA22591-F18D-48B9-B435-F574EFC9763B}" type="presParOf" srcId="{01EB9034-8F3E-483F-94A9-162535E96293}" destId="{F5D8A1D7-A1B4-4FC7-BB77-4FD73318BD68}" srcOrd="1" destOrd="0" presId="urn:microsoft.com/office/officeart/2005/8/layout/orgChart1"/>
-    <dgm:cxn modelId="{3652DF1C-CBD8-445E-AFFA-441645C500A9}" type="presParOf" srcId="{F5D8A1D7-A1B4-4FC7-BB77-4FD73318BD68}" destId="{ECF3BC6A-CC4F-43F9-8A95-2D7D7B2C6214}" srcOrd="0" destOrd="0" presId="urn:microsoft.com/office/officeart/2005/8/layout/orgChart1"/>
-    <dgm:cxn modelId="{CFC45D82-194B-42A1-8808-83207BE6D0C8}" type="presParOf" srcId="{ECF3BC6A-CC4F-43F9-8A95-2D7D7B2C6214}" destId="{75BD0541-2DEA-4CCE-9B3F-6C335E44344F}" srcOrd="0" destOrd="0" presId="urn:microsoft.com/office/officeart/2005/8/layout/orgChart1"/>
-    <dgm:cxn modelId="{5A3FADE0-67A9-4124-88F6-5067EB298FAE}" type="presParOf" srcId="{ECF3BC6A-CC4F-43F9-8A95-2D7D7B2C6214}" destId="{A13F3D89-7008-483F-8EFA-85005FE7E7D4}" srcOrd="1" destOrd="0" presId="urn:microsoft.com/office/officeart/2005/8/layout/orgChart1"/>
-    <dgm:cxn modelId="{FD77D9EA-E198-4461-B268-498EA009318A}" type="presParOf" srcId="{F5D8A1D7-A1B4-4FC7-BB77-4FD73318BD68}" destId="{F87C2620-E441-43B3-9954-931A904FF19C}" srcOrd="1" destOrd="0" presId="urn:microsoft.com/office/officeart/2005/8/layout/orgChart1"/>
-    <dgm:cxn modelId="{530E567D-E2B0-45BB-8B6D-5D72599E8112}" type="presParOf" srcId="{F5D8A1D7-A1B4-4FC7-BB77-4FD73318BD68}" destId="{FA5D56FE-419D-4F53-B58C-D9F5700117B1}" srcOrd="2" destOrd="0" presId="urn:microsoft.com/office/officeart/2005/8/layout/orgChart1"/>
-    <dgm:cxn modelId="{3B26113E-35FB-43AD-A070-6059619F0428}" type="presParOf" srcId="{ACF55D90-7650-44C6-9AF8-630A25C65834}" destId="{8BF49E13-91D0-46AC-B9A5-20A71D144AA5}" srcOrd="2" destOrd="0" presId="urn:microsoft.com/office/officeart/2005/8/layout/orgChart1"/>
-    <dgm:cxn modelId="{690FB7AC-C3DD-46B1-AD44-8D5A545570FD}" type="presParOf" srcId="{B616C69F-46AE-42D7-915D-9EBBCD49DFF9}" destId="{5513AC60-615D-409B-A023-48E7C7ADF565}" srcOrd="2" destOrd="0" presId="urn:microsoft.com/office/officeart/2005/8/layout/orgChart1"/>
-    <dgm:cxn modelId="{B1CAD3A5-AD20-47B7-A034-452DD51F221E}" type="presParOf" srcId="{B616C69F-46AE-42D7-915D-9EBBCD49DFF9}" destId="{EE9C8A52-7297-48BE-9072-9C34061B0F63}" srcOrd="3" destOrd="0" presId="urn:microsoft.com/office/officeart/2005/8/layout/orgChart1"/>
-    <dgm:cxn modelId="{B9C60E33-1404-47B7-86BA-AF6ABDE11141}" type="presParOf" srcId="{EE9C8A52-7297-48BE-9072-9C34061B0F63}" destId="{D503B403-870B-406A-B9ED-117D727540E9}" srcOrd="0" destOrd="0" presId="urn:microsoft.com/office/officeart/2005/8/layout/orgChart1"/>
-    <dgm:cxn modelId="{81061039-661F-4EEB-8C92-7A212FE4167F}" type="presParOf" srcId="{D503B403-870B-406A-B9ED-117D727540E9}" destId="{2A4B1988-9185-48F2-9015-0EE8EF0C6CA1}" srcOrd="0" destOrd="0" presId="urn:microsoft.com/office/officeart/2005/8/layout/orgChart1"/>
-    <dgm:cxn modelId="{4BFBDA36-1E00-44C1-B15E-EF096CD6D80F}" type="presParOf" srcId="{D503B403-870B-406A-B9ED-117D727540E9}" destId="{081B2FAD-3B78-43A6-AE13-693DCED095F5}" srcOrd="1" destOrd="0" presId="urn:microsoft.com/office/officeart/2005/8/layout/orgChart1"/>
-    <dgm:cxn modelId="{D3D9D81F-CA38-4B4C-BDBF-098BF97305BE}" type="presParOf" srcId="{EE9C8A52-7297-48BE-9072-9C34061B0F63}" destId="{5FEC2C06-B1E4-4A74-B765-06BBA5FD1612}" srcOrd="1" destOrd="0" presId="urn:microsoft.com/office/officeart/2005/8/layout/orgChart1"/>
-    <dgm:cxn modelId="{7594DF2B-CC61-47E1-B28A-B80B15DB9ACE}" type="presParOf" srcId="{5FEC2C06-B1E4-4A74-B765-06BBA5FD1612}" destId="{71031FBC-F8B1-4FCC-801B-FC7BFF56876E}" srcOrd="0" destOrd="0" presId="urn:microsoft.com/office/officeart/2005/8/layout/orgChart1"/>
-    <dgm:cxn modelId="{066062C8-6B75-4E58-92E2-45938B382F25}" type="presParOf" srcId="{5FEC2C06-B1E4-4A74-B765-06BBA5FD1612}" destId="{31F37A7B-44CA-44F3-A7CA-74A146F13E8D}" srcOrd="1" destOrd="0" presId="urn:microsoft.com/office/officeart/2005/8/layout/orgChart1"/>
-    <dgm:cxn modelId="{20ABE727-41A0-459A-83A1-4C618D02A2AB}" type="presParOf" srcId="{31F37A7B-44CA-44F3-A7CA-74A146F13E8D}" destId="{75E47187-9672-48B1-B647-51AED201B5A2}" srcOrd="0" destOrd="0" presId="urn:microsoft.com/office/officeart/2005/8/layout/orgChart1"/>
-    <dgm:cxn modelId="{BBC103F3-A43D-4723-8E32-8BD21BF0E18A}" type="presParOf" srcId="{75E47187-9672-48B1-B647-51AED201B5A2}" destId="{0DD69810-8220-4F21-8267-18E93820F012}" srcOrd="0" destOrd="0" presId="urn:microsoft.com/office/officeart/2005/8/layout/orgChart1"/>
-    <dgm:cxn modelId="{311E65AE-8FE2-47CA-8EF7-10EC9CE1A1C8}" type="presParOf" srcId="{75E47187-9672-48B1-B647-51AED201B5A2}" destId="{A8E37AB3-3CC0-4F25-A8E1-5467D1D780EC}" srcOrd="1" destOrd="0" presId="urn:microsoft.com/office/officeart/2005/8/layout/orgChart1"/>
-    <dgm:cxn modelId="{67BCA32F-CD95-4167-8EAA-6B8418FF55A7}" type="presParOf" srcId="{31F37A7B-44CA-44F3-A7CA-74A146F13E8D}" destId="{D7B4DF2C-A8FB-444B-8E35-CAD4A529E5C7}" srcOrd="1" destOrd="0" presId="urn:microsoft.com/office/officeart/2005/8/layout/orgChart1"/>
-    <dgm:cxn modelId="{3085C383-5F72-4A1C-AC71-9CD8280B63A3}" type="presParOf" srcId="{31F37A7B-44CA-44F3-A7CA-74A146F13E8D}" destId="{9E7581E0-197A-4F05-96B4-53DEDF15D9C5}" srcOrd="2" destOrd="0" presId="urn:microsoft.com/office/officeart/2005/8/layout/orgChart1"/>
-    <dgm:cxn modelId="{453E6B81-244C-4888-8101-9FBE3A99B3D6}" type="presParOf" srcId="{EE9C8A52-7297-48BE-9072-9C34061B0F63}" destId="{BE7524E2-41CA-4723-B19F-E9509C8E1A83}" srcOrd="2" destOrd="0" presId="urn:microsoft.com/office/officeart/2005/8/layout/orgChart1"/>
-    <dgm:cxn modelId="{0ED4484F-87F5-4FA5-8898-FBDAEEF633F8}" type="presParOf" srcId="{5928FDFF-A549-4C7A-92CF-A6D14EDD7B39}" destId="{14309929-D1B7-4266-B32D-6024E38BC6A5}" srcOrd="2" destOrd="0" presId="urn:microsoft.com/office/officeart/2005/8/layout/orgChart1"/>
-    <dgm:cxn modelId="{BE7694D9-4C5B-468A-99FB-988688ADCC47}" type="presParOf" srcId="{083CB416-6E25-4BE2-BECC-1C99503CE5E2}" destId="{6A419CCB-283B-4802-ABF8-4A0D28E5BC62}" srcOrd="2" destOrd="0" presId="urn:microsoft.com/office/officeart/2005/8/layout/orgChart1"/>
+    <dgm:cxn modelId="{87BCDF45-435D-450B-B5DF-42EC6987A149}" type="presParOf" srcId="{C3089668-FABE-422F-A64A-A91B789443FE}" destId="{2713E45B-920C-48EB-8447-3D59C13A9A1F}" srcOrd="0" destOrd="0" presId="urn:microsoft.com/office/officeart/2009/3/layout/HorizontalOrganizationChart"/>
+    <dgm:cxn modelId="{84C476BD-E6B5-49B5-A848-2FFF26D3B55B}" type="presParOf" srcId="{2713E45B-920C-48EB-8447-3D59C13A9A1F}" destId="{D7C114D5-701F-4201-9164-B2FDE6C254C1}" srcOrd="0" destOrd="0" presId="urn:microsoft.com/office/officeart/2009/3/layout/HorizontalOrganizationChart"/>
+    <dgm:cxn modelId="{4C02E826-3431-4398-AFC0-751C1A9B40B5}" type="presParOf" srcId="{D7C114D5-701F-4201-9164-B2FDE6C254C1}" destId="{E6352167-7D3A-4477-A66B-E2705E0B25DB}" srcOrd="0" destOrd="0" presId="urn:microsoft.com/office/officeart/2009/3/layout/HorizontalOrganizationChart"/>
+    <dgm:cxn modelId="{3FC6C7CB-8CAF-413A-B852-1859E941B3B7}" type="presParOf" srcId="{D7C114D5-701F-4201-9164-B2FDE6C254C1}" destId="{D7DF3DCE-8825-4D2A-92DB-E63821F527AF}" srcOrd="1" destOrd="0" presId="urn:microsoft.com/office/officeart/2009/3/layout/HorizontalOrganizationChart"/>
+    <dgm:cxn modelId="{3222F7E6-1D7D-4266-9DE1-2BE7D467F0D8}" type="presParOf" srcId="{2713E45B-920C-48EB-8447-3D59C13A9A1F}" destId="{76628AE1-4A8E-4017-8E71-A3595AE9E1A2}" srcOrd="1" destOrd="0" presId="urn:microsoft.com/office/officeart/2009/3/layout/HorizontalOrganizationChart"/>
+    <dgm:cxn modelId="{3166BF63-6CEE-49AB-B0E8-0DD44A41ABC6}" type="presParOf" srcId="{76628AE1-4A8E-4017-8E71-A3595AE9E1A2}" destId="{918711BF-84CD-43C5-A9E0-8CE2EEFD00C4}" srcOrd="0" destOrd="0" presId="urn:microsoft.com/office/officeart/2009/3/layout/HorizontalOrganizationChart"/>
+    <dgm:cxn modelId="{F1F64B66-953B-445E-A4E2-5C10EB787C7A}" type="presParOf" srcId="{76628AE1-4A8E-4017-8E71-A3595AE9E1A2}" destId="{97CB2A1F-D4AA-4CDF-8855-9872F6EF869A}" srcOrd="1" destOrd="0" presId="urn:microsoft.com/office/officeart/2009/3/layout/HorizontalOrganizationChart"/>
+    <dgm:cxn modelId="{BC577AC1-97C0-4330-A04E-FB87F2FDA78A}" type="presParOf" srcId="{97CB2A1F-D4AA-4CDF-8855-9872F6EF869A}" destId="{77D6909C-7AF5-43DE-894B-C3DF0B8405A8}" srcOrd="0" destOrd="0" presId="urn:microsoft.com/office/officeart/2009/3/layout/HorizontalOrganizationChart"/>
+    <dgm:cxn modelId="{5EE655BA-5324-46B2-AFCE-951B43804581}" type="presParOf" srcId="{77D6909C-7AF5-43DE-894B-C3DF0B8405A8}" destId="{D4D3088E-F816-4DB7-B82A-AAD62057124A}" srcOrd="0" destOrd="0" presId="urn:microsoft.com/office/officeart/2009/3/layout/HorizontalOrganizationChart"/>
+    <dgm:cxn modelId="{2347A5E5-BDDB-4822-B92B-DCDC5DE7D9C4}" type="presParOf" srcId="{77D6909C-7AF5-43DE-894B-C3DF0B8405A8}" destId="{7F9B315E-A05F-4DE9-ACCF-AAFEE6A8F164}" srcOrd="1" destOrd="0" presId="urn:microsoft.com/office/officeart/2009/3/layout/HorizontalOrganizationChart"/>
+    <dgm:cxn modelId="{CD70E8DC-FB04-43A9-9191-1E409CBB76EA}" type="presParOf" srcId="{97CB2A1F-D4AA-4CDF-8855-9872F6EF869A}" destId="{90BF1D7E-70DB-45CF-B6B2-FC50A85DB246}" srcOrd="1" destOrd="0" presId="urn:microsoft.com/office/officeart/2009/3/layout/HorizontalOrganizationChart"/>
+    <dgm:cxn modelId="{0A29F21D-81C5-42EC-A2E7-A583A9A2B04F}" type="presParOf" srcId="{90BF1D7E-70DB-45CF-B6B2-FC50A85DB246}" destId="{48540270-B1BB-48C9-B2A0-F938D5E4DB34}" srcOrd="0" destOrd="0" presId="urn:microsoft.com/office/officeart/2009/3/layout/HorizontalOrganizationChart"/>
+    <dgm:cxn modelId="{10227ED5-DC85-4842-9E4A-4BDE8509CED4}" type="presParOf" srcId="{90BF1D7E-70DB-45CF-B6B2-FC50A85DB246}" destId="{6A00DEF4-E97D-40DB-B992-01E86D103100}" srcOrd="1" destOrd="0" presId="urn:microsoft.com/office/officeart/2009/3/layout/HorizontalOrganizationChart"/>
+    <dgm:cxn modelId="{9BC37992-D90A-442B-A92F-74598501C4C9}" type="presParOf" srcId="{6A00DEF4-E97D-40DB-B992-01E86D103100}" destId="{82771557-08E5-4E99-8A68-E1C0BC8E76E2}" srcOrd="0" destOrd="0" presId="urn:microsoft.com/office/officeart/2009/3/layout/HorizontalOrganizationChart"/>
+    <dgm:cxn modelId="{3F307047-52B0-4643-9DAF-74306F3E82AC}" type="presParOf" srcId="{82771557-08E5-4E99-8A68-E1C0BC8E76E2}" destId="{841FC3F0-EDEE-47D9-A7AB-E44779B97831}" srcOrd="0" destOrd="0" presId="urn:microsoft.com/office/officeart/2009/3/layout/HorizontalOrganizationChart"/>
+    <dgm:cxn modelId="{4E6FF8B3-B703-4D1D-9AF7-91BC74D28963}" type="presParOf" srcId="{82771557-08E5-4E99-8A68-E1C0BC8E76E2}" destId="{FEE50AE1-E8FE-477F-84D1-9326E3970B79}" srcOrd="1" destOrd="0" presId="urn:microsoft.com/office/officeart/2009/3/layout/HorizontalOrganizationChart"/>
+    <dgm:cxn modelId="{8A7EB1FE-CFDB-4974-8821-16F1C6EEC54E}" type="presParOf" srcId="{6A00DEF4-E97D-40DB-B992-01E86D103100}" destId="{78A319A6-4645-4E03-9272-2651C4866778}" srcOrd="1" destOrd="0" presId="urn:microsoft.com/office/officeart/2009/3/layout/HorizontalOrganizationChart"/>
+    <dgm:cxn modelId="{15EF0590-9D55-471F-8741-3F704DF5535E}" type="presParOf" srcId="{6A00DEF4-E97D-40DB-B992-01E86D103100}" destId="{2B21527F-B569-4B15-9177-2E5B23BB0C1F}" srcOrd="2" destOrd="0" presId="urn:microsoft.com/office/officeart/2009/3/layout/HorizontalOrganizationChart"/>
+    <dgm:cxn modelId="{3BAD4E65-CB47-43DD-A78C-CD9023167C48}" type="presParOf" srcId="{97CB2A1F-D4AA-4CDF-8855-9872F6EF869A}" destId="{F9935CA4-2628-4B58-AEF2-B0C0C8AF2694}" srcOrd="2" destOrd="0" presId="urn:microsoft.com/office/officeart/2009/3/layout/HorizontalOrganizationChart"/>
+    <dgm:cxn modelId="{99BC7AE1-B4BE-4D9D-9850-84564D7C6938}" type="presParOf" srcId="{76628AE1-4A8E-4017-8E71-A3595AE9E1A2}" destId="{DAB85FB9-BC47-47AC-922F-C97E272C5E93}" srcOrd="2" destOrd="0" presId="urn:microsoft.com/office/officeart/2009/3/layout/HorizontalOrganizationChart"/>
+    <dgm:cxn modelId="{BB781332-861A-4DF2-AABE-DF9C7E21FA27}" type="presParOf" srcId="{76628AE1-4A8E-4017-8E71-A3595AE9E1A2}" destId="{DF8EF137-152F-4BB1-8D05-232C7991B603}" srcOrd="3" destOrd="0" presId="urn:microsoft.com/office/officeart/2009/3/layout/HorizontalOrganizationChart"/>
+    <dgm:cxn modelId="{B0831060-FC2A-439B-8205-D2D499092319}" type="presParOf" srcId="{DF8EF137-152F-4BB1-8D05-232C7991B603}" destId="{813A51FC-B475-47D6-96BD-5607044EF739}" srcOrd="0" destOrd="0" presId="urn:microsoft.com/office/officeart/2009/3/layout/HorizontalOrganizationChart"/>
+    <dgm:cxn modelId="{BF2D6C56-C8CB-41FE-B9D1-402E2C21B0AD}" type="presParOf" srcId="{813A51FC-B475-47D6-96BD-5607044EF739}" destId="{9EEBEB92-64BA-4F7F-98DF-F7F236744EF3}" srcOrd="0" destOrd="0" presId="urn:microsoft.com/office/officeart/2009/3/layout/HorizontalOrganizationChart"/>
+    <dgm:cxn modelId="{16688886-6776-408E-B3EA-17B449EA6FE2}" type="presParOf" srcId="{813A51FC-B475-47D6-96BD-5607044EF739}" destId="{E7E042BC-0EFB-483E-8DE0-22B31E909877}" srcOrd="1" destOrd="0" presId="urn:microsoft.com/office/officeart/2009/3/layout/HorizontalOrganizationChart"/>
+    <dgm:cxn modelId="{ACDA29D4-AAF1-413B-9F77-A3A098501A42}" type="presParOf" srcId="{DF8EF137-152F-4BB1-8D05-232C7991B603}" destId="{3A93CAD1-056D-47C4-9FC0-49D594EF91D4}" srcOrd="1" destOrd="0" presId="urn:microsoft.com/office/officeart/2009/3/layout/HorizontalOrganizationChart"/>
+    <dgm:cxn modelId="{D1A58BA4-A975-45B3-A308-8DCCA2D8D5FB}" type="presParOf" srcId="{3A93CAD1-056D-47C4-9FC0-49D594EF91D4}" destId="{06C21965-8E71-4FE4-8ABE-1C052EE030C1}" srcOrd="0" destOrd="0" presId="urn:microsoft.com/office/officeart/2009/3/layout/HorizontalOrganizationChart"/>
+    <dgm:cxn modelId="{696220C8-DE1A-4A34-8C5F-47B6289DA7F3}" type="presParOf" srcId="{3A93CAD1-056D-47C4-9FC0-49D594EF91D4}" destId="{A4C39367-5371-44B9-8730-C4A80F1A2ACC}" srcOrd="1" destOrd="0" presId="urn:microsoft.com/office/officeart/2009/3/layout/HorizontalOrganizationChart"/>
+    <dgm:cxn modelId="{EBFE833A-5604-42D4-9A1F-A79456D9806E}" type="presParOf" srcId="{A4C39367-5371-44B9-8730-C4A80F1A2ACC}" destId="{40F71A8D-E46E-4BA7-A585-19AD7DF4F792}" srcOrd="0" destOrd="0" presId="urn:microsoft.com/office/officeart/2009/3/layout/HorizontalOrganizationChart"/>
+    <dgm:cxn modelId="{561ACD4A-2005-4612-9D42-9452E8617BC4}" type="presParOf" srcId="{40F71A8D-E46E-4BA7-A585-19AD7DF4F792}" destId="{642D27FE-2E27-4958-A358-B5CB93F05DF0}" srcOrd="0" destOrd="0" presId="urn:microsoft.com/office/officeart/2009/3/layout/HorizontalOrganizationChart"/>
+    <dgm:cxn modelId="{652C03B8-8B37-44B1-BF45-1237F3B2FED6}" type="presParOf" srcId="{40F71A8D-E46E-4BA7-A585-19AD7DF4F792}" destId="{757C9A4B-1E2B-458E-B7B5-1A48FC2B7C07}" srcOrd="1" destOrd="0" presId="urn:microsoft.com/office/officeart/2009/3/layout/HorizontalOrganizationChart"/>
+    <dgm:cxn modelId="{60E9D2C1-2370-43BB-B4B0-13201D44132C}" type="presParOf" srcId="{A4C39367-5371-44B9-8730-C4A80F1A2ACC}" destId="{18ECCF73-8FA1-43B1-BF75-3177D1FB90A1}" srcOrd="1" destOrd="0" presId="urn:microsoft.com/office/officeart/2009/3/layout/HorizontalOrganizationChart"/>
+    <dgm:cxn modelId="{F911A1F8-530E-4ECF-94BA-E0F30A8D6941}" type="presParOf" srcId="{18ECCF73-8FA1-43B1-BF75-3177D1FB90A1}" destId="{945CA7E0-FF80-4909-8797-47A74094211B}" srcOrd="0" destOrd="0" presId="urn:microsoft.com/office/officeart/2009/3/layout/HorizontalOrganizationChart"/>
+    <dgm:cxn modelId="{273CC851-CC9C-4218-B135-535DCC0A47BF}" type="presParOf" srcId="{18ECCF73-8FA1-43B1-BF75-3177D1FB90A1}" destId="{0623DF2C-C54F-4A4E-B9D1-BABAE2E7C682}" srcOrd="1" destOrd="0" presId="urn:microsoft.com/office/officeart/2009/3/layout/HorizontalOrganizationChart"/>
+    <dgm:cxn modelId="{08BC8B64-FB69-4605-893C-658F44DB0771}" type="presParOf" srcId="{0623DF2C-C54F-4A4E-B9D1-BABAE2E7C682}" destId="{882D775E-0813-458D-B997-1155E7207204}" srcOrd="0" destOrd="0" presId="urn:microsoft.com/office/officeart/2009/3/layout/HorizontalOrganizationChart"/>
+    <dgm:cxn modelId="{F2D312BC-824F-4C96-9E5A-0C6CFCCBA990}" type="presParOf" srcId="{882D775E-0813-458D-B997-1155E7207204}" destId="{19B29335-EA1A-49EE-974D-F0C5AD5FD79F}" srcOrd="0" destOrd="0" presId="urn:microsoft.com/office/officeart/2009/3/layout/HorizontalOrganizationChart"/>
+    <dgm:cxn modelId="{2DAFE760-1A8E-4AF8-9390-249655D296F1}" type="presParOf" srcId="{882D775E-0813-458D-B997-1155E7207204}" destId="{3D37B79B-B2ED-41DD-AEC5-F37FD3228196}" srcOrd="1" destOrd="0" presId="urn:microsoft.com/office/officeart/2009/3/layout/HorizontalOrganizationChart"/>
+    <dgm:cxn modelId="{CBC9CAB0-64FC-4C16-8BE3-D1473971CD24}" type="presParOf" srcId="{0623DF2C-C54F-4A4E-B9D1-BABAE2E7C682}" destId="{723E3C19-7207-4E70-BCBA-81B42E3C729F}" srcOrd="1" destOrd="0" presId="urn:microsoft.com/office/officeart/2009/3/layout/HorizontalOrganizationChart"/>
+    <dgm:cxn modelId="{3F63D4A8-B360-41B6-8EBC-F9D93DEC7142}" type="presParOf" srcId="{723E3C19-7207-4E70-BCBA-81B42E3C729F}" destId="{D9BBDF49-6C14-4068-B186-F5BB8193E5F5}" srcOrd="0" destOrd="0" presId="urn:microsoft.com/office/officeart/2009/3/layout/HorizontalOrganizationChart"/>
+    <dgm:cxn modelId="{9D7D590F-B5A8-49D1-ABC5-C06A89BAE1A5}" type="presParOf" srcId="{723E3C19-7207-4E70-BCBA-81B42E3C729F}" destId="{0915B519-3D23-47B6-8316-CAB2D4619F21}" srcOrd="1" destOrd="0" presId="urn:microsoft.com/office/officeart/2009/3/layout/HorizontalOrganizationChart"/>
+    <dgm:cxn modelId="{F3900428-58CC-43DE-8657-BE13E3107358}" type="presParOf" srcId="{0915B519-3D23-47B6-8316-CAB2D4619F21}" destId="{54342746-B4DA-4902-897B-80B348338E58}" srcOrd="0" destOrd="0" presId="urn:microsoft.com/office/officeart/2009/3/layout/HorizontalOrganizationChart"/>
+    <dgm:cxn modelId="{29519658-2DF6-4E81-BABF-5EE87907087C}" type="presParOf" srcId="{54342746-B4DA-4902-897B-80B348338E58}" destId="{F9345731-A502-4891-BFEB-0D0B72ED1BD9}" srcOrd="0" destOrd="0" presId="urn:microsoft.com/office/officeart/2009/3/layout/HorizontalOrganizationChart"/>
+    <dgm:cxn modelId="{2DC24F2B-D2F9-42DB-AF51-7D204CDEC5F0}" type="presParOf" srcId="{54342746-B4DA-4902-897B-80B348338E58}" destId="{52F75EBA-DB25-4744-8C7A-70B18B2035E3}" srcOrd="1" destOrd="0" presId="urn:microsoft.com/office/officeart/2009/3/layout/HorizontalOrganizationChart"/>
+    <dgm:cxn modelId="{6F46B0E2-68B0-404B-A9C9-66171782B9B2}" type="presParOf" srcId="{0915B519-3D23-47B6-8316-CAB2D4619F21}" destId="{BE8F2A0F-BC9A-40CD-9FC9-87CF65DA96ED}" srcOrd="1" destOrd="0" presId="urn:microsoft.com/office/officeart/2009/3/layout/HorizontalOrganizationChart"/>
+    <dgm:cxn modelId="{A32E08D7-FEF0-4446-A35A-659065ACE1AB}" type="presParOf" srcId="{0915B519-3D23-47B6-8316-CAB2D4619F21}" destId="{83B1F5A0-35F4-4479-8C6E-0C08234F3325}" srcOrd="2" destOrd="0" presId="urn:microsoft.com/office/officeart/2009/3/layout/HorizontalOrganizationChart"/>
+    <dgm:cxn modelId="{F98B9163-34E5-44B4-AB4A-51F938EED670}" type="presParOf" srcId="{0623DF2C-C54F-4A4E-B9D1-BABAE2E7C682}" destId="{59D0779F-4F8A-4088-9D50-E02BB339EA33}" srcOrd="2" destOrd="0" presId="urn:microsoft.com/office/officeart/2009/3/layout/HorizontalOrganizationChart"/>
+    <dgm:cxn modelId="{41742079-BA1E-4054-8274-1B0E778A36F3}" type="presParOf" srcId="{A4C39367-5371-44B9-8730-C4A80F1A2ACC}" destId="{BF04D66E-D393-49C7-B2CA-76CD1A79B789}" srcOrd="2" destOrd="0" presId="urn:microsoft.com/office/officeart/2009/3/layout/HorizontalOrganizationChart"/>
+    <dgm:cxn modelId="{C94A37F3-5A0A-4B59-AF1F-7ED5F1820C17}" type="presParOf" srcId="{3A93CAD1-056D-47C4-9FC0-49D594EF91D4}" destId="{E31E7DC3-EA3F-4D42-B094-2C5B08161DDA}" srcOrd="2" destOrd="0" presId="urn:microsoft.com/office/officeart/2009/3/layout/HorizontalOrganizationChart"/>
+    <dgm:cxn modelId="{C34E9AEA-2562-4BD6-8A66-51290C8F17E5}" type="presParOf" srcId="{3A93CAD1-056D-47C4-9FC0-49D594EF91D4}" destId="{2CE6A218-1B5E-4F4A-BB93-CEE69B1427B9}" srcOrd="3" destOrd="0" presId="urn:microsoft.com/office/officeart/2009/3/layout/HorizontalOrganizationChart"/>
+    <dgm:cxn modelId="{8D461AD4-275A-4049-9F46-B1D492FA8342}" type="presParOf" srcId="{2CE6A218-1B5E-4F4A-BB93-CEE69B1427B9}" destId="{3F2FBD19-6CFA-46B8-8CDA-269812C021D8}" srcOrd="0" destOrd="0" presId="urn:microsoft.com/office/officeart/2009/3/layout/HorizontalOrganizationChart"/>
+    <dgm:cxn modelId="{8A06A584-49FA-49A2-9465-A975156D3369}" type="presParOf" srcId="{3F2FBD19-6CFA-46B8-8CDA-269812C021D8}" destId="{4D46CBD9-7226-4C0F-A94A-2615771A1793}" srcOrd="0" destOrd="0" presId="urn:microsoft.com/office/officeart/2009/3/layout/HorizontalOrganizationChart"/>
+    <dgm:cxn modelId="{D46CFB6C-30FC-4F4F-A326-5FAB075D2290}" type="presParOf" srcId="{3F2FBD19-6CFA-46B8-8CDA-269812C021D8}" destId="{CEDFCCCB-F4D4-4761-A537-1C600AF25EAC}" srcOrd="1" destOrd="0" presId="urn:microsoft.com/office/officeart/2009/3/layout/HorizontalOrganizationChart"/>
+    <dgm:cxn modelId="{E5475352-22F1-442E-9B07-1560782FFA24}" type="presParOf" srcId="{2CE6A218-1B5E-4F4A-BB93-CEE69B1427B9}" destId="{9B84E685-3D15-445D-A897-37CEC8AD4E5A}" srcOrd="1" destOrd="0" presId="urn:microsoft.com/office/officeart/2009/3/layout/HorizontalOrganizationChart"/>
+    <dgm:cxn modelId="{709A7E5B-432A-403E-B727-88BB4139A914}" type="presParOf" srcId="{9B84E685-3D15-445D-A897-37CEC8AD4E5A}" destId="{66065974-BED5-4F32-B122-0F132D186B02}" srcOrd="0" destOrd="0" presId="urn:microsoft.com/office/officeart/2009/3/layout/HorizontalOrganizationChart"/>
+    <dgm:cxn modelId="{4201D2DD-4F2C-4BAC-B56F-14B41B452F0E}" type="presParOf" srcId="{9B84E685-3D15-445D-A897-37CEC8AD4E5A}" destId="{152A2970-FD3A-439B-8713-61FC424ADBFA}" srcOrd="1" destOrd="0" presId="urn:microsoft.com/office/officeart/2009/3/layout/HorizontalOrganizationChart"/>
+    <dgm:cxn modelId="{C0F4841D-9948-4085-AEAB-185E0C0CB927}" type="presParOf" srcId="{152A2970-FD3A-439B-8713-61FC424ADBFA}" destId="{BF694033-1575-4206-9C48-D03C06556126}" srcOrd="0" destOrd="0" presId="urn:microsoft.com/office/officeart/2009/3/layout/HorizontalOrganizationChart"/>
+    <dgm:cxn modelId="{6D9F0D26-02D9-4C0B-A917-EEAB593ECE26}" type="presParOf" srcId="{BF694033-1575-4206-9C48-D03C06556126}" destId="{AFA6C30E-C18F-423D-9B5D-B4A720213DDA}" srcOrd="0" destOrd="0" presId="urn:microsoft.com/office/officeart/2009/3/layout/HorizontalOrganizationChart"/>
+    <dgm:cxn modelId="{F1B7F5B5-76C6-4EBB-9403-054D6E87FB91}" type="presParOf" srcId="{BF694033-1575-4206-9C48-D03C06556126}" destId="{202C862B-6195-49DD-B879-07A868203B08}" srcOrd="1" destOrd="0" presId="urn:microsoft.com/office/officeart/2009/3/layout/HorizontalOrganizationChart"/>
+    <dgm:cxn modelId="{D624CD1A-7203-4052-BA4B-31D6C9194A75}" type="presParOf" srcId="{152A2970-FD3A-439B-8713-61FC424ADBFA}" destId="{CBF7D241-0385-45D4-A1E1-7587418DFA37}" srcOrd="1" destOrd="0" presId="urn:microsoft.com/office/officeart/2009/3/layout/HorizontalOrganizationChart"/>
+    <dgm:cxn modelId="{B508652A-57B6-4546-A441-D36C49A2CE6A}" type="presParOf" srcId="{152A2970-FD3A-439B-8713-61FC424ADBFA}" destId="{2F33373C-ACCB-43AE-BDD0-A87A4BA29F41}" srcOrd="2" destOrd="0" presId="urn:microsoft.com/office/officeart/2009/3/layout/HorizontalOrganizationChart"/>
+    <dgm:cxn modelId="{8C255E6F-D31D-40EE-B104-D8A8371C9373}" type="presParOf" srcId="{2CE6A218-1B5E-4F4A-BB93-CEE69B1427B9}" destId="{F5B7F394-2C03-4E4C-9143-836B27C05373}" srcOrd="2" destOrd="0" presId="urn:microsoft.com/office/officeart/2009/3/layout/HorizontalOrganizationChart"/>
+    <dgm:cxn modelId="{B7EA12D8-3CE7-48F6-A22C-2DE9C9DEA217}" type="presParOf" srcId="{DF8EF137-152F-4BB1-8D05-232C7991B603}" destId="{C73C8FDF-3AF3-4F94-9F89-035F4B072015}" srcOrd="2" destOrd="0" presId="urn:microsoft.com/office/officeart/2009/3/layout/HorizontalOrganizationChart"/>
+    <dgm:cxn modelId="{B7D1CAFB-62E0-49F5-9574-FA83AE8B2179}" type="presParOf" srcId="{76628AE1-4A8E-4017-8E71-A3595AE9E1A2}" destId="{19F42125-481B-44CC-99B3-E553D8BC9BEB}" srcOrd="4" destOrd="0" presId="urn:microsoft.com/office/officeart/2009/3/layout/HorizontalOrganizationChart"/>
+    <dgm:cxn modelId="{7E00EB52-3CF0-4E01-B3AE-86E0C93BA62F}" type="presParOf" srcId="{76628AE1-4A8E-4017-8E71-A3595AE9E1A2}" destId="{11DA984E-4AD0-4558-873E-EA535D8420EE}" srcOrd="5" destOrd="0" presId="urn:microsoft.com/office/officeart/2009/3/layout/HorizontalOrganizationChart"/>
+    <dgm:cxn modelId="{3239FAFE-F923-4667-A36E-B46E935948B4}" type="presParOf" srcId="{11DA984E-4AD0-4558-873E-EA535D8420EE}" destId="{76EAEF87-9BB1-4A58-9C50-2D0392CA272C}" srcOrd="0" destOrd="0" presId="urn:microsoft.com/office/officeart/2009/3/layout/HorizontalOrganizationChart"/>
+    <dgm:cxn modelId="{BB6F83C5-0DB2-41CB-9B0E-FE4EB66136EA}" type="presParOf" srcId="{76EAEF87-9BB1-4A58-9C50-2D0392CA272C}" destId="{07A54363-4941-410F-9CE5-8F873DA957C7}" srcOrd="0" destOrd="0" presId="urn:microsoft.com/office/officeart/2009/3/layout/HorizontalOrganizationChart"/>
+    <dgm:cxn modelId="{B9DF2156-565F-4D02-952C-3639726E050A}" type="presParOf" srcId="{76EAEF87-9BB1-4A58-9C50-2D0392CA272C}" destId="{4252A706-1508-444F-A356-0BC68A0369C5}" srcOrd="1" destOrd="0" presId="urn:microsoft.com/office/officeart/2009/3/layout/HorizontalOrganizationChart"/>
+    <dgm:cxn modelId="{F805E552-A905-4A5A-9C61-822F92300A25}" type="presParOf" srcId="{11DA984E-4AD0-4558-873E-EA535D8420EE}" destId="{725828E6-A000-4DF8-BAEA-CF9519E93E48}" srcOrd="1" destOrd="0" presId="urn:microsoft.com/office/officeart/2009/3/layout/HorizontalOrganizationChart"/>
+    <dgm:cxn modelId="{5CACB048-468F-421E-96BF-A51A9A29C063}" type="presParOf" srcId="{725828E6-A000-4DF8-BAEA-CF9519E93E48}" destId="{BF9DC53F-CBC0-4A33-83D4-E7995A0B517A}" srcOrd="0" destOrd="0" presId="urn:microsoft.com/office/officeart/2009/3/layout/HorizontalOrganizationChart"/>
+    <dgm:cxn modelId="{B78D1FB3-1366-456A-8AC6-672A3447EE12}" type="presParOf" srcId="{725828E6-A000-4DF8-BAEA-CF9519E93E48}" destId="{F80F664B-085B-432D-93B6-F62F709835E6}" srcOrd="1" destOrd="0" presId="urn:microsoft.com/office/officeart/2009/3/layout/HorizontalOrganizationChart"/>
+    <dgm:cxn modelId="{1D815C68-1210-4BB5-9F38-3F6EA78A3493}" type="presParOf" srcId="{F80F664B-085B-432D-93B6-F62F709835E6}" destId="{6C8DAF53-3048-4FB9-9374-C46B97C12941}" srcOrd="0" destOrd="0" presId="urn:microsoft.com/office/officeart/2009/3/layout/HorizontalOrganizationChart"/>
+    <dgm:cxn modelId="{815A4F80-F27F-4319-B852-8854AF46FAC2}" type="presParOf" srcId="{6C8DAF53-3048-4FB9-9374-C46B97C12941}" destId="{04C6AEB2-F547-4703-89D0-7F992B18B45D}" srcOrd="0" destOrd="0" presId="urn:microsoft.com/office/officeart/2009/3/layout/HorizontalOrganizationChart"/>
+    <dgm:cxn modelId="{61E40144-FC8A-472C-93A5-3E3BAF01CA9F}" type="presParOf" srcId="{6C8DAF53-3048-4FB9-9374-C46B97C12941}" destId="{A0E0E8EB-EAD6-4268-9DBD-F6403E7F0AE6}" srcOrd="1" destOrd="0" presId="urn:microsoft.com/office/officeart/2009/3/layout/HorizontalOrganizationChart"/>
+    <dgm:cxn modelId="{8626819B-F182-44F0-B314-12E1BAD05531}" type="presParOf" srcId="{F80F664B-085B-432D-93B6-F62F709835E6}" destId="{AAD7D41D-7C92-4280-A4D6-5AB42D2A3033}" srcOrd="1" destOrd="0" presId="urn:microsoft.com/office/officeart/2009/3/layout/HorizontalOrganizationChart"/>
+    <dgm:cxn modelId="{105EDF59-1BD5-4724-B672-9FC5DC307AC5}" type="presParOf" srcId="{AAD7D41D-7C92-4280-A4D6-5AB42D2A3033}" destId="{F0B1AE00-5C2D-4A6F-8CFB-7FFE77D8802E}" srcOrd="0" destOrd="0" presId="urn:microsoft.com/office/officeart/2009/3/layout/HorizontalOrganizationChart"/>
+    <dgm:cxn modelId="{0D4C37E2-1A80-46E7-93BA-5EDD1168BC67}" type="presParOf" srcId="{AAD7D41D-7C92-4280-A4D6-5AB42D2A3033}" destId="{17C28219-93B8-42BD-9642-2D3C3706907B}" srcOrd="1" destOrd="0" presId="urn:microsoft.com/office/officeart/2009/3/layout/HorizontalOrganizationChart"/>
+    <dgm:cxn modelId="{9825C83D-7562-435E-9D0F-09C466B773EF}" type="presParOf" srcId="{17C28219-93B8-42BD-9642-2D3C3706907B}" destId="{B9F17293-F2A4-4203-A667-B239727D6F1B}" srcOrd="0" destOrd="0" presId="urn:microsoft.com/office/officeart/2009/3/layout/HorizontalOrganizationChart"/>
+    <dgm:cxn modelId="{772E839D-8CE1-40C8-910C-BFDDDC936C34}" type="presParOf" srcId="{B9F17293-F2A4-4203-A667-B239727D6F1B}" destId="{0A81819E-C38C-4A98-A87A-5A41BF26BE12}" srcOrd="0" destOrd="0" presId="urn:microsoft.com/office/officeart/2009/3/layout/HorizontalOrganizationChart"/>
+    <dgm:cxn modelId="{619666B1-5E76-43C2-AAEF-FF0CFBBEB35E}" type="presParOf" srcId="{B9F17293-F2A4-4203-A667-B239727D6F1B}" destId="{B53F5FD3-9D20-4E56-897F-80F8244115CC}" srcOrd="1" destOrd="0" presId="urn:microsoft.com/office/officeart/2009/3/layout/HorizontalOrganizationChart"/>
+    <dgm:cxn modelId="{F6237668-A4B2-4372-8276-CE2B57C2AC24}" type="presParOf" srcId="{17C28219-93B8-42BD-9642-2D3C3706907B}" destId="{A2E9C651-CA68-406E-9E85-47804373B00A}" srcOrd="1" destOrd="0" presId="urn:microsoft.com/office/officeart/2009/3/layout/HorizontalOrganizationChart"/>
+    <dgm:cxn modelId="{86497A40-E690-4850-86E6-91653AE85983}" type="presParOf" srcId="{A2E9C651-CA68-406E-9E85-47804373B00A}" destId="{C3F9B5C3-053A-46D8-A966-DA2D4DCF84B3}" srcOrd="0" destOrd="0" presId="urn:microsoft.com/office/officeart/2009/3/layout/HorizontalOrganizationChart"/>
+    <dgm:cxn modelId="{314B430A-EE0E-406D-95B3-9F8F30316A43}" type="presParOf" srcId="{A2E9C651-CA68-406E-9E85-47804373B00A}" destId="{C8B766D3-440D-4C1C-9C37-17BE08710874}" srcOrd="1" destOrd="0" presId="urn:microsoft.com/office/officeart/2009/3/layout/HorizontalOrganizationChart"/>
+    <dgm:cxn modelId="{ACE1C99A-6D7D-4D93-9A77-B2CD31535FA0}" type="presParOf" srcId="{C8B766D3-440D-4C1C-9C37-17BE08710874}" destId="{E3726220-1FB8-4D0F-AAD6-F4A051AA9FBB}" srcOrd="0" destOrd="0" presId="urn:microsoft.com/office/officeart/2009/3/layout/HorizontalOrganizationChart"/>
+    <dgm:cxn modelId="{C9C6888F-0988-4A13-8DBB-4AB21D94FC32}" type="presParOf" srcId="{E3726220-1FB8-4D0F-AAD6-F4A051AA9FBB}" destId="{566A5AD3-189C-4E39-8EA7-AF8865469DB1}" srcOrd="0" destOrd="0" presId="urn:microsoft.com/office/officeart/2009/3/layout/HorizontalOrganizationChart"/>
+    <dgm:cxn modelId="{EEB427D3-1DFE-4231-A65F-85E0591FD372}" type="presParOf" srcId="{E3726220-1FB8-4D0F-AAD6-F4A051AA9FBB}" destId="{D3422F85-F88E-4703-A67C-44BF2E357661}" srcOrd="1" destOrd="0" presId="urn:microsoft.com/office/officeart/2009/3/layout/HorizontalOrganizationChart"/>
+    <dgm:cxn modelId="{AF27C1E6-ACA8-45AF-9C9C-E07955ED44AB}" type="presParOf" srcId="{C8B766D3-440D-4C1C-9C37-17BE08710874}" destId="{E1C0935D-F39B-45C7-8BCC-E8E464F48B0A}" srcOrd="1" destOrd="0" presId="urn:microsoft.com/office/officeart/2009/3/layout/HorizontalOrganizationChart"/>
+    <dgm:cxn modelId="{7F1E3D89-5D41-43B4-8228-F65B74294A54}" type="presParOf" srcId="{C8B766D3-440D-4C1C-9C37-17BE08710874}" destId="{287683C1-4FA7-4169-8D24-3BD2EBE4D108}" srcOrd="2" destOrd="0" presId="urn:microsoft.com/office/officeart/2009/3/layout/HorizontalOrganizationChart"/>
+    <dgm:cxn modelId="{94C547B0-CF1B-4897-B338-D307F04CB236}" type="presParOf" srcId="{17C28219-93B8-42BD-9642-2D3C3706907B}" destId="{39F7888D-316B-482B-A080-80C8D7BA478E}" srcOrd="2" destOrd="0" presId="urn:microsoft.com/office/officeart/2009/3/layout/HorizontalOrganizationChart"/>
+    <dgm:cxn modelId="{B37B12AC-6F3F-47C3-ADA0-0FCC33FA50CA}" type="presParOf" srcId="{F80F664B-085B-432D-93B6-F62F709835E6}" destId="{5D0F5B3D-F3E4-4AC0-BAA3-2F4AAB239206}" srcOrd="2" destOrd="0" presId="urn:microsoft.com/office/officeart/2009/3/layout/HorizontalOrganizationChart"/>
+    <dgm:cxn modelId="{A2C089B8-1304-40D0-A754-6F2F9050F70A}" type="presParOf" srcId="{725828E6-A000-4DF8-BAEA-CF9519E93E48}" destId="{BCF42F37-0E36-4187-AFCB-4D47451E539F}" srcOrd="2" destOrd="0" presId="urn:microsoft.com/office/officeart/2009/3/layout/HorizontalOrganizationChart"/>
+    <dgm:cxn modelId="{28E5F50F-7ABA-4811-8A31-3367C0C8897A}" type="presParOf" srcId="{725828E6-A000-4DF8-BAEA-CF9519E93E48}" destId="{A28CA169-F3C0-4424-BC84-F449E9E4C7CC}" srcOrd="3" destOrd="0" presId="urn:microsoft.com/office/officeart/2009/3/layout/HorizontalOrganizationChart"/>
+    <dgm:cxn modelId="{7E05384A-575D-4DC0-8304-78F8BC58A9F8}" type="presParOf" srcId="{A28CA169-F3C0-4424-BC84-F449E9E4C7CC}" destId="{B29F48A3-145C-401D-B56F-55431BB4CEC8}" srcOrd="0" destOrd="0" presId="urn:microsoft.com/office/officeart/2009/3/layout/HorizontalOrganizationChart"/>
+    <dgm:cxn modelId="{AED5F7BA-A119-44C9-A0AD-D3A62892F22D}" type="presParOf" srcId="{B29F48A3-145C-401D-B56F-55431BB4CEC8}" destId="{D5305652-E4D4-40D1-95A8-42CA882204F8}" srcOrd="0" destOrd="0" presId="urn:microsoft.com/office/officeart/2009/3/layout/HorizontalOrganizationChart"/>
+    <dgm:cxn modelId="{4C5F8EA1-BBE4-407D-B6C5-6F780CF3B94B}" type="presParOf" srcId="{B29F48A3-145C-401D-B56F-55431BB4CEC8}" destId="{C238B933-BB36-47A8-A22A-A8E781F88161}" srcOrd="1" destOrd="0" presId="urn:microsoft.com/office/officeart/2009/3/layout/HorizontalOrganizationChart"/>
+    <dgm:cxn modelId="{3967208B-94A3-49FF-90CB-A841B997F7FA}" type="presParOf" srcId="{A28CA169-F3C0-4424-BC84-F449E9E4C7CC}" destId="{650739A9-1A2B-4FFF-A48F-525466094328}" srcOrd="1" destOrd="0" presId="urn:microsoft.com/office/officeart/2009/3/layout/HorizontalOrganizationChart"/>
+    <dgm:cxn modelId="{D1451819-236A-4BA4-A8E4-6DD418A443D6}" type="presParOf" srcId="{650739A9-1A2B-4FFF-A48F-525466094328}" destId="{A6277117-3F34-41FC-A085-2A156C5D63BE}" srcOrd="0" destOrd="0" presId="urn:microsoft.com/office/officeart/2009/3/layout/HorizontalOrganizationChart"/>
+    <dgm:cxn modelId="{7C191252-9AD9-44CA-954E-9A987CE16742}" type="presParOf" srcId="{650739A9-1A2B-4FFF-A48F-525466094328}" destId="{C1C224B0-8F28-4855-9014-E739AA8D2F3C}" srcOrd="1" destOrd="0" presId="urn:microsoft.com/office/officeart/2009/3/layout/HorizontalOrganizationChart"/>
+    <dgm:cxn modelId="{31619778-D453-4C66-A683-5508CDF891A6}" type="presParOf" srcId="{C1C224B0-8F28-4855-9014-E739AA8D2F3C}" destId="{6EA77BA9-465D-4C9A-857E-66E14AF348E5}" srcOrd="0" destOrd="0" presId="urn:microsoft.com/office/officeart/2009/3/layout/HorizontalOrganizationChart"/>
+    <dgm:cxn modelId="{7AE55960-9DE7-4526-954B-024F9AD1C772}" type="presParOf" srcId="{6EA77BA9-465D-4C9A-857E-66E14AF348E5}" destId="{0E2FB7D6-70A8-464D-ABBF-03E157F2E1A3}" srcOrd="0" destOrd="0" presId="urn:microsoft.com/office/officeart/2009/3/layout/HorizontalOrganizationChart"/>
+    <dgm:cxn modelId="{34196505-C407-46E1-903F-8D144F22870F}" type="presParOf" srcId="{6EA77BA9-465D-4C9A-857E-66E14AF348E5}" destId="{9DE0F8BC-3E4C-4AA4-B80E-8926A0FDA87D}" srcOrd="1" destOrd="0" presId="urn:microsoft.com/office/officeart/2009/3/layout/HorizontalOrganizationChart"/>
+    <dgm:cxn modelId="{69A65EC7-F566-4362-978E-8CA998C76851}" type="presParOf" srcId="{C1C224B0-8F28-4855-9014-E739AA8D2F3C}" destId="{C0EA8574-55A7-4C32-8C83-A8F420724C08}" srcOrd="1" destOrd="0" presId="urn:microsoft.com/office/officeart/2009/3/layout/HorizontalOrganizationChart"/>
+    <dgm:cxn modelId="{7D9E9186-3A9E-4C23-A3A6-84EF4AAE6ABF}" type="presParOf" srcId="{C1C224B0-8F28-4855-9014-E739AA8D2F3C}" destId="{55430F04-6AC7-46E6-B721-A7F0268C3C23}" srcOrd="2" destOrd="0" presId="urn:microsoft.com/office/officeart/2009/3/layout/HorizontalOrganizationChart"/>
+    <dgm:cxn modelId="{5765CA18-9692-4A1E-BB7F-19C60EDD8151}" type="presParOf" srcId="{A28CA169-F3C0-4424-BC84-F449E9E4C7CC}" destId="{3D8509AB-FA16-4611-BC68-DC5D3F9F4A20}" srcOrd="2" destOrd="0" presId="urn:microsoft.com/office/officeart/2009/3/layout/HorizontalOrganizationChart"/>
+    <dgm:cxn modelId="{21CAA28E-3C06-47AA-AFB1-611301F52B62}" type="presParOf" srcId="{11DA984E-4AD0-4558-873E-EA535D8420EE}" destId="{C3EB5451-523F-44D0-86C6-C983875BA279}" srcOrd="2" destOrd="0" presId="urn:microsoft.com/office/officeart/2009/3/layout/HorizontalOrganizationChart"/>
+    <dgm:cxn modelId="{CAFF16F2-6BC4-435C-8A82-77D2F200DEA1}" type="presParOf" srcId="{2713E45B-920C-48EB-8447-3D59C13A9A1F}" destId="{BCD53EC1-D50A-42AD-9C36-B24B43057AA4}" srcOrd="2" destOrd="0" presId="urn:microsoft.com/office/officeart/2009/3/layout/HorizontalOrganizationChart"/>
   </dgm:cxnLst>
   <dgm:bg/>
   <dgm:whole/>
@@ -3294,15 +3476,15 @@
       <dsp:cNvGrpSpPr/>
     </dsp:nvGrpSpPr>
     <dsp:grpSpPr/>
-    <dsp:sp modelId="{71031FBC-F8B1-4FCC-801B-FC7BFF56876E}">
+    <dsp:sp modelId="{A6277117-3F34-41FC-A085-2A156C5D63BE}">
       <dsp:nvSpPr>
         <dsp:cNvPr id="0" name=""/>
         <dsp:cNvSpPr/>
       </dsp:nvSpPr>
       <dsp:spPr>
         <a:xfrm>
-          <a:off x="8602715" y="4001523"/>
-          <a:ext cx="248384" cy="761713"/>
+          <a:off x="6162768" y="4510529"/>
+          <a:ext cx="361987" cy="91440"/>
         </a:xfrm>
         <a:custGeom>
           <a:avLst/>
@@ -3313,13 +3495,10 @@
           <a:pathLst>
             <a:path>
               <a:moveTo>
-                <a:pt x="0" y="0"/>
+                <a:pt x="0" y="45720"/>
               </a:moveTo>
               <a:lnTo>
-                <a:pt x="0" y="761713"/>
-              </a:lnTo>
-              <a:lnTo>
-                <a:pt x="248384" y="761713"/>
+                <a:pt x="361987" y="45720"/>
               </a:lnTo>
             </a:path>
           </a:pathLst>
@@ -3353,15 +3532,15 @@
         <a:fontRef idx="minor"/>
       </dsp:style>
     </dsp:sp>
-    <dsp:sp modelId="{5513AC60-615D-409B-A023-48E7C7ADF565}">
+    <dsp:sp modelId="{BCF42F37-0E36-4187-AFCB-4D47451E539F}">
       <dsp:nvSpPr>
         <dsp:cNvPr id="0" name=""/>
         <dsp:cNvSpPr/>
       </dsp:nvSpPr>
       <dsp:spPr>
         <a:xfrm>
-          <a:off x="8263256" y="2825835"/>
-          <a:ext cx="1001818" cy="347738"/>
+          <a:off x="3990844" y="4167113"/>
+          <a:ext cx="361987" cy="389136"/>
         </a:xfrm>
         <a:custGeom>
           <a:avLst/>
@@ -3375,13 +3554,13 @@
                 <a:pt x="0" y="0"/>
               </a:moveTo>
               <a:lnTo>
-                <a:pt x="0" y="173869"/>
+                <a:pt x="180993" y="0"/>
               </a:lnTo>
               <a:lnTo>
-                <a:pt x="1001818" y="173869"/>
+                <a:pt x="180993" y="389136"/>
               </a:lnTo>
               <a:lnTo>
-                <a:pt x="1001818" y="347738"/>
+                <a:pt x="361987" y="389136"/>
               </a:lnTo>
             </a:path>
           </a:pathLst>
@@ -3415,15 +3594,15 @@
         <a:fontRef idx="minor"/>
       </dsp:style>
     </dsp:sp>
-    <dsp:sp modelId="{ABC704CA-6BDD-4333-A596-9640100AD48A}">
+    <dsp:sp modelId="{C3F9B5C3-053A-46D8-A966-DA2D4DCF84B3}">
       <dsp:nvSpPr>
         <dsp:cNvPr id="0" name=""/>
         <dsp:cNvSpPr/>
       </dsp:nvSpPr>
       <dsp:spPr>
         <a:xfrm>
-          <a:off x="6599078" y="4001523"/>
-          <a:ext cx="248384" cy="761713"/>
+          <a:off x="8334691" y="3732257"/>
+          <a:ext cx="361987" cy="91440"/>
         </a:xfrm>
         <a:custGeom>
           <a:avLst/>
@@ -3434,13 +3613,10 @@
           <a:pathLst>
             <a:path>
               <a:moveTo>
-                <a:pt x="0" y="0"/>
+                <a:pt x="0" y="45720"/>
               </a:moveTo>
               <a:lnTo>
-                <a:pt x="0" y="761713"/>
-              </a:lnTo>
-              <a:lnTo>
-                <a:pt x="248384" y="761713"/>
+                <a:pt x="361987" y="45720"/>
               </a:lnTo>
             </a:path>
           </a:pathLst>
@@ -3474,15 +3650,15 @@
         <a:fontRef idx="minor"/>
       </dsp:style>
     </dsp:sp>
-    <dsp:sp modelId="{2096A139-1797-48FB-BA03-C753AED9B4BC}">
+    <dsp:sp modelId="{F0B1AE00-5C2D-4A6F-8CFB-7FFE77D8802E}">
       <dsp:nvSpPr>
         <dsp:cNvPr id="0" name=""/>
         <dsp:cNvSpPr/>
       </dsp:nvSpPr>
       <dsp:spPr>
         <a:xfrm>
-          <a:off x="7261437" y="2825835"/>
-          <a:ext cx="1001818" cy="347738"/>
+          <a:off x="6162768" y="3732257"/>
+          <a:ext cx="361987" cy="91440"/>
         </a:xfrm>
         <a:custGeom>
           <a:avLst/>
@@ -3493,16 +3669,10 @@
           <a:pathLst>
             <a:path>
               <a:moveTo>
-                <a:pt x="1001818" y="0"/>
+                <a:pt x="0" y="45720"/>
               </a:moveTo>
               <a:lnTo>
-                <a:pt x="1001818" y="173869"/>
-              </a:lnTo>
-              <a:lnTo>
-                <a:pt x="0" y="173869"/>
-              </a:lnTo>
-              <a:lnTo>
-                <a:pt x="0" y="347738"/>
+                <a:pt x="361987" y="45720"/>
               </a:lnTo>
             </a:path>
           </a:pathLst>
@@ -3536,15 +3706,77 @@
         <a:fontRef idx="minor"/>
       </dsp:style>
     </dsp:sp>
-    <dsp:sp modelId="{6D2253F2-45D8-44E7-B1A5-4067573F858E}">
+    <dsp:sp modelId="{BF9DC53F-CBC0-4A33-83D4-E7995A0B517A}">
       <dsp:nvSpPr>
         <dsp:cNvPr id="0" name=""/>
         <dsp:cNvSpPr/>
       </dsp:nvSpPr>
       <dsp:spPr>
         <a:xfrm>
-          <a:off x="4549903" y="1650147"/>
-          <a:ext cx="3713353" cy="347738"/>
+          <a:off x="3990844" y="3777977"/>
+          <a:ext cx="361987" cy="389136"/>
+        </a:xfrm>
+        <a:custGeom>
+          <a:avLst/>
+          <a:gdLst/>
+          <a:ahLst/>
+          <a:cxnLst/>
+          <a:rect l="0" t="0" r="0" b="0"/>
+          <a:pathLst>
+            <a:path>
+              <a:moveTo>
+                <a:pt x="0" y="389136"/>
+              </a:moveTo>
+              <a:lnTo>
+                <a:pt x="180993" y="389136"/>
+              </a:lnTo>
+              <a:lnTo>
+                <a:pt x="180993" y="0"/>
+              </a:lnTo>
+              <a:lnTo>
+                <a:pt x="361987" y="0"/>
+              </a:lnTo>
+            </a:path>
+          </a:pathLst>
+        </a:custGeom>
+        <a:noFill/>
+        <a:ln w="12700" cap="flat" cmpd="sng" algn="ctr">
+          <a:solidFill>
+            <a:schemeClr val="accent1">
+              <a:shade val="80000"/>
+              <a:hueOff val="0"/>
+              <a:satOff val="0"/>
+              <a:lumOff val="0"/>
+              <a:alphaOff val="0"/>
+            </a:schemeClr>
+          </a:solidFill>
+          <a:prstDash val="solid"/>
+          <a:miter lim="800000"/>
+        </a:ln>
+        <a:effectLst/>
+      </dsp:spPr>
+      <dsp:style>
+        <a:lnRef idx="2">
+          <a:scrgbClr r="0" g="0" b="0"/>
+        </a:lnRef>
+        <a:fillRef idx="0">
+          <a:scrgbClr r="0" g="0" b="0"/>
+        </a:fillRef>
+        <a:effectRef idx="0">
+          <a:scrgbClr r="0" g="0" b="0"/>
+        </a:effectRef>
+        <a:fontRef idx="minor"/>
+      </dsp:style>
+    </dsp:sp>
+    <dsp:sp modelId="{19F42125-481B-44CC-99B3-E553D8BC9BEB}">
+      <dsp:nvSpPr>
+        <dsp:cNvPr id="0" name=""/>
+        <dsp:cNvSpPr/>
+      </dsp:nvSpPr>
+      <dsp:spPr>
+        <a:xfrm>
+          <a:off x="1818921" y="2805136"/>
+          <a:ext cx="361987" cy="1361976"/>
         </a:xfrm>
         <a:custGeom>
           <a:avLst/>
@@ -3558,13 +3790,13 @@
                 <a:pt x="0" y="0"/>
               </a:moveTo>
               <a:lnTo>
-                <a:pt x="0" y="173869"/>
+                <a:pt x="180993" y="0"/>
               </a:lnTo>
               <a:lnTo>
-                <a:pt x="3713353" y="173869"/>
+                <a:pt x="180993" y="1361976"/>
               </a:lnTo>
               <a:lnTo>
-                <a:pt x="3713353" y="347738"/>
+                <a:pt x="361987" y="1361976"/>
               </a:lnTo>
             </a:path>
           </a:pathLst>
@@ -3598,15 +3830,15 @@
         <a:fontRef idx="minor"/>
       </dsp:style>
     </dsp:sp>
-    <dsp:sp modelId="{D331CBC7-0A66-4857-943E-3664A559C4F0}">
+    <dsp:sp modelId="{66065974-BED5-4F32-B122-0F132D186B02}">
       <dsp:nvSpPr>
         <dsp:cNvPr id="0" name=""/>
         <dsp:cNvSpPr/>
       </dsp:nvSpPr>
       <dsp:spPr>
         <a:xfrm>
-          <a:off x="4595440" y="4001523"/>
-          <a:ext cx="248384" cy="761713"/>
+          <a:off x="6162768" y="2953985"/>
+          <a:ext cx="361987" cy="91440"/>
         </a:xfrm>
         <a:custGeom>
           <a:avLst/>
@@ -3617,13 +3849,10 @@
           <a:pathLst>
             <a:path>
               <a:moveTo>
-                <a:pt x="0" y="0"/>
+                <a:pt x="0" y="45720"/>
               </a:moveTo>
               <a:lnTo>
-                <a:pt x="0" y="761713"/>
-              </a:lnTo>
-              <a:lnTo>
-                <a:pt x="248384" y="761713"/>
+                <a:pt x="361987" y="45720"/>
               </a:lnTo>
             </a:path>
           </a:pathLst>
@@ -3657,15 +3886,15 @@
         <a:fontRef idx="minor"/>
       </dsp:style>
     </dsp:sp>
-    <dsp:sp modelId="{9DCFFC93-9DF2-4873-9C44-CDD86397B319}">
+    <dsp:sp modelId="{E31E7DC3-EA3F-4D42-B094-2C5B08161DDA}">
       <dsp:nvSpPr>
         <dsp:cNvPr id="0" name=""/>
         <dsp:cNvSpPr/>
       </dsp:nvSpPr>
       <dsp:spPr>
         <a:xfrm>
-          <a:off x="4255981" y="2825835"/>
-          <a:ext cx="1001818" cy="347738"/>
+          <a:off x="3990844" y="2610568"/>
+          <a:ext cx="361987" cy="389136"/>
         </a:xfrm>
         <a:custGeom>
           <a:avLst/>
@@ -3679,13 +3908,13 @@
                 <a:pt x="0" y="0"/>
               </a:moveTo>
               <a:lnTo>
-                <a:pt x="0" y="173869"/>
+                <a:pt x="180993" y="0"/>
               </a:lnTo>
               <a:lnTo>
-                <a:pt x="1001818" y="173869"/>
+                <a:pt x="180993" y="389136"/>
               </a:lnTo>
               <a:lnTo>
-                <a:pt x="1001818" y="347738"/>
+                <a:pt x="361987" y="389136"/>
               </a:lnTo>
             </a:path>
           </a:pathLst>
@@ -3719,15 +3948,15 @@
         <a:fontRef idx="minor"/>
       </dsp:style>
     </dsp:sp>
-    <dsp:sp modelId="{6FCCB28E-19E0-46DC-9AE0-C29420DD7A81}">
+    <dsp:sp modelId="{D9BBDF49-6C14-4068-B186-F5BB8193E5F5}">
       <dsp:nvSpPr>
         <dsp:cNvPr id="0" name=""/>
         <dsp:cNvSpPr/>
       </dsp:nvSpPr>
       <dsp:spPr>
         <a:xfrm>
-          <a:off x="2591802" y="4001523"/>
-          <a:ext cx="248384" cy="761713"/>
+          <a:off x="8334691" y="2175712"/>
+          <a:ext cx="361987" cy="91440"/>
         </a:xfrm>
         <a:custGeom>
           <a:avLst/>
@@ -3738,13 +3967,10 @@
           <a:pathLst>
             <a:path>
               <a:moveTo>
-                <a:pt x="0" y="0"/>
+                <a:pt x="0" y="45720"/>
               </a:moveTo>
               <a:lnTo>
-                <a:pt x="0" y="761713"/>
-              </a:lnTo>
-              <a:lnTo>
-                <a:pt x="248384" y="761713"/>
+                <a:pt x="361987" y="45720"/>
               </a:lnTo>
             </a:path>
           </a:pathLst>
@@ -3778,15 +4004,15 @@
         <a:fontRef idx="minor"/>
       </dsp:style>
     </dsp:sp>
-    <dsp:sp modelId="{156A4072-A85A-423E-9D38-4D25D31BE6EF}">
+    <dsp:sp modelId="{945CA7E0-FF80-4909-8797-47A74094211B}">
       <dsp:nvSpPr>
         <dsp:cNvPr id="0" name=""/>
         <dsp:cNvSpPr/>
       </dsp:nvSpPr>
       <dsp:spPr>
         <a:xfrm>
-          <a:off x="3254162" y="2825835"/>
-          <a:ext cx="1001818" cy="347738"/>
+          <a:off x="6162768" y="2175712"/>
+          <a:ext cx="361987" cy="91440"/>
         </a:xfrm>
         <a:custGeom>
           <a:avLst/>
@@ -3797,16 +4023,10 @@
           <a:pathLst>
             <a:path>
               <a:moveTo>
-                <a:pt x="1001818" y="0"/>
+                <a:pt x="0" y="45720"/>
               </a:moveTo>
               <a:lnTo>
-                <a:pt x="1001818" y="173869"/>
-              </a:lnTo>
-              <a:lnTo>
-                <a:pt x="0" y="173869"/>
-              </a:lnTo>
-              <a:lnTo>
-                <a:pt x="0" y="347738"/>
+                <a:pt x="361987" y="45720"/>
               </a:lnTo>
             </a:path>
           </a:pathLst>
@@ -3840,15 +4060,15 @@
         <a:fontRef idx="minor"/>
       </dsp:style>
     </dsp:sp>
-    <dsp:sp modelId="{42831692-6176-4E0A-A015-BAAA55A134D8}">
+    <dsp:sp modelId="{06C21965-8E71-4FE4-8ABE-1C052EE030C1}">
       <dsp:nvSpPr>
         <dsp:cNvPr id="0" name=""/>
         <dsp:cNvSpPr/>
       </dsp:nvSpPr>
       <dsp:spPr>
         <a:xfrm>
-          <a:off x="4255981" y="1650147"/>
-          <a:ext cx="293922" cy="347738"/>
+          <a:off x="3990844" y="2221432"/>
+          <a:ext cx="361987" cy="389136"/>
         </a:xfrm>
         <a:custGeom>
           <a:avLst/>
@@ -3859,16 +4079,78 @@
           <a:pathLst>
             <a:path>
               <a:moveTo>
-                <a:pt x="293922" y="0"/>
+                <a:pt x="0" y="389136"/>
               </a:moveTo>
               <a:lnTo>
-                <a:pt x="293922" y="173869"/>
+                <a:pt x="180993" y="389136"/>
               </a:lnTo>
               <a:lnTo>
-                <a:pt x="0" y="173869"/>
+                <a:pt x="180993" y="0"/>
               </a:lnTo>
               <a:lnTo>
-                <a:pt x="0" y="347738"/>
+                <a:pt x="361987" y="0"/>
+              </a:lnTo>
+            </a:path>
+          </a:pathLst>
+        </a:custGeom>
+        <a:noFill/>
+        <a:ln w="12700" cap="flat" cmpd="sng" algn="ctr">
+          <a:solidFill>
+            <a:schemeClr val="accent1">
+              <a:shade val="80000"/>
+              <a:hueOff val="0"/>
+              <a:satOff val="0"/>
+              <a:lumOff val="0"/>
+              <a:alphaOff val="0"/>
+            </a:schemeClr>
+          </a:solidFill>
+          <a:prstDash val="solid"/>
+          <a:miter lim="800000"/>
+        </a:ln>
+        <a:effectLst/>
+      </dsp:spPr>
+      <dsp:style>
+        <a:lnRef idx="2">
+          <a:scrgbClr r="0" g="0" b="0"/>
+        </a:lnRef>
+        <a:fillRef idx="0">
+          <a:scrgbClr r="0" g="0" b="0"/>
+        </a:fillRef>
+        <a:effectRef idx="0">
+          <a:scrgbClr r="0" g="0" b="0"/>
+        </a:effectRef>
+        <a:fontRef idx="minor"/>
+      </dsp:style>
+    </dsp:sp>
+    <dsp:sp modelId="{DAB85FB9-BC47-47AC-922F-C97E272C5E93}">
+      <dsp:nvSpPr>
+        <dsp:cNvPr id="0" name=""/>
+        <dsp:cNvSpPr/>
+      </dsp:nvSpPr>
+      <dsp:spPr>
+        <a:xfrm>
+          <a:off x="1818921" y="2610568"/>
+          <a:ext cx="361987" cy="194568"/>
+        </a:xfrm>
+        <a:custGeom>
+          <a:avLst/>
+          <a:gdLst/>
+          <a:ahLst/>
+          <a:cxnLst/>
+          <a:rect l="0" t="0" r="0" b="0"/>
+          <a:pathLst>
+            <a:path>
+              <a:moveTo>
+                <a:pt x="0" y="194568"/>
+              </a:moveTo>
+              <a:lnTo>
+                <a:pt x="180993" y="194568"/>
+              </a:lnTo>
+              <a:lnTo>
+                <a:pt x="180993" y="0"/>
+              </a:lnTo>
+              <a:lnTo>
+                <a:pt x="361987" y="0"/>
               </a:lnTo>
             </a:path>
           </a:pathLst>
@@ -3902,15 +4184,15 @@
         <a:fontRef idx="minor"/>
       </dsp:style>
     </dsp:sp>
-    <dsp:sp modelId="{1C32F77C-367C-4538-8F84-98D3D53E7FAB}">
+    <dsp:sp modelId="{48540270-B1BB-48C9-B2A0-F938D5E4DB34}">
       <dsp:nvSpPr>
         <dsp:cNvPr id="0" name=""/>
         <dsp:cNvSpPr/>
       </dsp:nvSpPr>
       <dsp:spPr>
         <a:xfrm>
-          <a:off x="174190" y="2825835"/>
-          <a:ext cx="248384" cy="761713"/>
+          <a:off x="3990844" y="1397440"/>
+          <a:ext cx="361987" cy="91440"/>
         </a:xfrm>
         <a:custGeom>
           <a:avLst/>
@@ -3921,13 +4203,10 @@
           <a:pathLst>
             <a:path>
               <a:moveTo>
-                <a:pt x="0" y="0"/>
+                <a:pt x="0" y="45720"/>
               </a:moveTo>
               <a:lnTo>
-                <a:pt x="0" y="761713"/>
-              </a:lnTo>
-              <a:lnTo>
-                <a:pt x="248384" y="761713"/>
+                <a:pt x="361987" y="45720"/>
               </a:lnTo>
             </a:path>
           </a:pathLst>
@@ -3961,15 +4240,15 @@
         <a:fontRef idx="minor"/>
       </dsp:style>
     </dsp:sp>
-    <dsp:sp modelId="{20E1757A-DC25-423D-96D1-5AB436AB4245}">
+    <dsp:sp modelId="{918711BF-84CD-43C5-A9E0-8CE2EEFD00C4}">
       <dsp:nvSpPr>
         <dsp:cNvPr id="0" name=""/>
         <dsp:cNvSpPr/>
       </dsp:nvSpPr>
       <dsp:spPr>
         <a:xfrm>
-          <a:off x="836549" y="1650147"/>
-          <a:ext cx="3713353" cy="347738"/>
+          <a:off x="1818921" y="1443160"/>
+          <a:ext cx="361987" cy="1361976"/>
         </a:xfrm>
         <a:custGeom>
           <a:avLst/>
@@ -3980,16 +4259,16 @@
           <a:pathLst>
             <a:path>
               <a:moveTo>
-                <a:pt x="3713353" y="0"/>
+                <a:pt x="0" y="1361976"/>
               </a:moveTo>
               <a:lnTo>
-                <a:pt x="3713353" y="173869"/>
+                <a:pt x="180993" y="1361976"/>
               </a:lnTo>
               <a:lnTo>
-                <a:pt x="0" y="173869"/>
+                <a:pt x="180993" y="0"/>
               </a:lnTo>
               <a:lnTo>
-                <a:pt x="0" y="347738"/>
+                <a:pt x="361987" y="0"/>
               </a:lnTo>
             </a:path>
           </a:pathLst>
@@ -4023,15 +4302,15 @@
         <a:fontRef idx="minor"/>
       </dsp:style>
     </dsp:sp>
-    <dsp:sp modelId="{DDC74B35-F776-4B58-AE94-BF078DE83068}">
+    <dsp:sp modelId="{E6352167-7D3A-4477-A66B-E2705E0B25DB}">
       <dsp:nvSpPr>
         <dsp:cNvPr id="0" name=""/>
         <dsp:cNvSpPr/>
       </dsp:nvSpPr>
       <dsp:spPr>
         <a:xfrm>
-          <a:off x="3721953" y="822197"/>
-          <a:ext cx="1655898" cy="827949"/>
+          <a:off x="8985" y="2529121"/>
+          <a:ext cx="1809936" cy="552030"/>
         </a:xfrm>
         <a:prstGeom prst="rect">
           <a:avLst/>
@@ -4073,12 +4352,12 @@
         </a:fontRef>
       </dsp:style>
       <dsp:txBody>
-        <a:bodyPr spcFirstLastPara="0" vert="horz" wrap="square" lIns="10795" tIns="10795" rIns="10795" bIns="10795" numCol="1" spcCol="1270" anchor="ctr" anchorCtr="0">
+        <a:bodyPr spcFirstLastPara="0" vert="horz" wrap="square" lIns="9525" tIns="9525" rIns="9525" bIns="9525" numCol="1" spcCol="1270" anchor="ctr" anchorCtr="0">
           <a:noAutofit/>
         </a:bodyPr>
         <a:lstStyle/>
         <a:p>
-          <a:pPr marL="0" lvl="0" indent="0" algn="ctr" defTabSz="755650">
+          <a:pPr marL="0" lvl="0" indent="0" algn="ctr" defTabSz="666750">
             <a:lnSpc>
               <a:spcPct val="90000"/>
             </a:lnSpc>
@@ -4091,26 +4370,26 @@
             <a:buNone/>
           </a:pPr>
           <a:r>
-            <a:rPr lang="en-US" altLang="zh-CN" sz="1700" kern="1200" dirty="0"/>
+            <a:rPr lang="en-US" altLang="zh-CN" sz="1500" kern="1200" dirty="0"/>
             <a:t>General function</a:t>
           </a:r>
-          <a:endParaRPr lang="zh-CN" altLang="en-US" sz="1700" kern="1200" dirty="0"/>
+          <a:endParaRPr lang="zh-CN" altLang="en-US" sz="1500" kern="1200" dirty="0"/>
         </a:p>
       </dsp:txBody>
       <dsp:txXfrm>
-        <a:off x="3721953" y="822197"/>
-        <a:ext cx="1655898" cy="827949"/>
+        <a:off x="8985" y="2529121"/>
+        <a:ext cx="1809936" cy="552030"/>
       </dsp:txXfrm>
     </dsp:sp>
-    <dsp:sp modelId="{3569DE56-31A2-418A-9A41-6CFB902B0BE4}">
+    <dsp:sp modelId="{D4D3088E-F816-4DB7-B82A-AAD62057124A}">
       <dsp:nvSpPr>
         <dsp:cNvPr id="0" name=""/>
         <dsp:cNvSpPr/>
       </dsp:nvSpPr>
       <dsp:spPr>
         <a:xfrm>
-          <a:off x="8600" y="1997886"/>
-          <a:ext cx="1655898" cy="827949"/>
+          <a:off x="2180908" y="1167144"/>
+          <a:ext cx="1809936" cy="552030"/>
         </a:xfrm>
         <a:prstGeom prst="rect">
           <a:avLst/>
@@ -4152,12 +4431,12 @@
         </a:fontRef>
       </dsp:style>
       <dsp:txBody>
-        <a:bodyPr spcFirstLastPara="0" vert="horz" wrap="square" lIns="10795" tIns="10795" rIns="10795" bIns="10795" numCol="1" spcCol="1270" anchor="ctr" anchorCtr="0">
+        <a:bodyPr spcFirstLastPara="0" vert="horz" wrap="square" lIns="9525" tIns="9525" rIns="9525" bIns="9525" numCol="1" spcCol="1270" anchor="ctr" anchorCtr="0">
           <a:noAutofit/>
         </a:bodyPr>
         <a:lstStyle/>
         <a:p>
-          <a:pPr marL="0" lvl="0" indent="0" algn="ctr" defTabSz="755650">
+          <a:pPr marL="0" lvl="0" indent="0" algn="ctr" defTabSz="666750">
             <a:lnSpc>
               <a:spcPct val="90000"/>
             </a:lnSpc>
@@ -4170,26 +4449,26 @@
             <a:buNone/>
           </a:pPr>
           <a:r>
-            <a:rPr lang="en-US" altLang="zh-CN" sz="1700" kern="1200" dirty="0"/>
+            <a:rPr lang="en-US" altLang="zh-CN" sz="1500" kern="1200" dirty="0"/>
             <a:t>Ensemble method</a:t>
           </a:r>
-          <a:endParaRPr lang="zh-CN" altLang="en-US" sz="1700" kern="1200" dirty="0"/>
+          <a:endParaRPr lang="zh-CN" altLang="en-US" sz="1500" kern="1200" dirty="0"/>
         </a:p>
       </dsp:txBody>
       <dsp:txXfrm>
-        <a:off x="8600" y="1997886"/>
-        <a:ext cx="1655898" cy="827949"/>
+        <a:off x="2180908" y="1167144"/>
+        <a:ext cx="1809936" cy="552030"/>
       </dsp:txXfrm>
     </dsp:sp>
-    <dsp:sp modelId="{C842B172-73B0-4D3E-882A-A1AAAED9E9BF}">
+    <dsp:sp modelId="{841FC3F0-EDEE-47D9-A7AB-E44779B97831}">
       <dsp:nvSpPr>
         <dsp:cNvPr id="0" name=""/>
         <dsp:cNvSpPr/>
       </dsp:nvSpPr>
       <dsp:spPr>
         <a:xfrm>
-          <a:off x="422575" y="3173574"/>
-          <a:ext cx="1655898" cy="827949"/>
+          <a:off x="4352831" y="1167144"/>
+          <a:ext cx="1809936" cy="552030"/>
         </a:xfrm>
         <a:prstGeom prst="rect">
           <a:avLst/>
@@ -4231,12 +4510,12 @@
         </a:fontRef>
       </dsp:style>
       <dsp:txBody>
-        <a:bodyPr spcFirstLastPara="0" vert="horz" wrap="square" lIns="10795" tIns="10795" rIns="10795" bIns="10795" numCol="1" spcCol="1270" anchor="ctr" anchorCtr="0">
+        <a:bodyPr spcFirstLastPara="0" vert="horz" wrap="square" lIns="9525" tIns="9525" rIns="9525" bIns="9525" numCol="1" spcCol="1270" anchor="ctr" anchorCtr="0">
           <a:noAutofit/>
         </a:bodyPr>
         <a:lstStyle/>
         <a:p>
-          <a:pPr marL="0" lvl="0" indent="0" algn="ctr" defTabSz="755650">
+          <a:pPr marL="0" lvl="0" indent="0" algn="ctr" defTabSz="666750">
             <a:lnSpc>
               <a:spcPct val="90000"/>
             </a:lnSpc>
@@ -4249,26 +4528,26 @@
             <a:buNone/>
           </a:pPr>
           <a:r>
-            <a:rPr lang="en-US" altLang="zh-CN" sz="1700" kern="1200" dirty="0"/>
+            <a:rPr lang="en-US" altLang="zh-CN" sz="1500" kern="1200" dirty="0"/>
             <a:t>Performance report</a:t>
           </a:r>
-          <a:endParaRPr lang="zh-CN" altLang="en-US" sz="1700" kern="1200" dirty="0"/>
+          <a:endParaRPr lang="zh-CN" altLang="en-US" sz="1500" kern="1200" dirty="0"/>
         </a:p>
       </dsp:txBody>
       <dsp:txXfrm>
-        <a:off x="422575" y="3173574"/>
-        <a:ext cx="1655898" cy="827949"/>
+        <a:off x="4352831" y="1167144"/>
+        <a:ext cx="1809936" cy="552030"/>
       </dsp:txXfrm>
     </dsp:sp>
-    <dsp:sp modelId="{182EC3F2-B35A-405E-89C0-5D66F6BE1000}">
+    <dsp:sp modelId="{9EEBEB92-64BA-4F7F-98DF-F7F236744EF3}">
       <dsp:nvSpPr>
         <dsp:cNvPr id="0" name=""/>
         <dsp:cNvSpPr/>
       </dsp:nvSpPr>
       <dsp:spPr>
         <a:xfrm>
-          <a:off x="3428031" y="1997886"/>
-          <a:ext cx="1655898" cy="827949"/>
+          <a:off x="2180908" y="2334553"/>
+          <a:ext cx="1809936" cy="552030"/>
         </a:xfrm>
         <a:prstGeom prst="rect">
           <a:avLst/>
@@ -4310,12 +4589,12 @@
         </a:fontRef>
       </dsp:style>
       <dsp:txBody>
-        <a:bodyPr spcFirstLastPara="0" vert="horz" wrap="square" lIns="10795" tIns="10795" rIns="10795" bIns="10795" numCol="1" spcCol="1270" anchor="ctr" anchorCtr="0">
+        <a:bodyPr spcFirstLastPara="0" vert="horz" wrap="square" lIns="9525" tIns="9525" rIns="9525" bIns="9525" numCol="1" spcCol="1270" anchor="ctr" anchorCtr="0">
           <a:noAutofit/>
         </a:bodyPr>
         <a:lstStyle/>
         <a:p>
-          <a:pPr marL="0" lvl="0" indent="0" algn="ctr" defTabSz="755650">
+          <a:pPr marL="0" lvl="0" indent="0" algn="ctr" defTabSz="666750">
             <a:lnSpc>
               <a:spcPct val="90000"/>
             </a:lnSpc>
@@ -4328,26 +4607,26 @@
             <a:buNone/>
           </a:pPr>
           <a:r>
-            <a:rPr lang="en-US" altLang="zh-CN" sz="1700" kern="1200" dirty="0"/>
+            <a:rPr lang="en-US" altLang="zh-CN" sz="1500" kern="1200" dirty="0"/>
             <a:t>Rf/lasso/other</a:t>
           </a:r>
-          <a:endParaRPr lang="zh-CN" altLang="en-US" sz="1700" kern="1200" dirty="0"/>
+          <a:endParaRPr lang="zh-CN" altLang="en-US" sz="1500" kern="1200" dirty="0"/>
         </a:p>
       </dsp:txBody>
       <dsp:txXfrm>
-        <a:off x="3428031" y="1997886"/>
-        <a:ext cx="1655898" cy="827949"/>
+        <a:off x="2180908" y="2334553"/>
+        <a:ext cx="1809936" cy="552030"/>
       </dsp:txXfrm>
     </dsp:sp>
-    <dsp:sp modelId="{536AECD9-A66E-4912-87A4-35FC734D2EB3}">
+    <dsp:sp modelId="{642D27FE-2E27-4958-A358-B5CB93F05DF0}">
       <dsp:nvSpPr>
         <dsp:cNvPr id="0" name=""/>
         <dsp:cNvSpPr/>
       </dsp:nvSpPr>
       <dsp:spPr>
         <a:xfrm>
-          <a:off x="2426212" y="3173574"/>
-          <a:ext cx="1655898" cy="827949"/>
+          <a:off x="4352831" y="1945417"/>
+          <a:ext cx="1809936" cy="552030"/>
         </a:xfrm>
         <a:prstGeom prst="rect">
           <a:avLst/>
@@ -4389,12 +4668,12 @@
         </a:fontRef>
       </dsp:style>
       <dsp:txBody>
-        <a:bodyPr spcFirstLastPara="0" vert="horz" wrap="square" lIns="10795" tIns="10795" rIns="10795" bIns="10795" numCol="1" spcCol="1270" anchor="ctr" anchorCtr="0">
+        <a:bodyPr spcFirstLastPara="0" vert="horz" wrap="square" lIns="9525" tIns="9525" rIns="9525" bIns="9525" numCol="1" spcCol="1270" anchor="ctr" anchorCtr="0">
           <a:noAutofit/>
         </a:bodyPr>
         <a:lstStyle/>
         <a:p>
-          <a:pPr marL="0" lvl="0" indent="0" algn="ctr" defTabSz="755650">
+          <a:pPr marL="0" lvl="0" indent="0" algn="ctr" defTabSz="666750">
             <a:lnSpc>
               <a:spcPct val="90000"/>
             </a:lnSpc>
@@ -4407,26 +4686,26 @@
             <a:buNone/>
           </a:pPr>
           <a:r>
-            <a:rPr lang="en-US" altLang="zh-CN" sz="1700" kern="1200" dirty="0"/>
+            <a:rPr lang="en-US" altLang="zh-CN" sz="1500" kern="1200" dirty="0"/>
             <a:t>Use cluster</a:t>
           </a:r>
-          <a:endParaRPr lang="zh-CN" altLang="en-US" sz="1700" kern="1200" dirty="0"/>
+          <a:endParaRPr lang="zh-CN" altLang="en-US" sz="1500" kern="1200" dirty="0"/>
         </a:p>
       </dsp:txBody>
       <dsp:txXfrm>
-        <a:off x="2426212" y="3173574"/>
-        <a:ext cx="1655898" cy="827949"/>
+        <a:off x="4352831" y="1945417"/>
+        <a:ext cx="1809936" cy="552030"/>
       </dsp:txXfrm>
     </dsp:sp>
-    <dsp:sp modelId="{B2813BFB-0200-4D81-9EB0-C2F21B13BBFF}">
+    <dsp:sp modelId="{19B29335-EA1A-49EE-974D-F0C5AD5FD79F}">
       <dsp:nvSpPr>
         <dsp:cNvPr id="0" name=""/>
         <dsp:cNvSpPr/>
       </dsp:nvSpPr>
       <dsp:spPr>
         <a:xfrm>
-          <a:off x="2840187" y="4349262"/>
-          <a:ext cx="1655898" cy="827949"/>
+          <a:off x="6524755" y="1945417"/>
+          <a:ext cx="1809936" cy="552030"/>
         </a:xfrm>
         <a:prstGeom prst="rect">
           <a:avLst/>
@@ -4468,12 +4747,12 @@
         </a:fontRef>
       </dsp:style>
       <dsp:txBody>
-        <a:bodyPr spcFirstLastPara="0" vert="horz" wrap="square" lIns="10795" tIns="10795" rIns="10795" bIns="10795" numCol="1" spcCol="1270" anchor="ctr" anchorCtr="0">
+        <a:bodyPr spcFirstLastPara="0" vert="horz" wrap="square" lIns="9525" tIns="9525" rIns="9525" bIns="9525" numCol="1" spcCol="1270" anchor="ctr" anchorCtr="0">
           <a:noAutofit/>
         </a:bodyPr>
         <a:lstStyle/>
         <a:p>
-          <a:pPr marL="0" lvl="0" indent="0" algn="ctr" defTabSz="755650">
+          <a:pPr marL="0" lvl="0" indent="0" algn="ctr" defTabSz="666750">
             <a:lnSpc>
               <a:spcPct val="90000"/>
             </a:lnSpc>
@@ -4486,26 +4765,26 @@
             <a:buNone/>
           </a:pPr>
           <a:r>
-            <a:rPr lang="en-US" altLang="zh-CN" sz="1700" kern="1200" dirty="0"/>
+            <a:rPr lang="en-US" altLang="zh-CN" sz="1500" kern="1200" dirty="0"/>
             <a:t>Separate model information &amp; report</a:t>
           </a:r>
-          <a:endParaRPr lang="zh-CN" altLang="en-US" sz="1700" kern="1200" dirty="0"/>
+          <a:endParaRPr lang="zh-CN" altLang="en-US" sz="1500" kern="1200" dirty="0"/>
         </a:p>
       </dsp:txBody>
       <dsp:txXfrm>
-        <a:off x="2840187" y="4349262"/>
-        <a:ext cx="1655898" cy="827949"/>
+        <a:off x="6524755" y="1945417"/>
+        <a:ext cx="1809936" cy="552030"/>
       </dsp:txXfrm>
     </dsp:sp>
-    <dsp:sp modelId="{F54442B5-EF5D-4913-B8E8-81B98204AC46}">
+    <dsp:sp modelId="{F9345731-A502-4891-BFEB-0D0B72ED1BD9}">
       <dsp:nvSpPr>
         <dsp:cNvPr id="0" name=""/>
         <dsp:cNvSpPr/>
       </dsp:nvSpPr>
       <dsp:spPr>
         <a:xfrm>
-          <a:off x="4429850" y="3173574"/>
-          <a:ext cx="1655898" cy="827949"/>
+          <a:off x="8696678" y="1945417"/>
+          <a:ext cx="1809936" cy="552030"/>
         </a:xfrm>
         <a:prstGeom prst="rect">
           <a:avLst/>
@@ -4547,12 +4826,12 @@
         </a:fontRef>
       </dsp:style>
       <dsp:txBody>
-        <a:bodyPr spcFirstLastPara="0" vert="horz" wrap="square" lIns="10795" tIns="10795" rIns="10795" bIns="10795" numCol="1" spcCol="1270" anchor="ctr" anchorCtr="0">
+        <a:bodyPr spcFirstLastPara="0" vert="horz" wrap="square" lIns="9525" tIns="9525" rIns="9525" bIns="9525" numCol="1" spcCol="1270" anchor="ctr" anchorCtr="0">
           <a:noAutofit/>
         </a:bodyPr>
         <a:lstStyle/>
         <a:p>
-          <a:pPr marL="0" lvl="0" indent="0" algn="ctr" defTabSz="755650">
+          <a:pPr marL="0" lvl="0" indent="0" algn="ctr" defTabSz="666750">
             <a:lnSpc>
               <a:spcPct val="90000"/>
             </a:lnSpc>
@@ -4565,26 +4844,26 @@
             <a:buNone/>
           </a:pPr>
           <a:r>
-            <a:rPr lang="en-US" altLang="zh-CN" sz="1700" kern="1200" dirty="0"/>
-            <a:t>Use all features</a:t>
+            <a:rPr lang="en-US" altLang="zh-CN" sz="1500" kern="1200" dirty="0"/>
+            <a:t>Merged model</a:t>
           </a:r>
-          <a:endParaRPr lang="zh-CN" altLang="en-US" sz="1700" kern="1200" dirty="0"/>
+          <a:endParaRPr lang="zh-CN" altLang="en-US" sz="1500" kern="1200" dirty="0"/>
         </a:p>
       </dsp:txBody>
       <dsp:txXfrm>
-        <a:off x="4429850" y="3173574"/>
-        <a:ext cx="1655898" cy="827949"/>
+        <a:off x="8696678" y="1945417"/>
+        <a:ext cx="1809936" cy="552030"/>
       </dsp:txXfrm>
     </dsp:sp>
-    <dsp:sp modelId="{FA9D6615-828E-41CA-9EAA-77523A215200}">
+    <dsp:sp modelId="{4D46CBD9-7226-4C0F-A94A-2615771A1793}">
       <dsp:nvSpPr>
         <dsp:cNvPr id="0" name=""/>
         <dsp:cNvSpPr/>
       </dsp:nvSpPr>
       <dsp:spPr>
         <a:xfrm>
-          <a:off x="4843825" y="4349262"/>
-          <a:ext cx="1655898" cy="827949"/>
+          <a:off x="4352831" y="2723689"/>
+          <a:ext cx="1809936" cy="552030"/>
         </a:xfrm>
         <a:prstGeom prst="rect">
           <a:avLst/>
@@ -4626,12 +4905,12 @@
         </a:fontRef>
       </dsp:style>
       <dsp:txBody>
-        <a:bodyPr spcFirstLastPara="0" vert="horz" wrap="square" lIns="10795" tIns="10795" rIns="10795" bIns="10795" numCol="1" spcCol="1270" anchor="ctr" anchorCtr="0">
+        <a:bodyPr spcFirstLastPara="0" vert="horz" wrap="square" lIns="9525" tIns="9525" rIns="9525" bIns="9525" numCol="1" spcCol="1270" anchor="ctr" anchorCtr="0">
           <a:noAutofit/>
         </a:bodyPr>
         <a:lstStyle/>
         <a:p>
-          <a:pPr marL="0" lvl="0" indent="0" algn="ctr" defTabSz="755650">
+          <a:pPr marL="0" lvl="0" indent="0" algn="ctr" defTabSz="666750">
             <a:lnSpc>
               <a:spcPct val="90000"/>
             </a:lnSpc>
@@ -4644,26 +4923,26 @@
             <a:buNone/>
           </a:pPr>
           <a:r>
-            <a:rPr lang="en-US" altLang="zh-CN" sz="1700" kern="1200"/>
-            <a:t>Performance report</a:t>
+            <a:rPr lang="en-US" altLang="zh-CN" sz="1500" kern="1200" dirty="0"/>
+            <a:t>Use all features</a:t>
           </a:r>
-          <a:endParaRPr lang="zh-CN" altLang="en-US" sz="1700" kern="1200" dirty="0"/>
+          <a:endParaRPr lang="zh-CN" altLang="en-US" sz="1500" kern="1200" dirty="0"/>
         </a:p>
       </dsp:txBody>
       <dsp:txXfrm>
-        <a:off x="4843825" y="4349262"/>
-        <a:ext cx="1655898" cy="827949"/>
+        <a:off x="4352831" y="2723689"/>
+        <a:ext cx="1809936" cy="552030"/>
       </dsp:txXfrm>
     </dsp:sp>
-    <dsp:sp modelId="{33E261C2-582A-4DB8-8546-0EC85D0646AF}">
+    <dsp:sp modelId="{AFA6C30E-C18F-423D-9B5D-B4A720213DDA}">
       <dsp:nvSpPr>
         <dsp:cNvPr id="0" name=""/>
         <dsp:cNvSpPr/>
       </dsp:nvSpPr>
       <dsp:spPr>
         <a:xfrm>
-          <a:off x="7435307" y="1997886"/>
-          <a:ext cx="1655898" cy="827949"/>
+          <a:off x="6524755" y="2723689"/>
+          <a:ext cx="1809936" cy="552030"/>
         </a:xfrm>
         <a:prstGeom prst="rect">
           <a:avLst/>
@@ -4705,12 +4984,12 @@
         </a:fontRef>
       </dsp:style>
       <dsp:txBody>
-        <a:bodyPr spcFirstLastPara="0" vert="horz" wrap="square" lIns="10795" tIns="10795" rIns="10795" bIns="10795" numCol="1" spcCol="1270" anchor="ctr" anchorCtr="0">
+        <a:bodyPr spcFirstLastPara="0" vert="horz" wrap="square" lIns="9525" tIns="9525" rIns="9525" bIns="9525" numCol="1" spcCol="1270" anchor="ctr" anchorCtr="0">
           <a:noAutofit/>
         </a:bodyPr>
         <a:lstStyle/>
         <a:p>
-          <a:pPr marL="0" lvl="0" indent="0" algn="ctr" defTabSz="755650">
+          <a:pPr marL="0" lvl="0" indent="0" algn="ctr" defTabSz="666750">
             <a:lnSpc>
               <a:spcPct val="90000"/>
             </a:lnSpc>
@@ -4723,26 +5002,26 @@
             <a:buNone/>
           </a:pPr>
           <a:r>
-            <a:rPr lang="en-US" altLang="zh-CN" sz="1700" kern="1200" dirty="0"/>
-            <a:t>Linear regression</a:t>
+            <a:rPr lang="en-US" altLang="zh-CN" sz="1500" kern="1200" dirty="0"/>
+            <a:t>Performance report</a:t>
           </a:r>
-          <a:endParaRPr lang="zh-CN" altLang="en-US" sz="1700" kern="1200" dirty="0"/>
+          <a:endParaRPr lang="zh-CN" altLang="en-US" sz="1500" kern="1200" dirty="0"/>
         </a:p>
       </dsp:txBody>
       <dsp:txXfrm>
-        <a:off x="7435307" y="1997886"/>
-        <a:ext cx="1655898" cy="827949"/>
+        <a:off x="6524755" y="2723689"/>
+        <a:ext cx="1809936" cy="552030"/>
       </dsp:txXfrm>
     </dsp:sp>
-    <dsp:sp modelId="{477D82C5-868E-4739-BDE3-048B427566B6}">
+    <dsp:sp modelId="{07A54363-4941-410F-9CE5-8F873DA957C7}">
       <dsp:nvSpPr>
         <dsp:cNvPr id="0" name=""/>
         <dsp:cNvSpPr/>
       </dsp:nvSpPr>
       <dsp:spPr>
         <a:xfrm>
-          <a:off x="6433488" y="3173574"/>
-          <a:ext cx="1655898" cy="827949"/>
+          <a:off x="2180908" y="3891098"/>
+          <a:ext cx="1809936" cy="552030"/>
         </a:xfrm>
         <a:prstGeom prst="rect">
           <a:avLst/>
@@ -4784,12 +5063,12 @@
         </a:fontRef>
       </dsp:style>
       <dsp:txBody>
-        <a:bodyPr spcFirstLastPara="0" vert="horz" wrap="square" lIns="10795" tIns="10795" rIns="10795" bIns="10795" numCol="1" spcCol="1270" anchor="ctr" anchorCtr="0">
+        <a:bodyPr spcFirstLastPara="0" vert="horz" wrap="square" lIns="9525" tIns="9525" rIns="9525" bIns="9525" numCol="1" spcCol="1270" anchor="ctr" anchorCtr="0">
           <a:noAutofit/>
         </a:bodyPr>
         <a:lstStyle/>
         <a:p>
-          <a:pPr marL="0" lvl="0" indent="0" algn="ctr" defTabSz="755650">
+          <a:pPr marL="0" lvl="0" indent="0" algn="ctr" defTabSz="666750">
             <a:lnSpc>
               <a:spcPct val="90000"/>
             </a:lnSpc>
@@ -4802,26 +5081,26 @@
             <a:buNone/>
           </a:pPr>
           <a:r>
-            <a:rPr lang="en-US" altLang="zh-CN" sz="1700" kern="1200" dirty="0"/>
-            <a:t>Use cluster</a:t>
+            <a:rPr lang="en-US" altLang="zh-CN" sz="1500" kern="1200" dirty="0"/>
+            <a:t>Linear regression</a:t>
           </a:r>
-          <a:endParaRPr lang="zh-CN" altLang="en-US" sz="1700" kern="1200" dirty="0"/>
+          <a:endParaRPr lang="zh-CN" altLang="en-US" sz="1500" kern="1200" dirty="0"/>
         </a:p>
       </dsp:txBody>
       <dsp:txXfrm>
-        <a:off x="6433488" y="3173574"/>
-        <a:ext cx="1655898" cy="827949"/>
+        <a:off x="2180908" y="3891098"/>
+        <a:ext cx="1809936" cy="552030"/>
       </dsp:txXfrm>
     </dsp:sp>
-    <dsp:sp modelId="{75BD0541-2DEA-4CCE-9B3F-6C335E44344F}">
+    <dsp:sp modelId="{04C6AEB2-F547-4703-89D0-7F992B18B45D}">
       <dsp:nvSpPr>
         <dsp:cNvPr id="0" name=""/>
         <dsp:cNvSpPr/>
       </dsp:nvSpPr>
       <dsp:spPr>
         <a:xfrm>
-          <a:off x="6847462" y="4349262"/>
-          <a:ext cx="1655898" cy="827949"/>
+          <a:off x="4352831" y="3501962"/>
+          <a:ext cx="1809936" cy="552030"/>
         </a:xfrm>
         <a:prstGeom prst="rect">
           <a:avLst/>
@@ -4863,12 +5142,12 @@
         </a:fontRef>
       </dsp:style>
       <dsp:txBody>
-        <a:bodyPr spcFirstLastPara="0" vert="horz" wrap="square" lIns="10795" tIns="10795" rIns="10795" bIns="10795" numCol="1" spcCol="1270" anchor="ctr" anchorCtr="0">
+        <a:bodyPr spcFirstLastPara="0" vert="horz" wrap="square" lIns="9525" tIns="9525" rIns="9525" bIns="9525" numCol="1" spcCol="1270" anchor="ctr" anchorCtr="0">
           <a:noAutofit/>
         </a:bodyPr>
         <a:lstStyle/>
         <a:p>
-          <a:pPr marL="0" lvl="0" indent="0" algn="ctr" defTabSz="755650">
+          <a:pPr marL="0" lvl="0" indent="0" algn="ctr" defTabSz="666750">
             <a:lnSpc>
               <a:spcPct val="90000"/>
             </a:lnSpc>
@@ -4881,26 +5160,26 @@
             <a:buNone/>
           </a:pPr>
           <a:r>
-            <a:rPr lang="en-US" altLang="zh-CN" sz="1700" kern="1200" dirty="0"/>
-            <a:t>Separate model information &amp; report</a:t>
+            <a:rPr lang="en-US" altLang="zh-CN" sz="1500" kern="1200" dirty="0"/>
+            <a:t>Use cluster</a:t>
           </a:r>
-          <a:endParaRPr lang="zh-CN" altLang="en-US" sz="1700" kern="1200" dirty="0"/>
+          <a:endParaRPr lang="zh-CN" altLang="en-US" sz="1500" kern="1200" dirty="0"/>
         </a:p>
       </dsp:txBody>
       <dsp:txXfrm>
-        <a:off x="6847462" y="4349262"/>
-        <a:ext cx="1655898" cy="827949"/>
+        <a:off x="4352831" y="3501962"/>
+        <a:ext cx="1809936" cy="552030"/>
       </dsp:txXfrm>
     </dsp:sp>
-    <dsp:sp modelId="{2A4B1988-9185-48F2-9015-0EE8EF0C6CA1}">
+    <dsp:sp modelId="{0A81819E-C38C-4A98-A87A-5A41BF26BE12}">
       <dsp:nvSpPr>
         <dsp:cNvPr id="0" name=""/>
         <dsp:cNvSpPr/>
       </dsp:nvSpPr>
       <dsp:spPr>
         <a:xfrm>
-          <a:off x="8437125" y="3173574"/>
-          <a:ext cx="1655898" cy="827949"/>
+          <a:off x="6524755" y="3501962"/>
+          <a:ext cx="1809936" cy="552030"/>
         </a:xfrm>
         <a:prstGeom prst="rect">
           <a:avLst/>
@@ -4942,12 +5221,12 @@
         </a:fontRef>
       </dsp:style>
       <dsp:txBody>
-        <a:bodyPr spcFirstLastPara="0" vert="horz" wrap="square" lIns="10795" tIns="10795" rIns="10795" bIns="10795" numCol="1" spcCol="1270" anchor="ctr" anchorCtr="0">
+        <a:bodyPr spcFirstLastPara="0" vert="horz" wrap="square" lIns="9525" tIns="9525" rIns="9525" bIns="9525" numCol="1" spcCol="1270" anchor="ctr" anchorCtr="0">
           <a:noAutofit/>
         </a:bodyPr>
         <a:lstStyle/>
         <a:p>
-          <a:pPr marL="0" lvl="0" indent="0" algn="ctr" defTabSz="755650">
+          <a:pPr marL="0" lvl="0" indent="0" algn="ctr" defTabSz="666750">
             <a:lnSpc>
               <a:spcPct val="90000"/>
             </a:lnSpc>
@@ -4960,26 +5239,26 @@
             <a:buNone/>
           </a:pPr>
           <a:r>
-            <a:rPr lang="en-US" altLang="zh-CN" sz="1700" kern="1200" dirty="0"/>
-            <a:t>Use all features </a:t>
+            <a:rPr lang="en-US" altLang="zh-CN" sz="1500" kern="1200" dirty="0"/>
+            <a:t>Separate model information &amp; report</a:t>
           </a:r>
-          <a:endParaRPr lang="zh-CN" altLang="en-US" sz="1700" kern="1200" dirty="0"/>
+          <a:endParaRPr lang="zh-CN" altLang="en-US" sz="1500" kern="1200" dirty="0"/>
         </a:p>
       </dsp:txBody>
       <dsp:txXfrm>
-        <a:off x="8437125" y="3173574"/>
-        <a:ext cx="1655898" cy="827949"/>
+        <a:off x="6524755" y="3501962"/>
+        <a:ext cx="1809936" cy="552030"/>
       </dsp:txXfrm>
     </dsp:sp>
-    <dsp:sp modelId="{0DD69810-8220-4F21-8267-18E93820F012}">
+    <dsp:sp modelId="{566A5AD3-189C-4E39-8EA7-AF8865469DB1}">
       <dsp:nvSpPr>
         <dsp:cNvPr id="0" name=""/>
         <dsp:cNvSpPr/>
       </dsp:nvSpPr>
       <dsp:spPr>
         <a:xfrm>
-          <a:off x="8851100" y="4349262"/>
-          <a:ext cx="1655898" cy="827949"/>
+          <a:off x="8696678" y="3501962"/>
+          <a:ext cx="1809936" cy="552030"/>
         </a:xfrm>
         <a:prstGeom prst="rect">
           <a:avLst/>
@@ -5021,12 +5300,12 @@
         </a:fontRef>
       </dsp:style>
       <dsp:txBody>
-        <a:bodyPr spcFirstLastPara="0" vert="horz" wrap="square" lIns="10795" tIns="10795" rIns="10795" bIns="10795" numCol="1" spcCol="1270" anchor="ctr" anchorCtr="0">
+        <a:bodyPr spcFirstLastPara="0" vert="horz" wrap="square" lIns="9525" tIns="9525" rIns="9525" bIns="9525" numCol="1" spcCol="1270" anchor="ctr" anchorCtr="0">
           <a:noAutofit/>
         </a:bodyPr>
         <a:lstStyle/>
         <a:p>
-          <a:pPr marL="0" lvl="0" indent="0" algn="ctr" defTabSz="755650">
+          <a:pPr marL="0" lvl="0" indent="0" algn="ctr" defTabSz="666750">
             <a:lnSpc>
               <a:spcPct val="90000"/>
             </a:lnSpc>
@@ -5039,15 +5318,173 @@
             <a:buNone/>
           </a:pPr>
           <a:r>
-            <a:rPr lang="en-US" altLang="zh-CN" sz="1700" kern="1200" dirty="0"/>
-            <a:t>Performance report</a:t>
+            <a:rPr lang="en-US" altLang="zh-CN" sz="1500" kern="1200" dirty="0"/>
+            <a:t>Merged model</a:t>
           </a:r>
-          <a:endParaRPr lang="zh-CN" altLang="en-US" sz="1700" kern="1200" dirty="0"/>
+          <a:endParaRPr lang="zh-CN" altLang="en-US" sz="1500" kern="1200" dirty="0"/>
         </a:p>
       </dsp:txBody>
       <dsp:txXfrm>
-        <a:off x="8851100" y="4349262"/>
-        <a:ext cx="1655898" cy="827949"/>
+        <a:off x="8696678" y="3501962"/>
+        <a:ext cx="1809936" cy="552030"/>
+      </dsp:txXfrm>
+    </dsp:sp>
+    <dsp:sp modelId="{D5305652-E4D4-40D1-95A8-42CA882204F8}">
+      <dsp:nvSpPr>
+        <dsp:cNvPr id="0" name=""/>
+        <dsp:cNvSpPr/>
+      </dsp:nvSpPr>
+      <dsp:spPr>
+        <a:xfrm>
+          <a:off x="4352831" y="4280234"/>
+          <a:ext cx="1809936" cy="552030"/>
+        </a:xfrm>
+        <a:prstGeom prst="rect">
+          <a:avLst/>
+        </a:prstGeom>
+        <a:solidFill>
+          <a:schemeClr val="accent1">
+            <a:hueOff val="0"/>
+            <a:satOff val="0"/>
+            <a:lumOff val="0"/>
+            <a:alphaOff val="0"/>
+          </a:schemeClr>
+        </a:solidFill>
+        <a:ln w="12700" cap="flat" cmpd="sng" algn="ctr">
+          <a:solidFill>
+            <a:schemeClr val="lt1">
+              <a:hueOff val="0"/>
+              <a:satOff val="0"/>
+              <a:lumOff val="0"/>
+              <a:alphaOff val="0"/>
+            </a:schemeClr>
+          </a:solidFill>
+          <a:prstDash val="solid"/>
+          <a:miter lim="800000"/>
+        </a:ln>
+        <a:effectLst/>
+      </dsp:spPr>
+      <dsp:style>
+        <a:lnRef idx="2">
+          <a:scrgbClr r="0" g="0" b="0"/>
+        </a:lnRef>
+        <a:fillRef idx="1">
+          <a:scrgbClr r="0" g="0" b="0"/>
+        </a:fillRef>
+        <a:effectRef idx="0">
+          <a:scrgbClr r="0" g="0" b="0"/>
+        </a:effectRef>
+        <a:fontRef idx="minor">
+          <a:schemeClr val="lt1"/>
+        </a:fontRef>
+      </dsp:style>
+      <dsp:txBody>
+        <a:bodyPr spcFirstLastPara="0" vert="horz" wrap="square" lIns="9525" tIns="9525" rIns="9525" bIns="9525" numCol="1" spcCol="1270" anchor="ctr" anchorCtr="0">
+          <a:noAutofit/>
+        </a:bodyPr>
+        <a:lstStyle/>
+        <a:p>
+          <a:pPr marL="0" lvl="0" indent="0" algn="ctr" defTabSz="666750">
+            <a:lnSpc>
+              <a:spcPct val="90000"/>
+            </a:lnSpc>
+            <a:spcBef>
+              <a:spcPct val="0"/>
+            </a:spcBef>
+            <a:spcAft>
+              <a:spcPct val="35000"/>
+            </a:spcAft>
+            <a:buNone/>
+          </a:pPr>
+          <a:r>
+            <a:rPr lang="en-US" altLang="zh-CN" sz="1500" kern="1200" dirty="0"/>
+            <a:t>Use all features </a:t>
+          </a:r>
+          <a:endParaRPr lang="zh-CN" altLang="en-US" sz="1500" kern="1200" dirty="0"/>
+        </a:p>
+      </dsp:txBody>
+      <dsp:txXfrm>
+        <a:off x="4352831" y="4280234"/>
+        <a:ext cx="1809936" cy="552030"/>
+      </dsp:txXfrm>
+    </dsp:sp>
+    <dsp:sp modelId="{0E2FB7D6-70A8-464D-ABBF-03E157F2E1A3}">
+      <dsp:nvSpPr>
+        <dsp:cNvPr id="0" name=""/>
+        <dsp:cNvSpPr/>
+      </dsp:nvSpPr>
+      <dsp:spPr>
+        <a:xfrm>
+          <a:off x="6524755" y="4280234"/>
+          <a:ext cx="1809936" cy="552030"/>
+        </a:xfrm>
+        <a:prstGeom prst="rect">
+          <a:avLst/>
+        </a:prstGeom>
+        <a:solidFill>
+          <a:schemeClr val="accent1">
+            <a:hueOff val="0"/>
+            <a:satOff val="0"/>
+            <a:lumOff val="0"/>
+            <a:alphaOff val="0"/>
+          </a:schemeClr>
+        </a:solidFill>
+        <a:ln w="12700" cap="flat" cmpd="sng" algn="ctr">
+          <a:solidFill>
+            <a:schemeClr val="lt1">
+              <a:hueOff val="0"/>
+              <a:satOff val="0"/>
+              <a:lumOff val="0"/>
+              <a:alphaOff val="0"/>
+            </a:schemeClr>
+          </a:solidFill>
+          <a:prstDash val="solid"/>
+          <a:miter lim="800000"/>
+        </a:ln>
+        <a:effectLst/>
+      </dsp:spPr>
+      <dsp:style>
+        <a:lnRef idx="2">
+          <a:scrgbClr r="0" g="0" b="0"/>
+        </a:lnRef>
+        <a:fillRef idx="1">
+          <a:scrgbClr r="0" g="0" b="0"/>
+        </a:fillRef>
+        <a:effectRef idx="0">
+          <a:scrgbClr r="0" g="0" b="0"/>
+        </a:effectRef>
+        <a:fontRef idx="minor">
+          <a:schemeClr val="lt1"/>
+        </a:fontRef>
+      </dsp:style>
+      <dsp:txBody>
+        <a:bodyPr spcFirstLastPara="0" vert="horz" wrap="square" lIns="9525" tIns="9525" rIns="9525" bIns="9525" numCol="1" spcCol="1270" anchor="ctr" anchorCtr="0">
+          <a:noAutofit/>
+        </a:bodyPr>
+        <a:lstStyle/>
+        <a:p>
+          <a:pPr marL="0" lvl="0" indent="0" algn="ctr" defTabSz="666750">
+            <a:lnSpc>
+              <a:spcPct val="90000"/>
+            </a:lnSpc>
+            <a:spcBef>
+              <a:spcPct val="0"/>
+            </a:spcBef>
+            <a:spcAft>
+              <a:spcPct val="35000"/>
+            </a:spcAft>
+            <a:buNone/>
+          </a:pPr>
+          <a:r>
+            <a:rPr lang="en-US" altLang="zh-CN" sz="1500" kern="1200" dirty="0"/>
+            <a:t>Performance report</a:t>
+          </a:r>
+          <a:endParaRPr lang="zh-CN" altLang="en-US" sz="1500" kern="1200" dirty="0"/>
+        </a:p>
+      </dsp:txBody>
+      <dsp:txXfrm>
+        <a:off x="6524755" y="4280234"/>
+        <a:ext cx="1809936" cy="552030"/>
       </dsp:txXfrm>
     </dsp:sp>
   </dsp:spTree>
@@ -5940,12 +6377,11 @@
 </file>
 
 <file path=ppt/diagrams/layout1.xml><?xml version="1.0" encoding="utf-8"?>
-<dgm:layoutDef xmlns:dgm="http://schemas.openxmlformats.org/drawingml/2006/diagram" xmlns:a="http://schemas.openxmlformats.org/drawingml/2006/main" uniqueId="urn:microsoft.com/office/officeart/2005/8/layout/orgChart1">
+<dgm:layoutDef xmlns:dgm="http://schemas.openxmlformats.org/drawingml/2006/diagram" xmlns:a="http://schemas.openxmlformats.org/drawingml/2006/main" uniqueId="urn:microsoft.com/office/officeart/2009/3/layout/HorizontalOrganizationChart">
   <dgm:title val=""/>
   <dgm:desc val=""/>
   <dgm:catLst>
-    <dgm:cat type="hierarchy" pri="1000"/>
-    <dgm:cat type="convert" pri="6000"/>
+    <dgm:cat type="hierarchy" pri="4300"/>
   </dgm:catLst>
   <dgm:sampData>
     <dgm:dataModel>
@@ -6028,12 +6464,14 @@
     <dgm:choose name="Name0">
       <dgm:if name="Name1" func="var" arg="dir" op="equ" val="norm">
         <dgm:alg type="hierChild">
-          <dgm:param type="linDir" val="fromL"/>
+          <dgm:param type="linDir" val="fromT"/>
+          <dgm:param type="chAlign" val="l"/>
         </dgm:alg>
       </dgm:if>
       <dgm:else name="Name2">
         <dgm:alg type="hierChild">
-          <dgm:param type="linDir" val="fromR"/>
+          <dgm:param type="linDir" val="fromT"/>
+          <dgm:param type="chAlign" val="r"/>
         </dgm:alg>
       </dgm:else>
     </dgm:choose>
@@ -6043,24 +6481,24 @@
     <dgm:presOf/>
     <dgm:constrLst>
       <dgm:constr type="w" for="des" forName="rootComposite1" refType="w" fact="10"/>
-      <dgm:constr type="h" for="des" forName="rootComposite1" refType="w" refFor="des" refForName="rootComposite1" fact="0.5"/>
+      <dgm:constr type="h" for="des" forName="rootComposite1" refType="w" refFor="des" refForName="rootComposite1" fact="0.305"/>
       <dgm:constr type="w" for="des" forName="rootComposite" refType="w" fact="10"/>
-      <dgm:constr type="h" for="des" forName="rootComposite" refType="w" refFor="des" refForName="rootComposite1" fact="0.5"/>
+      <dgm:constr type="h" for="des" forName="rootComposite" refType="w" refFor="des" refForName="rootComposite1" fact="0.305"/>
       <dgm:constr type="w" for="des" forName="rootComposite3" refType="w" fact="10"/>
-      <dgm:constr type="h" for="des" forName="rootComposite3" refType="w" refFor="des" refForName="rootComposite1" fact="0.5"/>
+      <dgm:constr type="h" for="des" forName="rootComposite3" refType="w" refFor="des" refForName="rootComposite1" fact="0.305"/>
       <dgm:constr type="primFontSz" for="des" ptType="node" op="equ"/>
       <dgm:constr type="sp" for="des" op="equ"/>
-      <dgm:constr type="sp" for="des" forName="hierRoot1" refType="w" refFor="des" refForName="rootComposite1" fact="0.21"/>
+      <dgm:constr type="sp" for="des" forName="hierRoot1" refType="w" refFor="des" refForName="rootComposite1" fact="0.2"/>
       <dgm:constr type="sp" for="des" forName="hierRoot2" refType="sp" refFor="des" refForName="hierRoot1"/>
       <dgm:constr type="sp" for="des" forName="hierRoot3" refType="sp" refFor="des" refForName="hierRoot1"/>
-      <dgm:constr type="sibSp" refType="w" refFor="des" refForName="rootComposite1" fact="0.21"/>
+      <dgm:constr type="sibSp" refType="w" refFor="des" refForName="rootComposite1" fact="0.125"/>
       <dgm:constr type="sibSp" for="des" forName="hierChild2" refType="sibSp"/>
       <dgm:constr type="sibSp" for="des" forName="hierChild3" refType="sibSp"/>
       <dgm:constr type="sibSp" for="des" forName="hierChild4" refType="sibSp"/>
       <dgm:constr type="sibSp" for="des" forName="hierChild5" refType="sibSp"/>
       <dgm:constr type="sibSp" for="des" forName="hierChild6" refType="sibSp"/>
       <dgm:constr type="sibSp" for="des" forName="hierChild7" refType="sibSp"/>
-      <dgm:constr type="secSibSp" refType="w" refFor="des" refForName="rootComposite1" fact="0.21"/>
+      <dgm:constr type="secSibSp" refType="w" refFor="des" refForName="rootComposite1" fact="0.125"/>
       <dgm:constr type="secSibSp" for="des" forName="hierChild2" refType="secSibSp"/>
       <dgm:constr type="secSibSp" for="des" forName="hierChild3" refType="secSibSp"/>
       <dgm:constr type="secSibSp" for="des" forName="hierChild4" refType="secSibSp"/>
@@ -6078,56 +6516,85 @@
           <dgm:choose name="Name5">
             <dgm:if name="Name6" func="var" arg="hierBranch" op="equ" val="l">
               <dgm:choose name="Name7">
-                <dgm:if name="Name8" axis="ch" ptType="asst" func="cnt" op="gte" val="1">
+                <dgm:if name="Name8" func="var" arg="dir" op="equ" val="norm">
                   <dgm:alg type="hierRoot">
-                    <dgm:param type="hierAlign" val="tR"/>
+                    <dgm:param type="hierAlign" val="lT"/>
                   </dgm:alg>
                   <dgm:constrLst>
-                    <dgm:constr type="alignOff" val="0.65"/>
+                    <dgm:constr type="alignOff" val="0.75"/>
                   </dgm:constrLst>
                 </dgm:if>
                 <dgm:else name="Name9">
                   <dgm:alg type="hierRoot">
-                    <dgm:param type="hierAlign" val="tR"/>
+                    <dgm:param type="hierAlign" val="rT"/>
                   </dgm:alg>
                   <dgm:constrLst>
-                    <dgm:constr type="alignOff" val="0.25"/>
+                    <dgm:constr type="alignOff" val="0.75"/>
                   </dgm:constrLst>
                 </dgm:else>
               </dgm:choose>
             </dgm:if>
             <dgm:if name="Name10" func="var" arg="hierBranch" op="equ" val="r">
               <dgm:choose name="Name11">
-                <dgm:if name="Name12" axis="ch" ptType="asst" func="cnt" op="gte" val="1">
+                <dgm:if name="Name12" func="var" arg="dir" op="equ" val="norm">
                   <dgm:alg type="hierRoot">
-                    <dgm:param type="hierAlign" val="tL"/>
+                    <dgm:param type="hierAlign" val="lB"/>
+                  </dgm:alg>
+                  <dgm:constrLst>
+                    <dgm:constr type="alignOff" val="0.75"/>
+                  </dgm:constrLst>
+                </dgm:if>
+                <dgm:else name="Name13">
+                  <dgm:alg type="hierRoot">
+                    <dgm:param type="hierAlign" val="rB"/>
+                  </dgm:alg>
+                  <dgm:constrLst>
+                    <dgm:constr type="alignOff" val="0.75"/>
+                  </dgm:constrLst>
+                </dgm:else>
+              </dgm:choose>
+            </dgm:if>
+            <dgm:if name="Name14" func="var" arg="hierBranch" op="equ" val="hang">
+              <dgm:choose name="Name15">
+                <dgm:if name="Name16" func="var" arg="dir" op="equ" val="norm">
+                  <dgm:alg type="hierRoot">
+                    <dgm:param type="hierAlign" val="lCtrCh"/>
                   </dgm:alg>
                   <dgm:constrLst>
                     <dgm:constr type="alignOff" val="0.65"/>
                   </dgm:constrLst>
                 </dgm:if>
-                <dgm:else name="Name13">
+                <dgm:else name="Name17">
                   <dgm:alg type="hierRoot">
-                    <dgm:param type="hierAlign" val="tL"/>
+                    <dgm:param type="hierAlign" val="rCtrCh"/>
                   </dgm:alg>
                   <dgm:constrLst>
-                    <dgm:constr type="alignOff" val="0.25"/>
+                    <dgm:constr type="alignOff" val="0.65"/>
                   </dgm:constrLst>
                 </dgm:else>
               </dgm:choose>
             </dgm:if>
-            <dgm:if name="Name14" func="var" arg="hierBranch" op="equ" val="hang">
-              <dgm:alg type="hierRoot"/>
-              <dgm:constrLst>
-                <dgm:constr type="alignOff" val="0.65"/>
-              </dgm:constrLst>
-            </dgm:if>
-            <dgm:else name="Name15">
-              <dgm:alg type="hierRoot"/>
-              <dgm:constrLst>
-                <dgm:constr type="alignOff"/>
-                <dgm:constr type="bendDist" for="des" ptType="parTrans" refType="sp" fact="0.5"/>
-              </dgm:constrLst>
+            <dgm:else name="Name18">
+              <dgm:choose name="Name19">
+                <dgm:if name="Name20" func="var" arg="dir" op="equ" val="norm">
+                  <dgm:alg type="hierRoot">
+                    <dgm:param type="hierAlign" val="lCtrCh"/>
+                  </dgm:alg>
+                  <dgm:constrLst>
+                    <dgm:constr type="alignOff"/>
+                    <dgm:constr type="bendDist" for="des" ptType="parTrans" refType="sp" fact="0.5"/>
+                  </dgm:constrLst>
+                </dgm:if>
+                <dgm:else name="Name21">
+                  <dgm:alg type="hierRoot">
+                    <dgm:param type="hierAlign" val="rCtrCh"/>
+                  </dgm:alg>
+                  <dgm:constrLst>
+                    <dgm:constr type="alignOff"/>
+                    <dgm:constr type="bendDist" for="des" ptType="parTrans" refType="sp" fact="0.5"/>
+                  </dgm:constrLst>
+                </dgm:else>
+              </dgm:choose>
             </dgm:else>
           </dgm:choose>
           <dgm:shape xmlns:r="http://schemas.openxmlformats.org/officeDocument/2006/relationships" r:blip="">
@@ -6141,8 +6608,8 @@
               <dgm:adjLst/>
             </dgm:shape>
             <dgm:presOf axis="self" ptType="node" cnt="1"/>
-            <dgm:choose name="Name16">
-              <dgm:if name="Name17" func="var" arg="hierBranch" op="equ" val="init">
+            <dgm:choose name="Name22">
+              <dgm:if name="Name23" func="var" arg="hierBranch" op="equ" val="init">
                 <dgm:constrLst>
                   <dgm:constr type="l" for="ch" forName="rootText1"/>
                   <dgm:constr type="t" for="ch" forName="rootText1"/>
@@ -6154,7 +6621,7 @@
                   <dgm:constr type="h" for="ch" forName="rootConnector1" refType="h" refFor="ch" refForName="rootText1"/>
                 </dgm:constrLst>
               </dgm:if>
-              <dgm:if name="Name18" func="var" arg="hierBranch" op="equ" val="l">
+              <dgm:if name="Name24" func="var" arg="hierBranch" op="equ" val="l">
                 <dgm:constrLst>
                   <dgm:constr type="l" for="ch" forName="rootText1"/>
                   <dgm:constr type="t" for="ch" forName="rootText1"/>
@@ -6166,7 +6633,7 @@
                   <dgm:constr type="h" for="ch" forName="rootConnector1" refType="h" refFor="ch" refForName="rootText1"/>
                 </dgm:constrLst>
               </dgm:if>
-              <dgm:if name="Name19" func="var" arg="hierBranch" op="equ" val="r">
+              <dgm:if name="Name25" func="var" arg="hierBranch" op="equ" val="r">
                 <dgm:constrLst>
                   <dgm:constr type="l" for="ch" forName="rootText1"/>
                   <dgm:constr type="t" for="ch" forName="rootText1"/>
@@ -6178,7 +6645,7 @@
                   <dgm:constr type="h" for="ch" forName="rootConnector1" refType="h" refFor="ch" refForName="rootText1"/>
                 </dgm:constrLst>
               </dgm:if>
-              <dgm:else name="Name20">
+              <dgm:else name="Name26">
                 <dgm:constrLst>
                   <dgm:constr type="l" for="ch" forName="rootText1"/>
                   <dgm:constr type="t" for="ch" forName="rootText1"/>
@@ -6223,47 +6690,71 @@
             </dgm:layoutNode>
           </dgm:layoutNode>
           <dgm:layoutNode name="hierChild2">
-            <dgm:choose name="Name21">
-              <dgm:if name="Name22" func="var" arg="hierBranch" op="equ" val="l">
-                <dgm:alg type="hierChild">
-                  <dgm:param type="chAlign" val="r"/>
-                  <dgm:param type="linDir" val="fromT"/>
-                </dgm:alg>
-              </dgm:if>
-              <dgm:if name="Name23" func="var" arg="hierBranch" op="equ" val="r">
-                <dgm:alg type="hierChild">
-                  <dgm:param type="chAlign" val="l"/>
-                  <dgm:param type="linDir" val="fromT"/>
-                </dgm:alg>
-              </dgm:if>
-              <dgm:if name="Name24" func="var" arg="hierBranch" op="equ" val="hang">
-                <dgm:choose name="Name25">
-                  <dgm:if name="Name26" func="var" arg="dir" op="equ" val="norm">
+            <dgm:choose name="Name27">
+              <dgm:if name="Name28" func="var" arg="hierBranch" op="equ" val="l">
+                <dgm:choose name="Name29">
+                  <dgm:if name="Name30" func="var" arg="dir" op="equ" val="norm">
                     <dgm:alg type="hierChild">
-                      <dgm:param type="chAlign" val="l"/>
+                      <dgm:param type="chAlign" val="t"/>
                       <dgm:param type="linDir" val="fromL"/>
-                      <dgm:param type="secChAlign" val="t"/>
-                      <dgm:param type="secLinDir" val="fromT"/>
                     </dgm:alg>
                   </dgm:if>
-                  <dgm:else name="Name27">
+                  <dgm:else name="Name31">
                     <dgm:alg type="hierChild">
-                      <dgm:param type="chAlign" val="l"/>
+                      <dgm:param type="chAlign" val="t"/>
                       <dgm:param type="linDir" val="fromR"/>
-                      <dgm:param type="secChAlign" val="t"/>
-                      <dgm:param type="secLinDir" val="fromT"/>
                     </dgm:alg>
                   </dgm:else>
                 </dgm:choose>
               </dgm:if>
-              <dgm:else name="Name28">
-                <dgm:choose name="Name29">
-                  <dgm:if name="Name30" func="var" arg="dir" op="equ" val="norm">
-                    <dgm:alg type="hierChild"/>
+              <dgm:if name="Name32" func="var" arg="hierBranch" op="equ" val="r">
+                <dgm:choose name="Name33">
+                  <dgm:if name="Name34" func="var" arg="dir" op="equ" val="norm">
+                    <dgm:alg type="hierChild">
+                      <dgm:param type="chAlign" val="b"/>
+                      <dgm:param type="linDir" val="fromL"/>
+                    </dgm:alg>
                   </dgm:if>
-                  <dgm:else name="Name31">
+                  <dgm:else name="Name35">
                     <dgm:alg type="hierChild">
+                      <dgm:param type="chAlign" val="b"/>
                       <dgm:param type="linDir" val="fromR"/>
+                    </dgm:alg>
+                  </dgm:else>
+                </dgm:choose>
+              </dgm:if>
+              <dgm:if name="Name36" func="var" arg="hierBranch" op="equ" val="hang">
+                <dgm:choose name="Name37">
+                  <dgm:if name="Name38" func="var" arg="dir" op="equ" val="norm">
+                    <dgm:alg type="hierChild">
+                      <dgm:param type="chAlign" val="l"/>
+                      <dgm:param type="linDir" val="fromT"/>
+                      <dgm:param type="secChAlign" val="t"/>
+                      <dgm:param type="secLinDir" val="fromL"/>
+                    </dgm:alg>
+                  </dgm:if>
+                  <dgm:else name="Name39">
+                    <dgm:alg type="hierChild">
+                      <dgm:param type="chAlign" val="r"/>
+                      <dgm:param type="linDir" val="fromT"/>
+                      <dgm:param type="secChAlign" val="t"/>
+                      <dgm:param type="secLinDir" val="fromR"/>
+                    </dgm:alg>
+                  </dgm:else>
+                </dgm:choose>
+              </dgm:if>
+              <dgm:else name="Name40">
+                <dgm:choose name="Name41">
+                  <dgm:if name="Name42" func="var" arg="dir" op="equ" val="norm">
+                    <dgm:alg type="hierChild">
+                      <dgm:param type="linDir" val="fromT"/>
+                      <dgm:param type="chAlign" val="l"/>
+                    </dgm:alg>
+                  </dgm:if>
+                  <dgm:else name="Name43">
+                    <dgm:alg type="hierChild">
+                      <dgm:param type="linDir" val="fromT"/>
+                      <dgm:param type="chAlign" val="r"/>
                     </dgm:alg>
                   </dgm:else>
                 </dgm:choose>
@@ -6276,78 +6767,28 @@
             <dgm:constrLst/>
             <dgm:ruleLst/>
             <dgm:forEach name="rep2a" axis="ch" ptType="nonAsst">
-              <dgm:forEach name="Name32" axis="precedSib" ptType="parTrans" st="-1" cnt="1">
-                <dgm:choose name="Name33">
-                  <dgm:if name="Name34" func="var" arg="hierBranch" op="equ" val="std">
-                    <dgm:layoutNode name="Name35">
-                      <dgm:alg type="conn">
-                        <dgm:param type="connRout" val="bend"/>
-                        <dgm:param type="dim" val="1D"/>
-                        <dgm:param type="endSty" val="noArr"/>
-                        <dgm:param type="begPts" val="bCtr"/>
-                        <dgm:param type="endPts" val="tCtr"/>
-                        <dgm:param type="bendPt" val="end"/>
-                      </dgm:alg>
-                      <dgm:shape xmlns:r="http://schemas.openxmlformats.org/officeDocument/2006/relationships" type="conn" r:blip="" zOrderOff="-99999">
-                        <dgm:adjLst/>
-                      </dgm:shape>
-                      <dgm:presOf axis="self"/>
-                      <dgm:constrLst>
-                        <dgm:constr type="begPad"/>
-                        <dgm:constr type="endPad"/>
-                      </dgm:constrLst>
-                      <dgm:ruleLst/>
-                    </dgm:layoutNode>
-                  </dgm:if>
-                  <dgm:if name="Name36" func="var" arg="hierBranch" op="equ" val="init">
-                    <dgm:layoutNode name="Name37">
-                      <dgm:choose name="Name38">
-                        <dgm:if name="Name39" axis="self" func="depth" op="lte" val="2">
+              <dgm:forEach name="Name44" axis="precedSib" ptType="parTrans" st="-1" cnt="1">
+                <dgm:choose name="Name45">
+                  <dgm:if name="Name46" func="var" arg="hierBranch" op="equ" val="hang">
+                    <dgm:layoutNode name="Name47">
+                      <dgm:choose name="Name48">
+                        <dgm:if name="Name49" func="var" arg="dir" op="equ" val="norm">
                           <dgm:alg type="conn">
                             <dgm:param type="connRout" val="bend"/>
                             <dgm:param type="dim" val="1D"/>
                             <dgm:param type="endSty" val="noArr"/>
-                            <dgm:param type="begPts" val="bCtr"/>
-                            <dgm:param type="endPts" val="tCtr"/>
-                            <dgm:param type="bendPt" val="end"/>
+                            <dgm:param type="begPts" val="midR"/>
+                            <dgm:param type="endPts" val="bCtr tCtr"/>
                           </dgm:alg>
                         </dgm:if>
-                        <dgm:else name="Name40">
-                          <dgm:choose name="Name41">
-                            <dgm:if name="Name42" axis="par des" func="maxDepth" op="lte" val="1">
-                              <dgm:choose name="Name43">
-                                <dgm:if name="Name44" axis="par ch" ptType="node asst" func="cnt" op="gte" val="1">
-                                  <dgm:alg type="conn">
-                                    <dgm:param type="connRout" val="bend"/>
-                                    <dgm:param type="dim" val="1D"/>
-                                    <dgm:param type="endSty" val="noArr"/>
-                                    <dgm:param type="begPts" val="bCtr"/>
-                                    <dgm:param type="endPts" val="midL midR"/>
-                                  </dgm:alg>
-                                </dgm:if>
-                                <dgm:else name="Name45">
-                                  <dgm:alg type="conn">
-                                    <dgm:param type="connRout" val="bend"/>
-                                    <dgm:param type="dim" val="1D"/>
-                                    <dgm:param type="endSty" val="noArr"/>
-                                    <dgm:param type="begPts" val="bCtr"/>
-                                    <dgm:param type="endPts" val="midL midR"/>
-                                    <dgm:param type="srcNode" val="rootConnector"/>
-                                  </dgm:alg>
-                                </dgm:else>
-                              </dgm:choose>
-                            </dgm:if>
-                            <dgm:else name="Name46">
-                              <dgm:alg type="conn">
-                                <dgm:param type="connRout" val="bend"/>
-                                <dgm:param type="dim" val="1D"/>
-                                <dgm:param type="endSty" val="noArr"/>
-                                <dgm:param type="begPts" val="bCtr"/>
-                                <dgm:param type="endPts" val="tCtr"/>
-                                <dgm:param type="bendPt" val="end"/>
-                              </dgm:alg>
-                            </dgm:else>
-                          </dgm:choose>
+                        <dgm:else name="Name50">
+                          <dgm:alg type="conn">
+                            <dgm:param type="connRout" val="bend"/>
+                            <dgm:param type="dim" val="1D"/>
+                            <dgm:param type="endSty" val="noArr"/>
+                            <dgm:param type="begPts" val="midL"/>
+                            <dgm:param type="endPts" val="bCtr tCtr"/>
+                          </dgm:alg>
                         </dgm:else>
                       </dgm:choose>
                       <dgm:shape xmlns:r="http://schemas.openxmlformats.org/officeDocument/2006/relationships" type="conn" r:blip="" zOrderOff="-99999">
@@ -6361,74 +6802,26 @@
                       <dgm:ruleLst/>
                     </dgm:layoutNode>
                   </dgm:if>
-                  <dgm:if name="Name47" func="var" arg="hierBranch" op="equ" val="hang">
-                    <dgm:layoutNode name="Name48">
-                      <dgm:alg type="conn">
-                        <dgm:param type="connRout" val="bend"/>
-                        <dgm:param type="dim" val="1D"/>
-                        <dgm:param type="endSty" val="noArr"/>
-                        <dgm:param type="begPts" val="bCtr"/>
-                        <dgm:param type="endPts" val="midL midR"/>
-                      </dgm:alg>
-                      <dgm:shape xmlns:r="http://schemas.openxmlformats.org/officeDocument/2006/relationships" type="conn" r:blip="" zOrderOff="-99999">
-                        <dgm:adjLst/>
-                      </dgm:shape>
-                      <dgm:presOf axis="self"/>
-                      <dgm:constrLst>
-                        <dgm:constr type="begPad"/>
-                        <dgm:constr type="endPad"/>
-                      </dgm:constrLst>
-                      <dgm:ruleLst/>
-                    </dgm:layoutNode>
-                  </dgm:if>
-                  <dgm:else name="Name49">
-                    <dgm:layoutNode name="Name50">
-                      <dgm:choose name="Name51">
-                        <dgm:if name="Name52" axis="self" func="depth" op="lte" val="2">
-                          <dgm:choose name="Name53">
-                            <dgm:if name="Name54" axis="par ch" ptType="node asst" func="cnt" op="gte" val="1">
-                              <dgm:alg type="conn">
-                                <dgm:param type="connRout" val="bend"/>
-                                <dgm:param type="dim" val="1D"/>
-                                <dgm:param type="endSty" val="noArr"/>
-                                <dgm:param type="begPts" val="bCtr"/>
-                                <dgm:param type="endPts" val="midL midR"/>
-                              </dgm:alg>
-                            </dgm:if>
-                            <dgm:else name="Name55">
-                              <dgm:alg type="conn">
-                                <dgm:param type="connRout" val="bend"/>
-                                <dgm:param type="dim" val="1D"/>
-                                <dgm:param type="endSty" val="noArr"/>
-                                <dgm:param type="begPts" val="bCtr"/>
-                                <dgm:param type="endPts" val="midL midR"/>
-                                <dgm:param type="srcNode" val="rootConnector1"/>
-                              </dgm:alg>
-                            </dgm:else>
-                          </dgm:choose>
+                  <dgm:if name="Name51" func="var" arg="hierBranch" op="equ" val="l">
+                    <dgm:layoutNode name="Name52">
+                      <dgm:choose name="Name53">
+                        <dgm:if name="Name54" func="var" arg="dir" op="equ" val="norm">
+                          <dgm:alg type="conn">
+                            <dgm:param type="connRout" val="bend"/>
+                            <dgm:param type="dim" val="1D"/>
+                            <dgm:param type="endSty" val="noArr"/>
+                            <dgm:param type="begPts" val="midR"/>
+                            <dgm:param type="endPts" val="tCtr"/>
+                          </dgm:alg>
                         </dgm:if>
-                        <dgm:else name="Name56">
-                          <dgm:choose name="Name57">
-                            <dgm:if name="Name58" axis="par ch" ptType="node asst" func="cnt" op="gte" val="1">
-                              <dgm:alg type="conn">
-                                <dgm:param type="connRout" val="bend"/>
-                                <dgm:param type="dim" val="1D"/>
-                                <dgm:param type="endSty" val="noArr"/>
-                                <dgm:param type="begPts" val="bCtr"/>
-                                <dgm:param type="endPts" val="midL midR"/>
-                              </dgm:alg>
-                            </dgm:if>
-                            <dgm:else name="Name59">
-                              <dgm:alg type="conn">
-                                <dgm:param type="connRout" val="bend"/>
-                                <dgm:param type="dim" val="1D"/>
-                                <dgm:param type="endSty" val="noArr"/>
-                                <dgm:param type="begPts" val="bCtr"/>
-                                <dgm:param type="endPts" val="midL midR"/>
-                                <dgm:param type="srcNode" val="rootConnector"/>
-                              </dgm:alg>
-                            </dgm:else>
-                          </dgm:choose>
+                        <dgm:else name="Name55">
+                          <dgm:alg type="conn">
+                            <dgm:param type="connRout" val="bend"/>
+                            <dgm:param type="dim" val="1D"/>
+                            <dgm:param type="endSty" val="noArr"/>
+                            <dgm:param type="begPts" val="midL"/>
+                            <dgm:param type="endPts" val="tCtr"/>
+                          </dgm:alg>
                         </dgm:else>
                       </dgm:choose>
                       <dgm:shape xmlns:r="http://schemas.openxmlformats.org/officeDocument/2006/relationships" type="conn" r:blip="" zOrderOff="-99999">
@@ -6441,6 +6834,85 @@
                       </dgm:constrLst>
                       <dgm:ruleLst/>
                     </dgm:layoutNode>
+                  </dgm:if>
+                  <dgm:if name="Name56" func="var" arg="hierBranch" op="equ" val="r">
+                    <dgm:layoutNode name="Name57">
+                      <dgm:choose name="Name58">
+                        <dgm:if name="Name59" func="var" arg="dir" op="equ" val="norm">
+                          <dgm:alg type="conn">
+                            <dgm:param type="connRout" val="bend"/>
+                            <dgm:param type="dim" val="1D"/>
+                            <dgm:param type="endSty" val="noArr"/>
+                            <dgm:param type="begPts" val="midR"/>
+                            <dgm:param type="endPts" val="bCtr"/>
+                          </dgm:alg>
+                        </dgm:if>
+                        <dgm:else name="Name60">
+                          <dgm:alg type="conn">
+                            <dgm:param type="connRout" val="bend"/>
+                            <dgm:param type="dim" val="1D"/>
+                            <dgm:param type="endSty" val="noArr"/>
+                            <dgm:param type="begPts" val="midL"/>
+                            <dgm:param type="endPts" val="bCtr"/>
+                          </dgm:alg>
+                        </dgm:else>
+                      </dgm:choose>
+                      <dgm:shape xmlns:r="http://schemas.openxmlformats.org/officeDocument/2006/relationships" type="conn" r:blip="" zOrderOff="-99999">
+                        <dgm:adjLst/>
+                      </dgm:shape>
+                      <dgm:presOf axis="self"/>
+                      <dgm:constrLst>
+                        <dgm:constr type="begPad"/>
+                        <dgm:constr type="endPad"/>
+                      </dgm:constrLst>
+                      <dgm:ruleLst/>
+                    </dgm:layoutNode>
+                  </dgm:if>
+                  <dgm:else name="Name61">
+                    <dgm:choose name="Name62">
+                      <dgm:if name="Name63" func="var" arg="dir" op="equ" val="norm">
+                        <dgm:layoutNode name="Name64">
+                          <dgm:alg type="conn">
+                            <dgm:param type="connRout" val="bend"/>
+                            <dgm:param type="dim" val="1D"/>
+                            <dgm:param type="endSty" val="noArr"/>
+                            <dgm:param type="begPts" val="midR"/>
+                            <dgm:param type="endPts" val="midL"/>
+                            <dgm:param type="bendPt" val="end"/>
+                          </dgm:alg>
+                          <dgm:shape xmlns:r="http://schemas.openxmlformats.org/officeDocument/2006/relationships" type="conn" r:blip="" zOrderOff="-99999">
+                            <dgm:adjLst/>
+                          </dgm:shape>
+                          <dgm:presOf axis="self"/>
+                          <dgm:constrLst>
+                            <dgm:constr type="begPad"/>
+                            <dgm:constr type="endPad"/>
+                          </dgm:constrLst>
+                          <dgm:ruleLst/>
+                        </dgm:layoutNode>
+                      </dgm:if>
+                      <dgm:else name="Name65">
+                        <dgm:layoutNode name="Name66">
+                          <dgm:alg type="conn">
+                            <dgm:param type="connRout" val="bend"/>
+                            <dgm:param type="dim" val="1D"/>
+                            <dgm:param type="endSty" val="noArr"/>
+                            <dgm:param type="begPts" val="midL"/>
+                            <dgm:param type="endPts" val="midR"/>
+                            <dgm:param type="bendPt" val="end"/>
+                          </dgm:alg>
+                          <dgm:shape xmlns:r="http://schemas.openxmlformats.org/officeDocument/2006/relationships" type="conn" r:blip="" zOrderOff="-99999">
+                            <dgm:adjLst/>
+                          </dgm:shape>
+                          <dgm:presOf axis="self"/>
+                          <dgm:constrLst>
+                            <dgm:constr type="begPad"/>
+                            <dgm:constr type="endPad"/>
+                          </dgm:constrLst>
+                          <dgm:ruleLst/>
+                        </dgm:layoutNode>
+                      </dgm:else>
+                    </dgm:choose>
                   </dgm:else>
                 </dgm:choose>
               </dgm:forEach>
@@ -6448,128 +6920,94 @@
                 <dgm:varLst>
                   <dgm:hierBranch val="init"/>
                 </dgm:varLst>
-                <dgm:choose name="Name60">
-                  <dgm:if name="Name61" func="var" arg="hierBranch" op="equ" val="l">
-                    <dgm:choose name="Name62">
-                      <dgm:if name="Name63" axis="ch" ptType="asst" func="cnt" op="gte" val="1">
+                <dgm:choose name="Name67">
+                  <dgm:if name="Name68" func="var" arg="hierBranch" op="equ" val="l">
+                    <dgm:choose name="Name69">
+                      <dgm:if name="Name70" func="var" arg="dir" op="equ" val="norm">
                         <dgm:alg type="hierRoot">
-                          <dgm:param type="hierAlign" val="tR"/>
+                          <dgm:param type="hierAlign" val="lT"/>
                         </dgm:alg>
-                        <dgm:shape xmlns:r="http://schemas.openxmlformats.org/officeDocument/2006/relationships" r:blip="">
-                          <dgm:adjLst/>
-                        </dgm:shape>
-                        <dgm:presOf/>
+                        <dgm:constrLst>
+                          <dgm:constr type="alignOff" val="0.75"/>
+                        </dgm:constrLst>
+                      </dgm:if>
+                      <dgm:else name="Name71">
+                        <dgm:alg type="hierRoot">
+                          <dgm:param type="hierAlign" val="rT"/>
+                        </dgm:alg>
+                        <dgm:constrLst>
+                          <dgm:constr type="alignOff" val="0.75"/>
+                        </dgm:constrLst>
+                      </dgm:else>
+                    </dgm:choose>
+                  </dgm:if>
+                  <dgm:if name="Name72" func="var" arg="hierBranch" op="equ" val="r">
+                    <dgm:choose name="Name73">
+                      <dgm:if name="Name74" func="var" arg="dir" op="equ" val="norm">
+                        <dgm:alg type="hierRoot">
+                          <dgm:param type="hierAlign" val="lB"/>
+                        </dgm:alg>
+                        <dgm:constrLst>
+                          <dgm:constr type="alignOff" val="0.75"/>
+                        </dgm:constrLst>
+                      </dgm:if>
+                      <dgm:else name="Name75">
+                        <dgm:alg type="hierRoot">
+                          <dgm:param type="hierAlign" val="rB"/>
+                        </dgm:alg>
+                        <dgm:constrLst>
+                          <dgm:constr type="alignOff" val="0.75"/>
+                        </dgm:constrLst>
+                      </dgm:else>
+                    </dgm:choose>
+                  </dgm:if>
+                  <dgm:if name="Name76" func="var" arg="hierBranch" op="equ" val="hang">
+                    <dgm:choose name="Name77">
+                      <dgm:if name="Name78" func="var" arg="dir" op="equ" val="norm">
+                        <dgm:alg type="hierRoot">
+                          <dgm:param type="hierAlign" val="lCtrCh"/>
+                        </dgm:alg>
                         <dgm:constrLst>
                           <dgm:constr type="alignOff" val="0.65"/>
                         </dgm:constrLst>
                       </dgm:if>
-                      <dgm:else name="Name64">
+                      <dgm:else name="Name79">
                         <dgm:alg type="hierRoot">
-                          <dgm:param type="hierAlign" val="tR"/>
+                          <dgm:param type="hierAlign" val="rCtrCh"/>
                         </dgm:alg>
-                        <dgm:shape xmlns:r="http://schemas.openxmlformats.org/officeDocument/2006/relationships" r:blip="">
-                          <dgm:adjLst/>
-                        </dgm:shape>
-                        <dgm:presOf/>
                         <dgm:constrLst>
-                          <dgm:constr type="alignOff" val="0.25"/>
+                          <dgm:constr type="alignOff" val="0.65"/>
                         </dgm:constrLst>
                       </dgm:else>
                     </dgm:choose>
                   </dgm:if>
-                  <dgm:if name="Name65" func="var" arg="hierBranch" op="equ" val="r">
-                    <dgm:choose name="Name66">
-                      <dgm:if name="Name67" axis="ch" ptType="asst" func="cnt" op="gte" val="1">
+                  <dgm:else name="Name80">
+                    <dgm:choose name="Name81">
+                      <dgm:if name="Name82" func="var" arg="dir" op="equ" val="norm">
                         <dgm:alg type="hierRoot">
-                          <dgm:param type="hierAlign" val="tL"/>
+                          <dgm:param type="hierAlign" val="lCtrCh"/>
                         </dgm:alg>
-                        <dgm:shape xmlns:r="http://schemas.openxmlformats.org/officeDocument/2006/relationships" r:blip="">
-                          <dgm:adjLst/>
-                        </dgm:shape>
-                        <dgm:presOf/>
                         <dgm:constrLst>
-                          <dgm:constr type="alignOff" val="0.65"/>
+                          <dgm:constr type="alignOff"/>
+                          <dgm:constr type="bendDist" for="des" ptType="parTrans" refType="sp" fact="0.5"/>
                         </dgm:constrLst>
                       </dgm:if>
-                      <dgm:else name="Name68">
+                      <dgm:else name="Name83">
                         <dgm:alg type="hierRoot">
-                          <dgm:param type="hierAlign" val="tL"/>
+                          <dgm:param type="hierAlign" val="rCtrCh"/>
                         </dgm:alg>
-                        <dgm:shape xmlns:r="http://schemas.openxmlformats.org/officeDocument/2006/relationships" r:blip="">
-                          <dgm:adjLst/>
-                        </dgm:shape>
-                        <dgm:presOf/>
-                        <dgm:constrLst>
-                          <dgm:constr type="alignOff" val="0.25"/>
-                        </dgm:constrLst>
-                      </dgm:else>
-                    </dgm:choose>
-                  </dgm:if>
-                  <dgm:if name="Name69" func="var" arg="hierBranch" op="equ" val="std">
-                    <dgm:alg type="hierRoot"/>
-                    <dgm:shape xmlns:r="http://schemas.openxmlformats.org/officeDocument/2006/relationships" r:blip="">
-                      <dgm:adjLst/>
-                    </dgm:shape>
-                    <dgm:presOf/>
-                    <dgm:constrLst>
-                      <dgm:constr type="alignOff"/>
-                      <dgm:constr type="bendDist" for="des" ptType="parTrans" refType="sp" fact="0.5"/>
-                    </dgm:constrLst>
-                  </dgm:if>
-                  <dgm:if name="Name70" func="var" arg="hierBranch" op="equ" val="init">
-                    <dgm:choose name="Name71">
-                      <dgm:if name="Name72" axis="des" func="maxDepth" op="lte" val="1">
-                        <dgm:choose name="Name73">
-                          <dgm:if name="Name74" axis="ch" ptType="asst" func="cnt" op="gte" val="1">
-                            <dgm:alg type="hierRoot">
-                              <dgm:param type="hierAlign" val="tL"/>
-                            </dgm:alg>
-                            <dgm:shape xmlns:r="http://schemas.openxmlformats.org/officeDocument/2006/relationships" r:blip="">
-                              <dgm:adjLst/>
-                            </dgm:shape>
-                            <dgm:presOf/>
-                            <dgm:constrLst>
-                              <dgm:constr type="alignOff" val="0.65"/>
-                            </dgm:constrLst>
-                          </dgm:if>
-                          <dgm:else name="Name75">
-                            <dgm:alg type="hierRoot">
-                              <dgm:param type="hierAlign" val="tL"/>
-                            </dgm:alg>
-                            <dgm:shape xmlns:r="http://schemas.openxmlformats.org/officeDocument/2006/relationships" r:blip="">
-                              <dgm:adjLst/>
-                            </dgm:shape>
-                            <dgm:presOf/>
-                            <dgm:constrLst>
-                              <dgm:constr type="alignOff" val="0.25"/>
-                            </dgm:constrLst>
-                          </dgm:else>
-                        </dgm:choose>
-                      </dgm:if>
-                      <dgm:else name="Name76">
-                        <dgm:alg type="hierRoot"/>
-                        <dgm:shape xmlns:r="http://schemas.openxmlformats.org/officeDocument/2006/relationships" r:blip="">
-                          <dgm:adjLst/>
-                        </dgm:shape>
-                        <dgm:presOf/>
                         <dgm:constrLst>
                           <dgm:constr type="alignOff"/>
                           <dgm:constr type="bendDist" for="des" ptType="parTrans" refType="sp" fact="0.5"/>
                         </dgm:constrLst>
                       </dgm:else>
                     </dgm:choose>
-                  </dgm:if>
-                  <dgm:else name="Name77">
-                    <dgm:alg type="hierRoot"/>
-                    <dgm:shape xmlns:r="http://schemas.openxmlformats.org/officeDocument/2006/relationships" r:blip="">
-                      <dgm:adjLst/>
-                    </dgm:shape>
-                    <dgm:presOf/>
-                    <dgm:constrLst>
-                      <dgm:constr type="alignOff" val="0.65"/>
-                    </dgm:constrLst>
                   </dgm:else>
                 </dgm:choose>
+                <dgm:shape xmlns:r="http://schemas.openxmlformats.org/officeDocument/2006/relationships" r:blip="">
+                  <dgm:adjLst/>
+                </dgm:shape>
+                <dgm:presOf/>
                 <dgm:ruleLst/>
                 <dgm:layoutNode name="rootComposite">
                   <dgm:alg type="composite"/>
@@ -6577,8 +7015,8 @@
                     <dgm:adjLst/>
                   </dgm:shape>
                   <dgm:presOf axis="self" ptType="node" cnt="1"/>
-                  <dgm:choose name="Name78">
-                    <dgm:if name="Name79" func="var" arg="hierBranch" op="equ" val="init">
+                  <dgm:choose name="Name84">
+                    <dgm:if name="Name85" func="var" arg="hierBranch" op="equ" val="init">
                       <dgm:constrLst>
                         <dgm:constr type="l" for="ch" forName="rootText"/>
                         <dgm:constr type="t" for="ch" forName="rootText"/>
@@ -6590,7 +7028,7 @@
                         <dgm:constr type="h" for="ch" forName="rootConnector" refType="h" refFor="ch" refForName="rootText"/>
                       </dgm:constrLst>
                     </dgm:if>
-                    <dgm:if name="Name80" func="var" arg="hierBranch" op="equ" val="l">
+                    <dgm:if name="Name86" func="var" arg="hierBranch" op="equ" val="l">
                       <dgm:constrLst>
                         <dgm:constr type="l" for="ch" forName="rootText"/>
                         <dgm:constr type="t" for="ch" forName="rootText"/>
@@ -6602,7 +7040,7 @@
                         <dgm:constr type="h" for="ch" forName="rootConnector" refType="h" refFor="ch" refForName="rootText"/>
                       </dgm:constrLst>
                     </dgm:if>
-                    <dgm:if name="Name81" func="var" arg="hierBranch" op="equ" val="r">
+                    <dgm:if name="Name87" func="var" arg="hierBranch" op="equ" val="r">
                       <dgm:constrLst>
                         <dgm:constr type="l" for="ch" forName="rootText"/>
                         <dgm:constr type="t" for="ch" forName="rootText"/>
@@ -6614,7 +7052,7 @@
                         <dgm:constr type="h" for="ch" forName="rootConnector" refType="h" refFor="ch" refForName="rootText"/>
                       </dgm:constrLst>
                     </dgm:if>
-                    <dgm:else name="Name82">
+                    <dgm:else name="Name88">
                       <dgm:constrLst>
                         <dgm:constr type="l" for="ch" forName="rootText"/>
                         <dgm:constr type="t" for="ch" forName="rootText"/>
@@ -6659,74 +7097,75 @@
                   </dgm:layoutNode>
                 </dgm:layoutNode>
                 <dgm:layoutNode name="hierChild4">
-                  <dgm:choose name="Name83">
-                    <dgm:if name="Name84" func="var" arg="hierBranch" op="equ" val="l">
-                      <dgm:alg type="hierChild">
-                        <dgm:param type="chAlign" val="r"/>
-                        <dgm:param type="linDir" val="fromT"/>
-                      </dgm:alg>
-                    </dgm:if>
-                    <dgm:if name="Name85" func="var" arg="hierBranch" op="equ" val="r">
-                      <dgm:alg type="hierChild">
-                        <dgm:param type="chAlign" val="l"/>
-                        <dgm:param type="linDir" val="fromT"/>
-                      </dgm:alg>
-                    </dgm:if>
-                    <dgm:if name="Name86" func="var" arg="hierBranch" op="equ" val="hang">
-                      <dgm:choose name="Name87">
-                        <dgm:if name="Name88" func="var" arg="dir" op="equ" val="norm">
-                          <dgm:alg type="hierChild">
-                            <dgm:param type="chAlign" val="l"/>
-                            <dgm:param type="linDir" val="fromL"/>
-                            <dgm:param type="secChAlign" val="t"/>
-                            <dgm:param type="secLinDir" val="fromT"/>
-                          </dgm:alg>
-                        </dgm:if>
-                        <dgm:else name="Name89">
-                          <dgm:alg type="hierChild">
-                            <dgm:param type="chAlign" val="l"/>
-                            <dgm:param type="linDir" val="fromR"/>
-                            <dgm:param type="secChAlign" val="t"/>
-                            <dgm:param type="secLinDir" val="fromT"/>
-                          </dgm:alg>
-                        </dgm:else>
-                      </dgm:choose>
-                    </dgm:if>
-                    <dgm:if name="Name90" func="var" arg="hierBranch" op="equ" val="std">
+                  <dgm:choose name="Name89">
+                    <dgm:if name="Name90" func="var" arg="hierBranch" op="equ" val="l">
                       <dgm:choose name="Name91">
                         <dgm:if name="Name92" func="var" arg="dir" op="equ" val="norm">
-                          <dgm:alg type="hierChild"/>
+                          <dgm:alg type="hierChild">
+                            <dgm:param type="chAlign" val="t"/>
+                            <dgm:param type="linDir" val="fromL"/>
+                          </dgm:alg>
                         </dgm:if>
                         <dgm:else name="Name93">
                           <dgm:alg type="hierChild">
+                            <dgm:param type="chAlign" val="t"/>
                             <dgm:param type="linDir" val="fromR"/>
                           </dgm:alg>
                         </dgm:else>
                       </dgm:choose>
                     </dgm:if>
-                    <dgm:if name="Name94" func="var" arg="hierBranch" op="equ" val="init">
+                    <dgm:if name="Name94" func="var" arg="hierBranch" op="equ" val="r">
                       <dgm:choose name="Name95">
-                        <dgm:if name="Name96" axis="des" func="maxDepth" op="lte" val="1">
+                        <dgm:if name="Name96" func="var" arg="dir" op="equ" val="norm">
+                          <dgm:alg type="hierChild">
+                            <dgm:param type="chAlign" val="b"/>
+                            <dgm:param type="linDir" val="fromL"/>
+                          </dgm:alg>
+                        </dgm:if>
+                        <dgm:else name="Name97">
+                          <dgm:alg type="hierChild">
+                            <dgm:param type="chAlign" val="b"/>
+                            <dgm:param type="linDir" val="fromR"/>
+                          </dgm:alg>
+                        </dgm:else>
+                      </dgm:choose>
+                    </dgm:if>
+                    <dgm:if name="Name98" func="var" arg="hierBranch" op="equ" val="hang">
+                      <dgm:choose name="Name99">
+                        <dgm:if name="Name100" func="var" arg="dir" op="equ" val="norm">
                           <dgm:alg type="hierChild">
                             <dgm:param type="chAlign" val="l"/>
                             <dgm:param type="linDir" val="fromT"/>
+                            <dgm:param type="secChAlign" val="t"/>
+                            <dgm:param type="secLinDir" val="fromL"/>
                           </dgm:alg>
                         </dgm:if>
-                        <dgm:else name="Name97">
-                          <dgm:choose name="Name98">
-                            <dgm:if name="Name99" func="var" arg="dir" op="equ" val="norm">
-                              <dgm:alg type="hierChild"/>
-                            </dgm:if>
-                            <dgm:else name="Name100">
-                              <dgm:alg type="hierChild">
-                                <dgm:param type="linDir" val="fromR"/>
-                              </dgm:alg>
-                            </dgm:else>
-                          </dgm:choose>
+                        <dgm:else name="Name101">
+                          <dgm:alg type="hierChild">
+                            <dgm:param type="chAlign" val="r"/>
+                            <dgm:param type="linDir" val="fromT"/>
+                            <dgm:param type="secChAlign" val="t"/>
+                            <dgm:param type="secLinDir" val="fromR"/>
+                          </dgm:alg>
                         </dgm:else>
                       </dgm:choose>
                     </dgm:if>
-                    <dgm:else name="Name101"/>
+                    <dgm:else name="Name102">
+                      <dgm:choose name="Name103">
+                        <dgm:if name="Name104" func="var" arg="dir" op="equ" val="norm">
+                          <dgm:alg type="hierChild">
+                            <dgm:param type="linDir" val="fromT"/>
+                            <dgm:param type="chAlign" val="l"/>
+                          </dgm:alg>
+                        </dgm:if>
+                        <dgm:else name="Name105">
+                          <dgm:alg type="hierChild">
+                            <dgm:param type="linDir" val="fromT"/>
+                            <dgm:param type="chAlign" val="r"/>
+                          </dgm:alg>
+                        </dgm:else>
+                      </dgm:choose>
+                    </dgm:else>
                   </dgm:choose>
                   <dgm:shape xmlns:r="http://schemas.openxmlformats.org/officeDocument/2006/relationships" r:blip="">
                     <dgm:adjLst/>
@@ -6734,24 +7173,24 @@
                   <dgm:presOf/>
                   <dgm:constrLst/>
                   <dgm:ruleLst/>
-                  <dgm:forEach name="Name102" ref="rep2a"/>
+                  <dgm:forEach name="Name106" ref="rep2a"/>
                 </dgm:layoutNode>
                 <dgm:layoutNode name="hierChild5">
-                  <dgm:choose name="Name103">
-                    <dgm:if name="Name104" func="var" arg="dir" op="equ" val="norm">
+                  <dgm:choose name="Name107">
+                    <dgm:if name="Name108" func="var" arg="dir" op="equ" val="norm">
                       <dgm:alg type="hierChild">
                         <dgm:param type="chAlign" val="l"/>
-                        <dgm:param type="linDir" val="fromL"/>
+                        <dgm:param type="linDir" val="fromT"/>
                         <dgm:param type="secChAlign" val="t"/>
-                        <dgm:param type="secLinDir" val="fromT"/>
+                        <dgm:param type="secLinDir" val="fromL"/>
                       </dgm:alg>
                     </dgm:if>
-                    <dgm:else name="Name105">
+                    <dgm:else name="Name109">
                       <dgm:alg type="hierChild">
-                        <dgm:param type="chAlign" val="l"/>
-                        <dgm:param type="linDir" val="fromR"/>
+                        <dgm:param type="chAlign" val="r"/>
+                        <dgm:param type="linDir" val="fromT"/>
                         <dgm:param type="secChAlign" val="t"/>
-                        <dgm:param type="secLinDir" val="fromT"/>
+                        <dgm:param type="secLinDir" val="fromR"/>
                       </dgm:alg>
                     </dgm:else>
                   </dgm:choose>
@@ -6761,27 +7200,27 @@
                   <dgm:presOf/>
                   <dgm:constrLst/>
                   <dgm:ruleLst/>
-                  <dgm:forEach name="Name106" ref="rep2b"/>
+                  <dgm:forEach name="Name110" ref="rep2b"/>
                 </dgm:layoutNode>
               </dgm:layoutNode>
             </dgm:forEach>
           </dgm:layoutNode>
           <dgm:layoutNode name="hierChild3">
-            <dgm:choose name="Name107">
-              <dgm:if name="Name108" func="var" arg="dir" op="equ" val="norm">
+            <dgm:choose name="Name111">
+              <dgm:if name="Name112" func="var" arg="dir" op="equ" val="norm">
                 <dgm:alg type="hierChild">
                   <dgm:param type="chAlign" val="l"/>
-                  <dgm:param type="linDir" val="fromL"/>
+                  <dgm:param type="linDir" val="fromT"/>
                   <dgm:param type="secChAlign" val="t"/>
-                  <dgm:param type="secLinDir" val="fromT"/>
+                  <dgm:param type="secLinDir" val="fromL"/>
                 </dgm:alg>
               </dgm:if>
-              <dgm:else name="Name109">
+              <dgm:else name="Name113">
                 <dgm:alg type="hierChild">
-                  <dgm:param type="chAlign" val="l"/>
-                  <dgm:param type="linDir" val="fromR"/>
+                  <dgm:param type="chAlign" val="r"/>
+                  <dgm:param type="linDir" val="fromT"/>
                   <dgm:param type="secChAlign" val="t"/>
-                  <dgm:param type="secLinDir" val="fromT"/>
+                  <dgm:param type="secLinDir" val="fromR"/>
                 </dgm:alg>
               </dgm:else>
             </dgm:choose>
@@ -6792,15 +7231,28 @@
             <dgm:constrLst/>
             <dgm:ruleLst/>
             <dgm:forEach name="rep2b" axis="ch" ptType="asst">
-              <dgm:forEach name="Name110" axis="precedSib" ptType="parTrans" st="-1" cnt="1">
-                <dgm:layoutNode name="Name111">
-                  <dgm:alg type="conn">
-                    <dgm:param type="connRout" val="bend"/>
-                    <dgm:param type="dim" val="1D"/>
-                    <dgm:param type="endSty" val="noArr"/>
-                    <dgm:param type="begPts" val="bCtr"/>
-                    <dgm:param type="endPts" val="midL midR"/>
-                  </dgm:alg>
+              <dgm:forEach name="Name114" axis="precedSib" ptType="parTrans" st="-1" cnt="1">
+                <dgm:layoutNode name="Name115">
+                  <dgm:choose name="Name116">
+                    <dgm:if name="Name117" func="var" arg="dir" op="equ" val="norm">
+                      <dgm:alg type="conn">
+                        <dgm:param type="connRout" val="bend"/>
+                        <dgm:param type="dim" val="1D"/>
+                        <dgm:param type="endSty" val="noArr"/>
+                        <dgm:param type="begPts" val="midR"/>
+                        <dgm:param type="endPts" val="bCtr tCtr"/>
+                      </dgm:alg>
+                    </dgm:if>
+                    <dgm:else name="Name118">
+                      <dgm:alg type="conn">
+                        <dgm:param type="connRout" val="bend"/>
+                        <dgm:param type="dim" val="1D"/>
+                        <dgm:param type="endSty" val="noArr"/>
+                        <dgm:param type="begPts" val="midL"/>
+                        <dgm:param type="endPts" val="bCtr tCtr"/>
+                      </dgm:alg>
+                    </dgm:else>
+                  </dgm:choose>
                   <dgm:shape xmlns:r="http://schemas.openxmlformats.org/officeDocument/2006/relationships" type="conn" r:blip="" zOrderOff="-99999">
                     <dgm:adjLst/>
                   </dgm:shape>
@@ -6816,81 +7268,94 @@
                 <dgm:varLst>
                   <dgm:hierBranch val="init"/>
                 </dgm:varLst>
-                <dgm:choose name="Name112">
-                  <dgm:if name="Name113" func="var" arg="hierBranch" op="equ" val="l">
-                    <dgm:alg type="hierRoot">
-                      <dgm:param type="hierAlign" val="tR"/>
-                    </dgm:alg>
-                    <dgm:shape xmlns:r="http://schemas.openxmlformats.org/officeDocument/2006/relationships" r:blip="">
-                      <dgm:adjLst/>
-                    </dgm:shape>
-                    <dgm:presOf/>
-                    <dgm:constrLst>
-                      <dgm:constr type="alignOff" val="0.65"/>
-                    </dgm:constrLst>
+                <dgm:choose name="Name119">
+                  <dgm:if name="Name120" func="var" arg="hierBranch" op="equ" val="l">
+                    <dgm:choose name="Name121">
+                      <dgm:if name="Name122" func="var" arg="dir" op="equ" val="norm">
+                        <dgm:alg type="hierRoot">
+                          <dgm:param type="hierAlign" val="lT"/>
+                        </dgm:alg>
+                        <dgm:constrLst>
+                          <dgm:constr type="alignOff" val="0.75"/>
+                        </dgm:constrLst>
+                      </dgm:if>
+                      <dgm:else name="Name123">
+                        <dgm:alg type="hierRoot">
+                          <dgm:param type="hierAlign" val="rT"/>
+                        </dgm:alg>
+                        <dgm:constrLst>
+                          <dgm:constr type="alignOff" val="0.75"/>
+                        </dgm:constrLst>
+                      </dgm:else>
+                    </dgm:choose>
                   </dgm:if>
-                  <dgm:if name="Name114" func="var" arg="hierBranch" op="equ" val="r">
-                    <dgm:alg type="hierRoot">
-                      <dgm:param type="hierAlign" val="tL"/>
-                    </dgm:alg>
-                    <dgm:shape xmlns:r="http://schemas.openxmlformats.org/officeDocument/2006/relationships" r:blip="">
-                      <dgm:adjLst/>
-                    </dgm:shape>
-                    <dgm:presOf/>
-                    <dgm:constrLst>
-                      <dgm:constr type="alignOff" val="0.65"/>
-                    </dgm:constrLst>
+                  <dgm:if name="Name124" func="var" arg="hierBranch" op="equ" val="r">
+                    <dgm:choose name="Name125">
+                      <dgm:if name="Name126" func="var" arg="dir" op="equ" val="norm">
+                        <dgm:alg type="hierRoot">
+                          <dgm:param type="hierAlign" val="lB"/>
+                        </dgm:alg>
+                        <dgm:constrLst>
+                          <dgm:constr type="alignOff" val="0.75"/>
+                        </dgm:constrLst>
+                      </dgm:if>
+                      <dgm:else name="Name127">
+                        <dgm:alg type="hierRoot">
+                          <dgm:param type="hierAlign" val="rB"/>
+                        </dgm:alg>
+                        <dgm:constrLst>
+                          <dgm:constr type="alignOff" val="0.75"/>
+                        </dgm:constrLst>
+                      </dgm:else>
+                    </dgm:choose>
                   </dgm:if>
-                  <dgm:if name="Name115" func="var" arg="hierBranch" op="equ" val="hang">
-                    <dgm:alg type="hierRoot"/>
-                    <dgm:shape xmlns:r="http://schemas.openxmlformats.org/officeDocument/2006/relationships" r:blip="">
-                      <dgm:adjLst/>
-                    </dgm:shape>
-                    <dgm:presOf/>
-                    <dgm:constrLst>
-                      <dgm:constr type="alignOff" val="0.65"/>
-                    </dgm:constrLst>
-                  </dgm:if>
-                  <dgm:if name="Name116" func="var" arg="hierBranch" op="equ" val="std">
-                    <dgm:alg type="hierRoot"/>
-                    <dgm:shape xmlns:r="http://schemas.openxmlformats.org/officeDocument/2006/relationships" r:blip="">
-                      <dgm:adjLst/>
-                    </dgm:shape>
-                    <dgm:presOf/>
-                    <dgm:constrLst>
-                      <dgm:constr type="alignOff"/>
-                      <dgm:constr type="bendDist" for="des" ptType="parTrans" refType="sp" fact="0.5"/>
-                    </dgm:constrLst>
-                  </dgm:if>
-                  <dgm:if name="Name117" func="var" arg="hierBranch" op="equ" val="init">
-                    <dgm:choose name="Name118">
-                      <dgm:if name="Name119" axis="des" func="maxDepth" op="lte" val="1">
+                  <dgm:if name="Name128" func="var" arg="hierBranch" op="equ" val="hang">
+                    <dgm:choose name="Name129">
+                      <dgm:if name="Name130" func="var" arg="dir" op="equ" val="norm">
                         <dgm:alg type="hierRoot">
-                          <dgm:param type="hierAlign" val="tL"/>
+                          <dgm:param type="hierAlign" val="lCtrCh"/>
                         </dgm:alg>
-                        <dgm:shape xmlns:r="http://schemas.openxmlformats.org/officeDocument/2006/relationships" r:blip="">
-                          <dgm:adjLst/>
-                        </dgm:shape>
-                        <dgm:presOf/>
                         <dgm:constrLst>
                           <dgm:constr type="alignOff" val="0.65"/>
                         </dgm:constrLst>
                       </dgm:if>
-                      <dgm:else name="Name120">
-                        <dgm:alg type="hierRoot"/>
-                        <dgm:shape xmlns:r="http://schemas.openxmlformats.org/officeDocument/2006/relationships" r:blip="">
-                          <dgm:adjLst/>
-                        </dgm:shape>
-                        <dgm:presOf/>
+                      <dgm:else name="Name131">
+                        <dgm:alg type="hierRoot">
+                          <dgm:param type="hierAlign" val="rCtrCh"/>
+                        </dgm:alg>
+                        <dgm:constrLst>
+                          <dgm:constr type="alignOff" val="0.65"/>
+                        </dgm:constrLst>
+                      </dgm:else>
+                    </dgm:choose>
+                  </dgm:if>
+                  <dgm:else name="Name132">
+                    <dgm:choose name="Name133">
+                      <dgm:if name="Name134" func="var" arg="dir" op="equ" val="norm">
+                        <dgm:alg type="hierRoot">
+                          <dgm:param type="hierAlign" val="lCtrCh"/>
+                        </dgm:alg>
+                        <dgm:constrLst>
+                          <dgm:constr type="alignOff"/>
+                          <dgm:constr type="bendDist" for="des" ptType="parTrans" refType="sp" fact="0.5"/>
+                        </dgm:constrLst>
+                      </dgm:if>
+                      <dgm:else name="Name135">
+                        <dgm:alg type="hierRoot">
+                          <dgm:param type="hierAlign" val="rCtrCh"/>
+                        </dgm:alg>
                         <dgm:constrLst>
                           <dgm:constr type="alignOff"/>
                           <dgm:constr type="bendDist" for="des" ptType="parTrans" refType="sp" fact="0.5"/>
                         </dgm:constrLst>
                       </dgm:else>
                     </dgm:choose>
-                  </dgm:if>
-                  <dgm:else name="Name121"/>
+                  </dgm:else>
                 </dgm:choose>
+                <dgm:shape xmlns:r="http://schemas.openxmlformats.org/officeDocument/2006/relationships" r:blip="">
+                  <dgm:adjLst/>
+                </dgm:shape>
+                <dgm:presOf/>
                 <dgm:ruleLst/>
                 <dgm:layoutNode name="rootComposite3">
                   <dgm:alg type="composite"/>
@@ -6898,8 +7363,8 @@
                     <dgm:adjLst/>
                   </dgm:shape>
                   <dgm:presOf axis="self" ptType="node" cnt="1"/>
-                  <dgm:choose name="Name122">
-                    <dgm:if name="Name123" func="var" arg="hierBranch" op="equ" val="init">
+                  <dgm:choose name="Name136">
+                    <dgm:if name="Name137" func="var" arg="hierBranch" op="equ" val="init">
                       <dgm:constrLst>
                         <dgm:constr type="l" for="ch" forName="rootText3"/>
                         <dgm:constr type="t" for="ch" forName="rootText3"/>
@@ -6911,7 +7376,7 @@
                         <dgm:constr type="h" for="ch" forName="rootConnector3" refType="h" refFor="ch" refForName="rootText3"/>
                       </dgm:constrLst>
                     </dgm:if>
-                    <dgm:if name="Name124" func="var" arg="hierBranch" op="equ" val="l">
+                    <dgm:if name="Name138" func="var" arg="hierBranch" op="equ" val="l">
                       <dgm:constrLst>
                         <dgm:constr type="l" for="ch" forName="rootText3"/>
                         <dgm:constr type="t" for="ch" forName="rootText3"/>
@@ -6923,7 +7388,7 @@
                         <dgm:constr type="h" for="ch" forName="rootConnector3" refType="h" refFor="ch" refForName="rootText3"/>
                       </dgm:constrLst>
                     </dgm:if>
-                    <dgm:if name="Name125" func="var" arg="hierBranch" op="equ" val="r">
+                    <dgm:if name="Name139" func="var" arg="hierBranch" op="equ" val="r">
                       <dgm:constrLst>
                         <dgm:constr type="l" for="ch" forName="rootText3"/>
                         <dgm:constr type="t" for="ch" forName="rootText3"/>
@@ -6935,7 +7400,7 @@
                         <dgm:constr type="h" for="ch" forName="rootConnector3" refType="h" refFor="ch" refForName="rootText3"/>
                       </dgm:constrLst>
                     </dgm:if>
-                    <dgm:else name="Name126">
+                    <dgm:else name="Name140">
                       <dgm:constrLst>
                         <dgm:constr type="l" for="ch" forName="rootText3"/>
                         <dgm:constr type="t" for="ch" forName="rootText3"/>
@@ -6980,65 +7445,75 @@
                   </dgm:layoutNode>
                 </dgm:layoutNode>
                 <dgm:layoutNode name="hierChild6">
-                  <dgm:choose name="Name127">
-                    <dgm:if name="Name128" func="var" arg="hierBranch" op="equ" val="l">
-                      <dgm:alg type="hierChild">
-                        <dgm:param type="chAlign" val="r"/>
-                        <dgm:param type="linDir" val="fromT"/>
-                      </dgm:alg>
-                    </dgm:if>
-                    <dgm:if name="Name129" func="var" arg="hierBranch" op="equ" val="r">
-                      <dgm:alg type="hierChild">
-                        <dgm:param type="chAlign" val="l"/>
-                        <dgm:param type="linDir" val="fromT"/>
-                      </dgm:alg>
-                    </dgm:if>
-                    <dgm:if name="Name130" func="var" arg="hierBranch" op="equ" val="hang">
-                      <dgm:choose name="Name131">
-                        <dgm:if name="Name132" func="var" arg="dir" op="equ" val="norm">
+                  <dgm:choose name="Name141">
+                    <dgm:if name="Name142" func="var" arg="hierBranch" op="equ" val="l">
+                      <dgm:choose name="Name143">
+                        <dgm:if name="Name144" func="var" arg="dir" op="equ" val="norm">
                           <dgm:alg type="hierChild">
-                            <dgm:param type="chAlign" val="l"/>
+                            <dgm:param type="chAlign" val="t"/>
                             <dgm:param type="linDir" val="fromL"/>
-                            <dgm:param type="secChAlign" val="t"/>
-                            <dgm:param type="secLinDir" val="fromT"/>
                           </dgm:alg>
                         </dgm:if>
-                        <dgm:else name="Name133">
+                        <dgm:else name="Name145">
                           <dgm:alg type="hierChild">
-                            <dgm:param type="chAlign" val="l"/>
-                            <dgm:param type="linDir" val="fromR"/>
-                            <dgm:param type="secChAlign" val="t"/>
-                            <dgm:param type="secLinDir" val="fromT"/>
-                          </dgm:alg>
-                        </dgm:else>
-                      </dgm:choose>
-                    </dgm:if>
-                    <dgm:if name="Name134" func="var" arg="hierBranch" op="equ" val="std">
-                      <dgm:choose name="Name135">
-                        <dgm:if name="Name136" func="var" arg="dir" op="equ" val="norm">
-                          <dgm:alg type="hierChild"/>
-                        </dgm:if>
-                        <dgm:else name="Name137">
-                          <dgm:alg type="hierChild">
+                            <dgm:param type="chAlign" val="t"/>
                             <dgm:param type="linDir" val="fromR"/>
                           </dgm:alg>
                         </dgm:else>
                       </dgm:choose>
                     </dgm:if>
-                    <dgm:if name="Name138" func="var" arg="hierBranch" op="equ" val="init">
-                      <dgm:choose name="Name139">
-                        <dgm:if name="Name140" axis="des" func="maxDepth" op="lte" val="1">
+                    <dgm:if name="Name146" func="var" arg="hierBranch" op="equ" val="r">
+                      <dgm:choose name="Name147">
+                        <dgm:if name="Name148" func="var" arg="dir" op="equ" val="norm">
+                          <dgm:alg type="hierChild">
+                            <dgm:param type="chAlign" val="b"/>
+                            <dgm:param type="linDir" val="fromL"/>
+                          </dgm:alg>
+                        </dgm:if>
+                        <dgm:else name="Name149">
+                          <dgm:alg type="hierChild">
+                            <dgm:param type="chAlign" val="b"/>
+                            <dgm:param type="linDir" val="fromR"/>
+                          </dgm:alg>
+                        </dgm:else>
+                      </dgm:choose>
+                    </dgm:if>
+                    <dgm:if name="Name150" func="var" arg="hierBranch" op="equ" val="hang">
+                      <dgm:choose name="Name151">
+                        <dgm:if name="Name152" func="var" arg="dir" op="equ" val="norm">
                           <dgm:alg type="hierChild">
                             <dgm:param type="chAlign" val="l"/>
                             <dgm:param type="linDir" val="fromT"/>
+                            <dgm:param type="secChAlign" val="t"/>
+                            <dgm:param type="secLinDir" val="fromL"/>
                           </dgm:alg>
                         </dgm:if>
-                        <dgm:else name="Name141">
-                          <dgm:alg type="hierChild"/>
+                        <dgm:else name="Name153">
+                          <dgm:alg type="hierChild">
+                            <dgm:param type="chAlign" val="r"/>
+                            <dgm:param type="linDir" val="fromT"/>
+                            <dgm:param type="secChAlign" val="t"/>
+                            <dgm:param type="secLinDir" val="fromR"/>
+                          </dgm:alg>
                         </dgm:else>
                       </dgm:choose>
                     </dgm:if>
-                    <dgm:else name="Name142"/>
+                    <dgm:else name="Name154">
+                      <dgm:choose name="Name155">
+                        <dgm:if name="Name156" func="var" arg="dir" op="equ" val="norm">
+                          <dgm:alg type="hierChild">
+                            <dgm:param type="linDir" val="fromT"/>
+                            <dgm:param type="chAlign" val="l"/>
+                          </dgm:alg>
+                        </dgm:if>
+                        <dgm:else name="Name157">
+                          <dgm:alg type="hierChild">
+                            <dgm:param type="linDir" val="fromT"/>
+                            <dgm:param type="chAlign" val="r"/>
+                          </dgm:alg>
+                        </dgm:else>
+                      </dgm:choose>
+                    </dgm:else>
                   </dgm:choose>
                   <dgm:shape xmlns:r="http://schemas.openxmlformats.org/officeDocument/2006/relationships" r:blip="">
                     <dgm:adjLst/>
@@ -7046,24 +7521,24 @@
                   <dgm:presOf/>
                   <dgm:constrLst/>
                   <dgm:ruleLst/>
-                  <dgm:forEach name="Name143" ref="rep2a"/>
+                  <dgm:forEach name="Name158" ref="rep2a"/>
                 </dgm:layoutNode>
                 <dgm:layoutNode name="hierChild7">
-                  <dgm:choose name="Name144">
-                    <dgm:if name="Name145" func="var" arg="dir" op="equ" val="norm">
+                  <dgm:choose name="Name159">
+                    <dgm:if name="Name160" func="var" arg="dir" op="equ" val="norm">
                       <dgm:alg type="hierChild">
                         <dgm:param type="chAlign" val="l"/>
-                        <dgm:param type="linDir" val="fromL"/>
+                        <dgm:param type="linDir" val="fromT"/>
                         <dgm:param type="secChAlign" val="t"/>
-                        <dgm:param type="secLinDir" val="fromT"/>
+                        <dgm:param type="secLinDir" val="fromL"/>
                       </dgm:alg>
                     </dgm:if>
-                    <dgm:else name="Name146">
+                    <dgm:else name="Name161">
                       <dgm:alg type="hierChild">
-                        <dgm:param type="chAlign" val="l"/>
-                        <dgm:param type="linDir" val="fromR"/>
+                        <dgm:param type="chAlign" val="r"/>
+                        <dgm:param type="linDir" val="fromT"/>
                         <dgm:param type="secChAlign" val="t"/>
-                        <dgm:param type="secLinDir" val="fromT"/>
+                        <dgm:param type="secLinDir" val="fromR"/>
                       </dgm:alg>
                     </dgm:else>
                   </dgm:choose>
@@ -7073,7 +7548,7 @@
                   <dgm:presOf/>
                   <dgm:constrLst/>
                   <dgm:ruleLst/>
-                  <dgm:forEach name="Name147" ref="rep2b"/>
+                  <dgm:forEach name="Name162" ref="rep2b"/>
                 </dgm:layoutNode>
               </dgm:layoutNode>
             </dgm:forEach>
@@ -13183,7 +13658,7 @@
             <p:ph idx="1"/>
             <p:extLst>
               <p:ext uri="{D42A27DB-BD31-4B8C-83A1-F6EECF244321}">
-                <p14:modId xmlns:p14="http://schemas.microsoft.com/office/powerpoint/2010/main" val="2587495106"/>
+                <p14:modId xmlns:p14="http://schemas.microsoft.com/office/powerpoint/2010/main" val="3864517683"/>
               </p:ext>
             </p:extLst>
           </p:nvPr>
@@ -14425,10 +14900,10 @@
       </p:grpSpPr>
       <p:pic>
         <p:nvPicPr>
-          <p:cNvPr id="2066" name="Picture 18">
+          <p:cNvPr id="1026" name="Picture 2">
             <a:extLst>
               <a:ext uri="{FF2B5EF4-FFF2-40B4-BE49-F238E27FC236}">
-                <a16:creationId xmlns:a16="http://schemas.microsoft.com/office/drawing/2014/main" id="{F75A5148-0475-4D1D-ACC2-BDFC958945FD}"/>
+                <a16:creationId xmlns:a16="http://schemas.microsoft.com/office/drawing/2014/main" id="{0DB4A548-A99F-4036-B7F5-934DCCF4D32B}"/>
               </a:ext>
             </a:extLst>
           </p:cNvPr>
@@ -14452,8 +14927,8 @@
         </p:blipFill>
         <p:spPr bwMode="auto">
           <a:xfrm>
-            <a:off x="284175" y="0"/>
-            <a:ext cx="2544425" cy="2300648"/>
+            <a:off x="1283145" y="313444"/>
+            <a:ext cx="2380101" cy="2152067"/>
           </a:xfrm>
           <a:prstGeom prst="rect">
             <a:avLst/>
@@ -14472,10 +14947,10 @@
       </p:pic>
       <p:pic>
         <p:nvPicPr>
-          <p:cNvPr id="2068" name="Picture 20">
+          <p:cNvPr id="1028" name="Picture 4">
             <a:extLst>
               <a:ext uri="{FF2B5EF4-FFF2-40B4-BE49-F238E27FC236}">
-                <a16:creationId xmlns:a16="http://schemas.microsoft.com/office/drawing/2014/main" id="{123CC6A6-4A2B-49D4-9CAB-A86800F04C03}"/>
+                <a16:creationId xmlns:a16="http://schemas.microsoft.com/office/drawing/2014/main" id="{4F6106A9-87CD-4B34-A668-9E5BAC6A9B5D}"/>
               </a:ext>
             </a:extLst>
           </p:cNvPr>
@@ -14499,8 +14974,8 @@
         </p:blipFill>
         <p:spPr bwMode="auto">
           <a:xfrm>
-            <a:off x="3077929" y="0"/>
-            <a:ext cx="2544425" cy="2300648"/>
+            <a:off x="3720937" y="248766"/>
+            <a:ext cx="2380101" cy="2152067"/>
           </a:xfrm>
           <a:prstGeom prst="rect">
             <a:avLst/>
@@ -14519,10 +14994,10 @@
       </p:pic>
       <p:pic>
         <p:nvPicPr>
-          <p:cNvPr id="2070" name="Picture 22">
+          <p:cNvPr id="1030" name="Picture 6">
             <a:extLst>
               <a:ext uri="{FF2B5EF4-FFF2-40B4-BE49-F238E27FC236}">
-                <a16:creationId xmlns:a16="http://schemas.microsoft.com/office/drawing/2014/main" id="{F9C5AD16-B9F0-44A1-BC77-9E0102C9E703}"/>
+                <a16:creationId xmlns:a16="http://schemas.microsoft.com/office/drawing/2014/main" id="{12CECFB2-9797-4C3A-8617-6D41D84800D6}"/>
               </a:ext>
             </a:extLst>
           </p:cNvPr>
@@ -14546,8 +15021,8 @@
         </p:blipFill>
         <p:spPr bwMode="auto">
           <a:xfrm>
-            <a:off x="6055160" y="0"/>
-            <a:ext cx="2544425" cy="2300648"/>
+            <a:off x="6401745" y="248767"/>
+            <a:ext cx="2380101" cy="2152067"/>
           </a:xfrm>
           <a:prstGeom prst="rect">
             <a:avLst/>
@@ -14566,10 +15041,10 @@
       </p:pic>
       <p:pic>
         <p:nvPicPr>
-          <p:cNvPr id="2072" name="Picture 24">
+          <p:cNvPr id="1032" name="Picture 8">
             <a:extLst>
               <a:ext uri="{FF2B5EF4-FFF2-40B4-BE49-F238E27FC236}">
-                <a16:creationId xmlns:a16="http://schemas.microsoft.com/office/drawing/2014/main" id="{41AC36CA-F7DE-4947-B697-388D2B3D23C6}"/>
+                <a16:creationId xmlns:a16="http://schemas.microsoft.com/office/drawing/2014/main" id="{9A020606-4A05-4E5F-965C-1E6079196D4C}"/>
               </a:ext>
             </a:extLst>
           </p:cNvPr>
@@ -14593,8 +15068,8 @@
         </p:blipFill>
         <p:spPr bwMode="auto">
           <a:xfrm>
-            <a:off x="9195845" y="0"/>
-            <a:ext cx="2544425" cy="2300648"/>
+            <a:off x="9284349" y="2914"/>
+            <a:ext cx="2380101" cy="2152067"/>
           </a:xfrm>
           <a:prstGeom prst="rect">
             <a:avLst/>
@@ -14613,10 +15088,10 @@
       </p:pic>
       <p:pic>
         <p:nvPicPr>
-          <p:cNvPr id="2074" name="Picture 26">
+          <p:cNvPr id="1034" name="Picture 10">
             <a:extLst>
               <a:ext uri="{FF2B5EF4-FFF2-40B4-BE49-F238E27FC236}">
-                <a16:creationId xmlns:a16="http://schemas.microsoft.com/office/drawing/2014/main" id="{6C363C70-1632-445D-A66B-6F3E63513399}"/>
+                <a16:creationId xmlns:a16="http://schemas.microsoft.com/office/drawing/2014/main" id="{AF534A8D-490B-452C-B651-916A6FCA1973}"/>
               </a:ext>
             </a:extLst>
           </p:cNvPr>
@@ -14640,8 +15115,8 @@
         </p:blipFill>
         <p:spPr bwMode="auto">
           <a:xfrm>
-            <a:off x="203641" y="2272463"/>
-            <a:ext cx="2544425" cy="2300648"/>
+            <a:off x="1401644" y="2466729"/>
+            <a:ext cx="2380101" cy="2152067"/>
           </a:xfrm>
           <a:prstGeom prst="rect">
             <a:avLst/>
@@ -14660,10 +15135,10 @@
       </p:pic>
       <p:pic>
         <p:nvPicPr>
-          <p:cNvPr id="2076" name="Picture 28">
+          <p:cNvPr id="1036" name="Picture 12">
             <a:extLst>
               <a:ext uri="{FF2B5EF4-FFF2-40B4-BE49-F238E27FC236}">
-                <a16:creationId xmlns:a16="http://schemas.microsoft.com/office/drawing/2014/main" id="{26ABFFA0-6EBA-40FA-BE33-000C1DE35372}"/>
+                <a16:creationId xmlns:a16="http://schemas.microsoft.com/office/drawing/2014/main" id="{86BD6E57-29A0-4024-8DE0-8AA86C7E1FA1}"/>
               </a:ext>
             </a:extLst>
           </p:cNvPr>
@@ -14687,8 +15162,8 @@
         </p:blipFill>
         <p:spPr bwMode="auto">
           <a:xfrm>
-            <a:off x="3064115" y="2252109"/>
-            <a:ext cx="2544425" cy="2300648"/>
+            <a:off x="3813149" y="2532626"/>
+            <a:ext cx="2380101" cy="2152067"/>
           </a:xfrm>
           <a:prstGeom prst="rect">
             <a:avLst/>
@@ -14707,10 +15182,10 @@
       </p:pic>
       <p:pic>
         <p:nvPicPr>
-          <p:cNvPr id="2078" name="Picture 30">
+          <p:cNvPr id="1038" name="Picture 14">
             <a:extLst>
               <a:ext uri="{FF2B5EF4-FFF2-40B4-BE49-F238E27FC236}">
-                <a16:creationId xmlns:a16="http://schemas.microsoft.com/office/drawing/2014/main" id="{383D2D9B-9936-48DF-9229-576E8AA41B55}"/>
+                <a16:creationId xmlns:a16="http://schemas.microsoft.com/office/drawing/2014/main" id="{666E84B5-0CF2-45DD-9227-49BEB6535EA6}"/>
               </a:ext>
             </a:extLst>
           </p:cNvPr>
@@ -14734,8 +15209,8 @@
         </p:blipFill>
         <p:spPr bwMode="auto">
           <a:xfrm>
-            <a:off x="6100671" y="2285629"/>
-            <a:ext cx="2544425" cy="2300648"/>
+            <a:off x="6430249" y="2466730"/>
+            <a:ext cx="2380101" cy="2152067"/>
           </a:xfrm>
           <a:prstGeom prst="rect">
             <a:avLst/>
@@ -14754,10 +15229,10 @@
       </p:pic>
       <p:pic>
         <p:nvPicPr>
-          <p:cNvPr id="2080" name="Picture 32">
+          <p:cNvPr id="1040" name="Picture 16">
             <a:extLst>
               <a:ext uri="{FF2B5EF4-FFF2-40B4-BE49-F238E27FC236}">
-                <a16:creationId xmlns:a16="http://schemas.microsoft.com/office/drawing/2014/main" id="{EC137C0A-550A-474B-A0FC-B4813942483F}"/>
+                <a16:creationId xmlns:a16="http://schemas.microsoft.com/office/drawing/2014/main" id="{DB49258C-B424-494B-8288-FFB7092D2BD6}"/>
               </a:ext>
             </a:extLst>
           </p:cNvPr>
@@ -14781,8 +15256,8 @@
         </p:blipFill>
         <p:spPr bwMode="auto">
           <a:xfrm>
-            <a:off x="9137227" y="2252109"/>
-            <a:ext cx="2544425" cy="2300648"/>
+            <a:off x="9284348" y="2466730"/>
+            <a:ext cx="2380101" cy="2152067"/>
           </a:xfrm>
           <a:prstGeom prst="rect">
             <a:avLst/>
@@ -14801,10 +15276,10 @@
       </p:pic>
       <p:pic>
         <p:nvPicPr>
-          <p:cNvPr id="2082" name="Picture 34">
+          <p:cNvPr id="1042" name="Picture 18">
             <a:extLst>
               <a:ext uri="{FF2B5EF4-FFF2-40B4-BE49-F238E27FC236}">
-                <a16:creationId xmlns:a16="http://schemas.microsoft.com/office/drawing/2014/main" id="{05105312-2325-4BCD-9FC9-C39C1FEA714A}"/>
+                <a16:creationId xmlns:a16="http://schemas.microsoft.com/office/drawing/2014/main" id="{88A6A0F9-882C-4D48-AD6D-3DA8481882EA}"/>
               </a:ext>
             </a:extLst>
           </p:cNvPr>
@@ -14828,8 +15303,8 @@
         </p:blipFill>
         <p:spPr bwMode="auto">
           <a:xfrm>
-            <a:off x="203640" y="4544926"/>
-            <a:ext cx="2544425" cy="2300648"/>
+            <a:off x="1283145" y="4620014"/>
+            <a:ext cx="2380101" cy="2152067"/>
           </a:xfrm>
           <a:prstGeom prst="rect">
             <a:avLst/>
@@ -14848,10 +15323,10 @@
       </p:pic>
       <p:pic>
         <p:nvPicPr>
-          <p:cNvPr id="2084" name="Picture 36">
+          <p:cNvPr id="1044" name="Picture 20">
             <a:extLst>
               <a:ext uri="{FF2B5EF4-FFF2-40B4-BE49-F238E27FC236}">
-                <a16:creationId xmlns:a16="http://schemas.microsoft.com/office/drawing/2014/main" id="{B61E0250-DBBE-48EC-B0FB-9D7ED5041F5F}"/>
+                <a16:creationId xmlns:a16="http://schemas.microsoft.com/office/drawing/2014/main" id="{AA6910E1-95CD-43E2-8295-685D47BB14C3}"/>
               </a:ext>
             </a:extLst>
           </p:cNvPr>
@@ -14875,8 +15350,8 @@
         </p:blipFill>
         <p:spPr bwMode="auto">
           <a:xfrm>
-            <a:off x="3077929" y="4544926"/>
-            <a:ext cx="2544425" cy="2300648"/>
+            <a:off x="3856534" y="4697766"/>
+            <a:ext cx="2380101" cy="2152067"/>
           </a:xfrm>
           <a:prstGeom prst="rect">
             <a:avLst/>
@@ -14895,10 +15370,10 @@
       </p:pic>
       <p:pic>
         <p:nvPicPr>
-          <p:cNvPr id="2086" name="Picture 38">
+          <p:cNvPr id="1046" name="Picture 22">
             <a:extLst>
               <a:ext uri="{FF2B5EF4-FFF2-40B4-BE49-F238E27FC236}">
-                <a16:creationId xmlns:a16="http://schemas.microsoft.com/office/drawing/2014/main" id="{123DF695-8743-4B6D-914D-E16CD426D6F5}"/>
+                <a16:creationId xmlns:a16="http://schemas.microsoft.com/office/drawing/2014/main" id="{73B94FA2-7C33-4B79-8E30-D945DD537DB6}"/>
               </a:ext>
             </a:extLst>
           </p:cNvPr>
@@ -14922,8 +15397,8 @@
         </p:blipFill>
         <p:spPr bwMode="auto">
           <a:xfrm>
-            <a:off x="6175231" y="4544925"/>
-            <a:ext cx="2574898" cy="2300649"/>
+            <a:off x="6401745" y="4684693"/>
+            <a:ext cx="2408605" cy="2152067"/>
           </a:xfrm>
           <a:prstGeom prst="rect">
             <a:avLst/>
@@ -14942,10 +15417,10 @@
       </p:pic>
       <p:pic>
         <p:nvPicPr>
-          <p:cNvPr id="2088" name="Picture 40">
+          <p:cNvPr id="1048" name="Picture 24">
             <a:extLst>
               <a:ext uri="{FF2B5EF4-FFF2-40B4-BE49-F238E27FC236}">
-                <a16:creationId xmlns:a16="http://schemas.microsoft.com/office/drawing/2014/main" id="{2D79EEA0-CFB9-43A6-872E-7B3FEFF2F472}"/>
+                <a16:creationId xmlns:a16="http://schemas.microsoft.com/office/drawing/2014/main" id="{F1987D04-B218-4AAE-9020-D64938C55D61}"/>
               </a:ext>
             </a:extLst>
           </p:cNvPr>
@@ -14969,8 +15444,8 @@
         </p:blipFill>
         <p:spPr bwMode="auto">
           <a:xfrm>
-            <a:off x="9175065" y="4544927"/>
-            <a:ext cx="2567279" cy="2300647"/>
+            <a:off x="9284348" y="4703019"/>
+            <a:ext cx="2401479" cy="2152067"/>
           </a:xfrm>
           <a:prstGeom prst="rect">
             <a:avLst/>
@@ -15146,10 +15621,10 @@
       </p:grpSpPr>
       <p:pic>
         <p:nvPicPr>
-          <p:cNvPr id="7170" name="Picture 2">
+          <p:cNvPr id="2050" name="Picture 2">
             <a:extLst>
               <a:ext uri="{FF2B5EF4-FFF2-40B4-BE49-F238E27FC236}">
-                <a16:creationId xmlns:a16="http://schemas.microsoft.com/office/drawing/2014/main" id="{6ADEDB9E-EFF0-405C-9E12-64358F1536F0}"/>
+                <a16:creationId xmlns:a16="http://schemas.microsoft.com/office/drawing/2014/main" id="{A43EFD46-B20C-4DC0-A1EC-E46EC34BC58A}"/>
               </a:ext>
             </a:extLst>
           </p:cNvPr>
@@ -15173,8 +15648,8 @@
         </p:blipFill>
         <p:spPr bwMode="auto">
           <a:xfrm>
-            <a:off x="1188328" y="7162"/>
-            <a:ext cx="2240733" cy="2044415"/>
+            <a:off x="1531752" y="121298"/>
+            <a:ext cx="2204680" cy="2011521"/>
           </a:xfrm>
           <a:prstGeom prst="rect">
             <a:avLst/>
@@ -15193,10 +15668,10 @@
       </p:pic>
       <p:pic>
         <p:nvPicPr>
-          <p:cNvPr id="7172" name="Picture 4">
+          <p:cNvPr id="2052" name="Picture 4">
             <a:extLst>
               <a:ext uri="{FF2B5EF4-FFF2-40B4-BE49-F238E27FC236}">
-                <a16:creationId xmlns:a16="http://schemas.microsoft.com/office/drawing/2014/main" id="{F35E8861-64BD-43BB-8F3A-DAFF97A3ACB8}"/>
+                <a16:creationId xmlns:a16="http://schemas.microsoft.com/office/drawing/2014/main" id="{35F52746-E0DB-4390-BFFF-CD478CD62610}"/>
               </a:ext>
             </a:extLst>
           </p:cNvPr>
@@ -15220,8 +15695,8 @@
         </p:blipFill>
         <p:spPr bwMode="auto">
           <a:xfrm>
-            <a:off x="3369906" y="-28652"/>
-            <a:ext cx="2240733" cy="2044415"/>
+            <a:off x="3580639" y="151138"/>
+            <a:ext cx="2204680" cy="2011521"/>
           </a:xfrm>
           <a:prstGeom prst="rect">
             <a:avLst/>
@@ -15240,10 +15715,10 @@
       </p:pic>
       <p:pic>
         <p:nvPicPr>
-          <p:cNvPr id="7174" name="Picture 6">
+          <p:cNvPr id="2054" name="Picture 6">
             <a:extLst>
               <a:ext uri="{FF2B5EF4-FFF2-40B4-BE49-F238E27FC236}">
-                <a16:creationId xmlns:a16="http://schemas.microsoft.com/office/drawing/2014/main" id="{912BB625-03AF-406E-8508-F1C7465FA7F1}"/>
+                <a16:creationId xmlns:a16="http://schemas.microsoft.com/office/drawing/2014/main" id="{4721FA57-6B90-465C-85ED-E122109A3975}"/>
               </a:ext>
             </a:extLst>
           </p:cNvPr>
@@ -15267,8 +15742,8 @@
         </p:blipFill>
         <p:spPr bwMode="auto">
           <a:xfrm>
-            <a:off x="5554163" y="0"/>
-            <a:ext cx="2240733" cy="2044415"/>
+            <a:off x="5558641" y="146765"/>
+            <a:ext cx="2204680" cy="2011521"/>
           </a:xfrm>
           <a:prstGeom prst="rect">
             <a:avLst/>
@@ -15287,10 +15762,10 @@
       </p:pic>
       <p:pic>
         <p:nvPicPr>
-          <p:cNvPr id="7176" name="Picture 8">
+          <p:cNvPr id="2056" name="Picture 8">
             <a:extLst>
               <a:ext uri="{FF2B5EF4-FFF2-40B4-BE49-F238E27FC236}">
-                <a16:creationId xmlns:a16="http://schemas.microsoft.com/office/drawing/2014/main" id="{26505F46-CAA8-4A11-AA5C-C3B55795117A}"/>
+                <a16:creationId xmlns:a16="http://schemas.microsoft.com/office/drawing/2014/main" id="{63A11704-3F92-4916-9E0A-2F187D539B5E}"/>
               </a:ext>
             </a:extLst>
           </p:cNvPr>
@@ -15314,8 +15789,8 @@
         </p:blipFill>
         <p:spPr bwMode="auto">
           <a:xfrm>
-            <a:off x="7747638" y="-1"/>
-            <a:ext cx="2240733" cy="2044415"/>
+            <a:off x="7607528" y="87283"/>
+            <a:ext cx="2204680" cy="2011521"/>
           </a:xfrm>
           <a:prstGeom prst="rect">
             <a:avLst/>
@@ -15334,10 +15809,10 @@
       </p:pic>
       <p:pic>
         <p:nvPicPr>
-          <p:cNvPr id="7178" name="Picture 10">
+          <p:cNvPr id="2058" name="Picture 10">
             <a:extLst>
               <a:ext uri="{FF2B5EF4-FFF2-40B4-BE49-F238E27FC236}">
-                <a16:creationId xmlns:a16="http://schemas.microsoft.com/office/drawing/2014/main" id="{4530FBDD-B765-49DE-AB41-A995BAB717E3}"/>
+                <a16:creationId xmlns:a16="http://schemas.microsoft.com/office/drawing/2014/main" id="{373C8744-B1E3-4868-9393-85891CD11FB6}"/>
               </a:ext>
             </a:extLst>
           </p:cNvPr>
@@ -15361,8 +15836,8 @@
         </p:blipFill>
         <p:spPr bwMode="auto">
           <a:xfrm>
-            <a:off x="9951267" y="7162"/>
-            <a:ext cx="2240733" cy="2044415"/>
+            <a:off x="9674256" y="146765"/>
+            <a:ext cx="2204680" cy="2011521"/>
           </a:xfrm>
           <a:prstGeom prst="rect">
             <a:avLst/>
@@ -15381,10 +15856,10 @@
       </p:pic>
       <p:pic>
         <p:nvPicPr>
-          <p:cNvPr id="7180" name="Picture 12">
+          <p:cNvPr id="2060" name="Picture 12">
             <a:extLst>
               <a:ext uri="{FF2B5EF4-FFF2-40B4-BE49-F238E27FC236}">
-                <a16:creationId xmlns:a16="http://schemas.microsoft.com/office/drawing/2014/main" id="{F9403EC8-F96B-48AA-B490-8ECEA0309DA4}"/>
+                <a16:creationId xmlns:a16="http://schemas.microsoft.com/office/drawing/2014/main" id="{CF999636-2E11-448B-B895-BDD2A2A3C343}"/>
               </a:ext>
             </a:extLst>
           </p:cNvPr>
@@ -15408,8 +15883,8 @@
         </p:blipFill>
         <p:spPr bwMode="auto">
           <a:xfrm>
-            <a:off x="56626" y="2540369"/>
-            <a:ext cx="2240733" cy="2044415"/>
+            <a:off x="-141941" y="2488064"/>
+            <a:ext cx="1925796" cy="1757071"/>
           </a:xfrm>
           <a:prstGeom prst="rect">
             <a:avLst/>
@@ -15428,10 +15903,10 @@
       </p:pic>
       <p:pic>
         <p:nvPicPr>
-          <p:cNvPr id="7182" name="Picture 14">
+          <p:cNvPr id="2062" name="Picture 14">
             <a:extLst>
               <a:ext uri="{FF2B5EF4-FFF2-40B4-BE49-F238E27FC236}">
-                <a16:creationId xmlns:a16="http://schemas.microsoft.com/office/drawing/2014/main" id="{2145642B-C005-4FBC-BDDD-D3D9C6040199}"/>
+                <a16:creationId xmlns:a16="http://schemas.microsoft.com/office/drawing/2014/main" id="{6273D077-C159-407F-BA0C-FA417666E8C4}"/>
               </a:ext>
             </a:extLst>
           </p:cNvPr>
@@ -15455,8 +15930,8 @@
         </p:blipFill>
         <p:spPr bwMode="auto">
           <a:xfrm>
-            <a:off x="1984679" y="2540370"/>
-            <a:ext cx="2240733" cy="2044415"/>
+            <a:off x="1502443" y="2360840"/>
+            <a:ext cx="2204680" cy="2011521"/>
           </a:xfrm>
           <a:prstGeom prst="rect">
             <a:avLst/>
@@ -15475,10 +15950,10 @@
       </p:pic>
       <p:pic>
         <p:nvPicPr>
-          <p:cNvPr id="7184" name="Picture 16">
+          <p:cNvPr id="2064" name="Picture 16">
             <a:extLst>
               <a:ext uri="{FF2B5EF4-FFF2-40B4-BE49-F238E27FC236}">
-                <a16:creationId xmlns:a16="http://schemas.microsoft.com/office/drawing/2014/main" id="{FE81E23F-C81A-459B-8F77-0FB0960C1703}"/>
+                <a16:creationId xmlns:a16="http://schemas.microsoft.com/office/drawing/2014/main" id="{242CF369-A657-491E-BED5-67789496D81A}"/>
               </a:ext>
             </a:extLst>
           </p:cNvPr>
@@ -15502,8 +15977,8 @@
         </p:blipFill>
         <p:spPr bwMode="auto">
           <a:xfrm>
-            <a:off x="3925372" y="2517877"/>
-            <a:ext cx="2240733" cy="2044415"/>
+            <a:off x="3580639" y="2361036"/>
+            <a:ext cx="2204680" cy="2011521"/>
           </a:xfrm>
           <a:prstGeom prst="rect">
             <a:avLst/>
@@ -15522,10 +15997,10 @@
       </p:pic>
       <p:pic>
         <p:nvPicPr>
-          <p:cNvPr id="7186" name="Picture 18">
+          <p:cNvPr id="2066" name="Picture 18">
             <a:extLst>
               <a:ext uri="{FF2B5EF4-FFF2-40B4-BE49-F238E27FC236}">
-                <a16:creationId xmlns:a16="http://schemas.microsoft.com/office/drawing/2014/main" id="{C1DB1E00-7FFA-4FCA-966D-C48DE4D5FD04}"/>
+                <a16:creationId xmlns:a16="http://schemas.microsoft.com/office/drawing/2014/main" id="{E48211F6-B76B-466A-808E-4CB1647A6670}"/>
               </a:ext>
             </a:extLst>
           </p:cNvPr>
@@ -15549,8 +16024,8 @@
         </p:blipFill>
         <p:spPr bwMode="auto">
           <a:xfrm>
-            <a:off x="5874668" y="2512224"/>
-            <a:ext cx="2240733" cy="2044415"/>
+            <a:off x="5523890" y="2361036"/>
+            <a:ext cx="2204680" cy="2011521"/>
           </a:xfrm>
           <a:prstGeom prst="rect">
             <a:avLst/>
@@ -15569,10 +16044,10 @@
       </p:pic>
       <p:pic>
         <p:nvPicPr>
-          <p:cNvPr id="7188" name="Picture 20">
+          <p:cNvPr id="2068" name="Picture 20">
             <a:extLst>
               <a:ext uri="{FF2B5EF4-FFF2-40B4-BE49-F238E27FC236}">
-                <a16:creationId xmlns:a16="http://schemas.microsoft.com/office/drawing/2014/main" id="{C2ABC8B7-A8E1-4A2E-AF84-DBD8CC6DAE47}"/>
+                <a16:creationId xmlns:a16="http://schemas.microsoft.com/office/drawing/2014/main" id="{81CF0500-F804-4EA3-9270-3AF613C55B80}"/>
               </a:ext>
             </a:extLst>
           </p:cNvPr>
@@ -15596,8 +16071,8 @@
         </p:blipFill>
         <p:spPr bwMode="auto">
           <a:xfrm>
-            <a:off x="7837816" y="2526044"/>
-            <a:ext cx="2240733" cy="2044415"/>
+            <a:off x="7602086" y="2361036"/>
+            <a:ext cx="2204680" cy="2011521"/>
           </a:xfrm>
           <a:prstGeom prst="rect">
             <a:avLst/>
@@ -15616,10 +16091,10 @@
       </p:pic>
       <p:pic>
         <p:nvPicPr>
-          <p:cNvPr id="7190" name="Picture 22">
+          <p:cNvPr id="2070" name="Picture 22">
             <a:extLst>
               <a:ext uri="{FF2B5EF4-FFF2-40B4-BE49-F238E27FC236}">
-                <a16:creationId xmlns:a16="http://schemas.microsoft.com/office/drawing/2014/main" id="{714D9887-B7CF-45EF-ADE5-72D1225D6AA4}"/>
+                <a16:creationId xmlns:a16="http://schemas.microsoft.com/office/drawing/2014/main" id="{7B32EA33-844E-42D1-B69E-689F858CCA68}"/>
               </a:ext>
             </a:extLst>
           </p:cNvPr>
@@ -15643,8 +16118,8 @@
         </p:blipFill>
         <p:spPr bwMode="auto">
           <a:xfrm>
-            <a:off x="9897093" y="2586174"/>
-            <a:ext cx="2261042" cy="2044415"/>
+            <a:off x="9525354" y="2296014"/>
+            <a:ext cx="2224663" cy="2011521"/>
           </a:xfrm>
           <a:prstGeom prst="rect">
             <a:avLst/>
@@ -15663,10 +16138,10 @@
       </p:pic>
       <p:pic>
         <p:nvPicPr>
-          <p:cNvPr id="7192" name="Picture 24">
+          <p:cNvPr id="2072" name="Picture 24">
             <a:extLst>
               <a:ext uri="{FF2B5EF4-FFF2-40B4-BE49-F238E27FC236}">
-                <a16:creationId xmlns:a16="http://schemas.microsoft.com/office/drawing/2014/main" id="{0C37A6A0-0831-4A8B-92EC-819BFAF8CF4A}"/>
+                <a16:creationId xmlns:a16="http://schemas.microsoft.com/office/drawing/2014/main" id="{276F7CAD-2B49-4DA7-BB49-BA3D3F2FA41F}"/>
               </a:ext>
             </a:extLst>
           </p:cNvPr>
@@ -15690,8 +16165,8 @@
         </p:blipFill>
         <p:spPr bwMode="auto">
           <a:xfrm>
-            <a:off x="1165340" y="4842237"/>
-            <a:ext cx="2261042" cy="2044415"/>
+            <a:off x="1682759" y="4630222"/>
+            <a:ext cx="2224663" cy="2011521"/>
           </a:xfrm>
           <a:prstGeom prst="rect">
             <a:avLst/>
@@ -15710,10 +16185,10 @@
       </p:pic>
       <p:pic>
         <p:nvPicPr>
-          <p:cNvPr id="7194" name="Picture 26">
+          <p:cNvPr id="2074" name="Picture 26">
             <a:extLst>
               <a:ext uri="{FF2B5EF4-FFF2-40B4-BE49-F238E27FC236}">
-                <a16:creationId xmlns:a16="http://schemas.microsoft.com/office/drawing/2014/main" id="{348A8823-5901-4C71-B175-83782974C92A}"/>
+                <a16:creationId xmlns:a16="http://schemas.microsoft.com/office/drawing/2014/main" id="{ED23C3D3-D8FF-4535-8E81-6466BDAEC481}"/>
               </a:ext>
             </a:extLst>
           </p:cNvPr>
@@ -15737,8 +16212,8 @@
         </p:blipFill>
         <p:spPr bwMode="auto">
           <a:xfrm>
-            <a:off x="3426382" y="4813585"/>
-            <a:ext cx="2261042" cy="2044415"/>
+            <a:off x="3662166" y="4634789"/>
+            <a:ext cx="2224663" cy="2011521"/>
           </a:xfrm>
           <a:prstGeom prst="rect">
             <a:avLst/>
@@ -15757,10 +16232,10 @@
       </p:pic>
       <p:pic>
         <p:nvPicPr>
-          <p:cNvPr id="7196" name="Picture 28">
+          <p:cNvPr id="2076" name="Picture 28">
             <a:extLst>
               <a:ext uri="{FF2B5EF4-FFF2-40B4-BE49-F238E27FC236}">
-                <a16:creationId xmlns:a16="http://schemas.microsoft.com/office/drawing/2014/main" id="{4EA75D8D-4669-45CC-952B-231D04D8BEEE}"/>
+                <a16:creationId xmlns:a16="http://schemas.microsoft.com/office/drawing/2014/main" id="{60E1837A-3858-4A1E-A95E-14749B15C177}"/>
               </a:ext>
             </a:extLst>
           </p:cNvPr>
@@ -15784,8 +16259,8 @@
         </p:blipFill>
         <p:spPr bwMode="auto">
           <a:xfrm>
-            <a:off x="5610639" y="4842237"/>
-            <a:ext cx="2261042" cy="2044415"/>
+            <a:off x="5641573" y="4634789"/>
+            <a:ext cx="2224663" cy="2011521"/>
           </a:xfrm>
           <a:prstGeom prst="rect">
             <a:avLst/>
@@ -15804,10 +16279,10 @@
       </p:pic>
       <p:pic>
         <p:nvPicPr>
-          <p:cNvPr id="7198" name="Picture 30">
+          <p:cNvPr id="2078" name="Picture 30">
             <a:extLst>
               <a:ext uri="{FF2B5EF4-FFF2-40B4-BE49-F238E27FC236}">
-                <a16:creationId xmlns:a16="http://schemas.microsoft.com/office/drawing/2014/main" id="{B9A17C2C-C6C9-44C8-AED3-CBC34D619B73}"/>
+                <a16:creationId xmlns:a16="http://schemas.microsoft.com/office/drawing/2014/main" id="{0A9E65D9-D700-4D4F-8760-34AD29AECF55}"/>
               </a:ext>
             </a:extLst>
           </p:cNvPr>
@@ -15831,8 +16306,8 @@
         </p:blipFill>
         <p:spPr bwMode="auto">
           <a:xfrm>
-            <a:off x="7794896" y="4842237"/>
-            <a:ext cx="2261042" cy="2044415"/>
+            <a:off x="7587545" y="4634789"/>
+            <a:ext cx="2224663" cy="2011521"/>
           </a:xfrm>
           <a:prstGeom prst="rect">
             <a:avLst/>
@@ -15851,10 +16326,10 @@
       </p:pic>
       <p:pic>
         <p:nvPicPr>
-          <p:cNvPr id="7200" name="Picture 32">
+          <p:cNvPr id="2080" name="Picture 32">
             <a:extLst>
               <a:ext uri="{FF2B5EF4-FFF2-40B4-BE49-F238E27FC236}">
-                <a16:creationId xmlns:a16="http://schemas.microsoft.com/office/drawing/2014/main" id="{6CD84943-C85B-4086-8C37-644086B05F4E}"/>
+                <a16:creationId xmlns:a16="http://schemas.microsoft.com/office/drawing/2014/main" id="{52D3F0F1-3E41-4810-BD63-029409628D7B}"/>
               </a:ext>
             </a:extLst>
           </p:cNvPr>
@@ -15878,8 +16353,8 @@
         </p:blipFill>
         <p:spPr bwMode="auto">
           <a:xfrm>
-            <a:off x="9937728" y="4844896"/>
-            <a:ext cx="2254272" cy="2044415"/>
+            <a:off x="9526198" y="4634789"/>
+            <a:ext cx="2218002" cy="2011521"/>
           </a:xfrm>
           <a:prstGeom prst="rect">
             <a:avLst/>

</xml_diff>